<commit_message>
Finished the draft for the UC schedule ppt
</commit_message>
<xml_diff>
--- a/docs/UC Schedule App.pptx
+++ b/docs/UC Schedule App.pptx
@@ -6,9 +6,9 @@
   </p:sldMasterIdLst>
   <p:sldIdLst>
     <p:sldId id="256" r:id="rId2"/>
-    <p:sldId id="259" r:id="rId3"/>
+    <p:sldId id="261" r:id="rId3"/>
     <p:sldId id="260" r:id="rId4"/>
-    <p:sldId id="261" r:id="rId5"/>
+    <p:sldId id="259" r:id="rId5"/>
     <p:sldId id="262" r:id="rId6"/>
     <p:sldId id="263" r:id="rId7"/>
     <p:sldId id="264" r:id="rId8"/>
@@ -21,8 +21,8 @@
     <p:sldId id="270" r:id="rId15"/>
     <p:sldId id="271" r:id="rId16"/>
     <p:sldId id="272" r:id="rId17"/>
-    <p:sldId id="257" r:id="rId18"/>
-    <p:sldId id="276" r:id="rId19"/>
+    <p:sldId id="276" r:id="rId18"/>
+    <p:sldId id="257" r:id="rId19"/>
     <p:sldId id="273" r:id="rId20"/>
     <p:sldId id="274" r:id="rId21"/>
     <p:sldId id="275" r:id="rId22"/>
@@ -127,6 +127,3032 @@
 </p:presentation>
 </file>
 
+<file path=ppt/diagrams/colors1.xml><?xml version="1.0" encoding="utf-8"?>
+<dgm:colorsDef xmlns:dgm="http://schemas.openxmlformats.org/drawingml/2006/diagram" xmlns:a="http://schemas.openxmlformats.org/drawingml/2006/main" uniqueId="urn:microsoft.com/office/officeart/2005/8/colors/accent2_1">
+  <dgm:title val=""/>
+  <dgm:desc val=""/>
+  <dgm:catLst>
+    <dgm:cat type="accent2" pri="11100"/>
+  </dgm:catLst>
+  <dgm:styleLbl name="node0">
+    <dgm:fillClrLst meth="repeat">
+      <a:schemeClr val="lt1"/>
+    </dgm:fillClrLst>
+    <dgm:linClrLst meth="repeat">
+      <a:schemeClr val="accent2">
+        <a:shade val="80000"/>
+      </a:schemeClr>
+    </dgm:linClrLst>
+    <dgm:effectClrLst/>
+    <dgm:txLinClrLst/>
+    <dgm:txFillClrLst meth="repeat">
+      <a:schemeClr val="dk1"/>
+    </dgm:txFillClrLst>
+    <dgm:txEffectClrLst/>
+  </dgm:styleLbl>
+  <dgm:styleLbl name="node1">
+    <dgm:fillClrLst meth="repeat">
+      <a:schemeClr val="lt1"/>
+    </dgm:fillClrLst>
+    <dgm:linClrLst meth="repeat">
+      <a:schemeClr val="accent2">
+        <a:shade val="80000"/>
+      </a:schemeClr>
+    </dgm:linClrLst>
+    <dgm:effectClrLst/>
+    <dgm:txLinClrLst/>
+    <dgm:txFillClrLst meth="repeat">
+      <a:schemeClr val="dk1"/>
+    </dgm:txFillClrLst>
+    <dgm:txEffectClrLst/>
+  </dgm:styleLbl>
+  <dgm:styleLbl name="alignNode1">
+    <dgm:fillClrLst meth="repeat">
+      <a:schemeClr val="lt1"/>
+    </dgm:fillClrLst>
+    <dgm:linClrLst meth="repeat">
+      <a:schemeClr val="accent2">
+        <a:shade val="80000"/>
+      </a:schemeClr>
+    </dgm:linClrLst>
+    <dgm:effectClrLst/>
+    <dgm:txLinClrLst/>
+    <dgm:txFillClrLst meth="repeat">
+      <a:schemeClr val="dk1"/>
+    </dgm:txFillClrLst>
+    <dgm:txEffectClrLst/>
+  </dgm:styleLbl>
+  <dgm:styleLbl name="lnNode1">
+    <dgm:fillClrLst meth="repeat">
+      <a:schemeClr val="lt1"/>
+    </dgm:fillClrLst>
+    <dgm:linClrLst meth="repeat">
+      <a:schemeClr val="accent2">
+        <a:shade val="80000"/>
+      </a:schemeClr>
+    </dgm:linClrLst>
+    <dgm:effectClrLst/>
+    <dgm:txLinClrLst/>
+    <dgm:txFillClrLst meth="repeat">
+      <a:schemeClr val="dk1"/>
+    </dgm:txFillClrLst>
+    <dgm:txEffectClrLst/>
+  </dgm:styleLbl>
+  <dgm:styleLbl name="vennNode1">
+    <dgm:fillClrLst meth="repeat">
+      <a:schemeClr val="lt1">
+        <a:alpha val="50000"/>
+      </a:schemeClr>
+    </dgm:fillClrLst>
+    <dgm:linClrLst meth="repeat">
+      <a:schemeClr val="accent2">
+        <a:shade val="80000"/>
+      </a:schemeClr>
+    </dgm:linClrLst>
+    <dgm:effectClrLst/>
+    <dgm:txLinClrLst/>
+    <dgm:txFillClrLst/>
+    <dgm:txEffectClrLst/>
+  </dgm:styleLbl>
+  <dgm:styleLbl name="node2">
+    <dgm:fillClrLst meth="repeat">
+      <a:schemeClr val="lt1"/>
+    </dgm:fillClrLst>
+    <dgm:linClrLst meth="repeat">
+      <a:schemeClr val="accent2">
+        <a:shade val="80000"/>
+      </a:schemeClr>
+    </dgm:linClrLst>
+    <dgm:effectClrLst/>
+    <dgm:txLinClrLst/>
+    <dgm:txFillClrLst meth="repeat">
+      <a:schemeClr val="dk1"/>
+    </dgm:txFillClrLst>
+    <dgm:txEffectClrLst/>
+  </dgm:styleLbl>
+  <dgm:styleLbl name="node3">
+    <dgm:fillClrLst meth="repeat">
+      <a:schemeClr val="lt1"/>
+    </dgm:fillClrLst>
+    <dgm:linClrLst meth="repeat">
+      <a:schemeClr val="accent2">
+        <a:shade val="80000"/>
+      </a:schemeClr>
+    </dgm:linClrLst>
+    <dgm:effectClrLst/>
+    <dgm:txLinClrLst/>
+    <dgm:txFillClrLst meth="repeat">
+      <a:schemeClr val="dk1"/>
+    </dgm:txFillClrLst>
+    <dgm:txEffectClrLst/>
+  </dgm:styleLbl>
+  <dgm:styleLbl name="node4">
+    <dgm:fillClrLst meth="repeat">
+      <a:schemeClr val="lt1"/>
+    </dgm:fillClrLst>
+    <dgm:linClrLst meth="repeat">
+      <a:schemeClr val="accent2">
+        <a:shade val="80000"/>
+      </a:schemeClr>
+    </dgm:linClrLst>
+    <dgm:effectClrLst/>
+    <dgm:txLinClrLst/>
+    <dgm:txFillClrLst meth="repeat">
+      <a:schemeClr val="dk1"/>
+    </dgm:txFillClrLst>
+    <dgm:txEffectClrLst/>
+  </dgm:styleLbl>
+  <dgm:styleLbl name="fgImgPlace1">
+    <dgm:fillClrLst meth="repeat">
+      <a:schemeClr val="accent2">
+        <a:tint val="40000"/>
+      </a:schemeClr>
+    </dgm:fillClrLst>
+    <dgm:linClrLst meth="repeat">
+      <a:schemeClr val="accent2">
+        <a:shade val="80000"/>
+      </a:schemeClr>
+    </dgm:linClrLst>
+    <dgm:effectClrLst/>
+    <dgm:txLinClrLst/>
+    <dgm:txFillClrLst meth="repeat">
+      <a:schemeClr val="lt1"/>
+    </dgm:txFillClrLst>
+    <dgm:txEffectClrLst/>
+  </dgm:styleLbl>
+  <dgm:styleLbl name="alignImgPlace1">
+    <dgm:fillClrLst meth="repeat">
+      <a:schemeClr val="accent2">
+        <a:tint val="40000"/>
+      </a:schemeClr>
+    </dgm:fillClrLst>
+    <dgm:linClrLst meth="repeat">
+      <a:schemeClr val="accent2">
+        <a:shade val="80000"/>
+      </a:schemeClr>
+    </dgm:linClrLst>
+    <dgm:effectClrLst/>
+    <dgm:txLinClrLst/>
+    <dgm:txFillClrLst meth="repeat">
+      <a:schemeClr val="lt1"/>
+    </dgm:txFillClrLst>
+    <dgm:txEffectClrLst/>
+  </dgm:styleLbl>
+  <dgm:styleLbl name="bgImgPlace1">
+    <dgm:fillClrLst meth="repeat">
+      <a:schemeClr val="accent2">
+        <a:tint val="40000"/>
+      </a:schemeClr>
+    </dgm:fillClrLst>
+    <dgm:linClrLst meth="repeat">
+      <a:schemeClr val="accent2">
+        <a:shade val="80000"/>
+      </a:schemeClr>
+    </dgm:linClrLst>
+    <dgm:effectClrLst/>
+    <dgm:txLinClrLst/>
+    <dgm:txFillClrLst meth="repeat">
+      <a:schemeClr val="lt1"/>
+    </dgm:txFillClrLst>
+    <dgm:txEffectClrLst/>
+  </dgm:styleLbl>
+  <dgm:styleLbl name="sibTrans2D1">
+    <dgm:fillClrLst meth="repeat">
+      <a:schemeClr val="accent2">
+        <a:tint val="60000"/>
+      </a:schemeClr>
+    </dgm:fillClrLst>
+    <dgm:linClrLst meth="repeat">
+      <a:schemeClr val="accent2">
+        <a:tint val="60000"/>
+      </a:schemeClr>
+    </dgm:linClrLst>
+    <dgm:effectClrLst/>
+    <dgm:txLinClrLst/>
+    <dgm:txFillClrLst meth="repeat">
+      <a:schemeClr val="dk1"/>
+    </dgm:txFillClrLst>
+    <dgm:txEffectClrLst/>
+  </dgm:styleLbl>
+  <dgm:styleLbl name="fgSibTrans2D1">
+    <dgm:fillClrLst meth="repeat">
+      <a:schemeClr val="accent2">
+        <a:tint val="60000"/>
+      </a:schemeClr>
+    </dgm:fillClrLst>
+    <dgm:linClrLst meth="repeat">
+      <a:schemeClr val="accent2">
+        <a:tint val="60000"/>
+      </a:schemeClr>
+    </dgm:linClrLst>
+    <dgm:effectClrLst/>
+    <dgm:txLinClrLst/>
+    <dgm:txFillClrLst meth="repeat">
+      <a:schemeClr val="dk1"/>
+    </dgm:txFillClrLst>
+    <dgm:txEffectClrLst/>
+  </dgm:styleLbl>
+  <dgm:styleLbl name="bgSibTrans2D1">
+    <dgm:fillClrLst meth="repeat">
+      <a:schemeClr val="accent2">
+        <a:tint val="60000"/>
+      </a:schemeClr>
+    </dgm:fillClrLst>
+    <dgm:linClrLst meth="repeat">
+      <a:schemeClr val="accent2">
+        <a:tint val="60000"/>
+      </a:schemeClr>
+    </dgm:linClrLst>
+    <dgm:effectClrLst/>
+    <dgm:txLinClrLst/>
+    <dgm:txFillClrLst meth="repeat">
+      <a:schemeClr val="dk1"/>
+    </dgm:txFillClrLst>
+    <dgm:txEffectClrLst/>
+  </dgm:styleLbl>
+  <dgm:styleLbl name="sibTrans1D1">
+    <dgm:fillClrLst meth="repeat">
+      <a:schemeClr val="accent2"/>
+    </dgm:fillClrLst>
+    <dgm:linClrLst meth="repeat">
+      <a:schemeClr val="accent2"/>
+    </dgm:linClrLst>
+    <dgm:effectClrLst/>
+    <dgm:txLinClrLst/>
+    <dgm:txFillClrLst meth="repeat">
+      <a:schemeClr val="tx1"/>
+    </dgm:txFillClrLst>
+    <dgm:txEffectClrLst/>
+  </dgm:styleLbl>
+  <dgm:styleLbl name="callout">
+    <dgm:fillClrLst meth="repeat">
+      <a:schemeClr val="accent2"/>
+    </dgm:fillClrLst>
+    <dgm:linClrLst meth="repeat">
+      <a:schemeClr val="accent2"/>
+    </dgm:linClrLst>
+    <dgm:effectClrLst/>
+    <dgm:txLinClrLst/>
+    <dgm:txFillClrLst meth="repeat">
+      <a:schemeClr val="tx1"/>
+    </dgm:txFillClrLst>
+    <dgm:txEffectClrLst/>
+  </dgm:styleLbl>
+  <dgm:styleLbl name="asst0">
+    <dgm:fillClrLst meth="repeat">
+      <a:schemeClr val="lt1"/>
+    </dgm:fillClrLst>
+    <dgm:linClrLst meth="repeat">
+      <a:schemeClr val="accent2">
+        <a:shade val="80000"/>
+      </a:schemeClr>
+    </dgm:linClrLst>
+    <dgm:effectClrLst/>
+    <dgm:txLinClrLst/>
+    <dgm:txFillClrLst meth="repeat">
+      <a:schemeClr val="dk1"/>
+    </dgm:txFillClrLst>
+    <dgm:txEffectClrLst/>
+  </dgm:styleLbl>
+  <dgm:styleLbl name="asst1">
+    <dgm:fillClrLst meth="repeat">
+      <a:schemeClr val="lt1"/>
+    </dgm:fillClrLst>
+    <dgm:linClrLst meth="repeat">
+      <a:schemeClr val="accent2">
+        <a:shade val="80000"/>
+      </a:schemeClr>
+    </dgm:linClrLst>
+    <dgm:effectClrLst/>
+    <dgm:txLinClrLst/>
+    <dgm:txFillClrLst meth="repeat">
+      <a:schemeClr val="dk1"/>
+    </dgm:txFillClrLst>
+    <dgm:txEffectClrLst/>
+  </dgm:styleLbl>
+  <dgm:styleLbl name="asst2">
+    <dgm:fillClrLst meth="repeat">
+      <a:schemeClr val="lt1"/>
+    </dgm:fillClrLst>
+    <dgm:linClrLst meth="repeat">
+      <a:schemeClr val="accent2">
+        <a:shade val="80000"/>
+      </a:schemeClr>
+    </dgm:linClrLst>
+    <dgm:effectClrLst/>
+    <dgm:txLinClrLst/>
+    <dgm:txFillClrLst meth="repeat">
+      <a:schemeClr val="dk1"/>
+    </dgm:txFillClrLst>
+    <dgm:txEffectClrLst/>
+  </dgm:styleLbl>
+  <dgm:styleLbl name="asst3">
+    <dgm:fillClrLst meth="repeat">
+      <a:schemeClr val="lt1"/>
+    </dgm:fillClrLst>
+    <dgm:linClrLst meth="repeat">
+      <a:schemeClr val="accent2">
+        <a:shade val="80000"/>
+      </a:schemeClr>
+    </dgm:linClrLst>
+    <dgm:effectClrLst/>
+    <dgm:txLinClrLst/>
+    <dgm:txFillClrLst meth="repeat">
+      <a:schemeClr val="dk1"/>
+    </dgm:txFillClrLst>
+    <dgm:txEffectClrLst/>
+  </dgm:styleLbl>
+  <dgm:styleLbl name="asst4">
+    <dgm:fillClrLst meth="repeat">
+      <a:schemeClr val="lt1"/>
+    </dgm:fillClrLst>
+    <dgm:linClrLst meth="repeat">
+      <a:schemeClr val="accent2">
+        <a:shade val="80000"/>
+      </a:schemeClr>
+    </dgm:linClrLst>
+    <dgm:effectClrLst/>
+    <dgm:txLinClrLst/>
+    <dgm:txFillClrLst meth="repeat">
+      <a:schemeClr val="dk1"/>
+    </dgm:txFillClrLst>
+    <dgm:txEffectClrLst/>
+  </dgm:styleLbl>
+  <dgm:styleLbl name="parChTrans2D1">
+    <dgm:fillClrLst meth="repeat">
+      <a:schemeClr val="accent2">
+        <a:tint val="60000"/>
+      </a:schemeClr>
+    </dgm:fillClrLst>
+    <dgm:linClrLst meth="repeat">
+      <a:schemeClr val="accent2">
+        <a:tint val="60000"/>
+      </a:schemeClr>
+    </dgm:linClrLst>
+    <dgm:effectClrLst/>
+    <dgm:txLinClrLst/>
+    <dgm:txFillClrLst/>
+    <dgm:txEffectClrLst/>
+  </dgm:styleLbl>
+  <dgm:styleLbl name="parChTrans2D2">
+    <dgm:fillClrLst meth="repeat">
+      <a:schemeClr val="accent2"/>
+    </dgm:fillClrLst>
+    <dgm:linClrLst meth="repeat">
+      <a:schemeClr val="accent2"/>
+    </dgm:linClrLst>
+    <dgm:effectClrLst/>
+    <dgm:txLinClrLst/>
+    <dgm:txFillClrLst/>
+    <dgm:txEffectClrLst/>
+  </dgm:styleLbl>
+  <dgm:styleLbl name="parChTrans2D3">
+    <dgm:fillClrLst meth="repeat">
+      <a:schemeClr val="accent2"/>
+    </dgm:fillClrLst>
+    <dgm:linClrLst meth="repeat">
+      <a:schemeClr val="accent2"/>
+    </dgm:linClrLst>
+    <dgm:effectClrLst/>
+    <dgm:txLinClrLst/>
+    <dgm:txFillClrLst/>
+    <dgm:txEffectClrLst/>
+  </dgm:styleLbl>
+  <dgm:styleLbl name="parChTrans2D4">
+    <dgm:fillClrLst meth="repeat">
+      <a:schemeClr val="accent2"/>
+    </dgm:fillClrLst>
+    <dgm:linClrLst meth="repeat">
+      <a:schemeClr val="accent2"/>
+    </dgm:linClrLst>
+    <dgm:effectClrLst/>
+    <dgm:txLinClrLst/>
+    <dgm:txFillClrLst meth="repeat">
+      <a:schemeClr val="lt1"/>
+    </dgm:txFillClrLst>
+    <dgm:txEffectClrLst/>
+  </dgm:styleLbl>
+  <dgm:styleLbl name="parChTrans1D1">
+    <dgm:fillClrLst meth="repeat">
+      <a:schemeClr val="accent2"/>
+    </dgm:fillClrLst>
+    <dgm:linClrLst meth="repeat">
+      <a:schemeClr val="accent2">
+        <a:shade val="60000"/>
+      </a:schemeClr>
+    </dgm:linClrLst>
+    <dgm:effectClrLst/>
+    <dgm:txLinClrLst/>
+    <dgm:txFillClrLst meth="repeat">
+      <a:schemeClr val="tx1"/>
+    </dgm:txFillClrLst>
+    <dgm:txEffectClrLst/>
+  </dgm:styleLbl>
+  <dgm:styleLbl name="parChTrans1D2">
+    <dgm:fillClrLst meth="repeat">
+      <a:schemeClr val="accent2"/>
+    </dgm:fillClrLst>
+    <dgm:linClrLst meth="repeat">
+      <a:schemeClr val="accent2">
+        <a:shade val="60000"/>
+      </a:schemeClr>
+    </dgm:linClrLst>
+    <dgm:effectClrLst/>
+    <dgm:txLinClrLst/>
+    <dgm:txFillClrLst meth="repeat">
+      <a:schemeClr val="tx1"/>
+    </dgm:txFillClrLst>
+    <dgm:txEffectClrLst/>
+  </dgm:styleLbl>
+  <dgm:styleLbl name="parChTrans1D3">
+    <dgm:fillClrLst meth="repeat">
+      <a:schemeClr val="accent2"/>
+    </dgm:fillClrLst>
+    <dgm:linClrLst meth="repeat">
+      <a:schemeClr val="accent2">
+        <a:shade val="80000"/>
+      </a:schemeClr>
+    </dgm:linClrLst>
+    <dgm:effectClrLst/>
+    <dgm:txLinClrLst/>
+    <dgm:txFillClrLst meth="repeat">
+      <a:schemeClr val="tx1"/>
+    </dgm:txFillClrLst>
+    <dgm:txEffectClrLst/>
+  </dgm:styleLbl>
+  <dgm:styleLbl name="parChTrans1D4">
+    <dgm:fillClrLst meth="repeat">
+      <a:schemeClr val="accent2"/>
+    </dgm:fillClrLst>
+    <dgm:linClrLst meth="repeat">
+      <a:schemeClr val="accent2">
+        <a:shade val="80000"/>
+      </a:schemeClr>
+    </dgm:linClrLst>
+    <dgm:effectClrLst/>
+    <dgm:txLinClrLst/>
+    <dgm:txFillClrLst meth="repeat">
+      <a:schemeClr val="tx1"/>
+    </dgm:txFillClrLst>
+    <dgm:txEffectClrLst/>
+  </dgm:styleLbl>
+  <dgm:styleLbl name="fgAcc1">
+    <dgm:fillClrLst meth="repeat">
+      <a:schemeClr val="accent2">
+        <a:alpha val="90000"/>
+        <a:tint val="40000"/>
+      </a:schemeClr>
+    </dgm:fillClrLst>
+    <dgm:linClrLst meth="repeat">
+      <a:schemeClr val="accent2"/>
+    </dgm:linClrLst>
+    <dgm:effectClrLst/>
+    <dgm:txLinClrLst/>
+    <dgm:txFillClrLst meth="repeat">
+      <a:schemeClr val="dk1"/>
+    </dgm:txFillClrLst>
+    <dgm:txEffectClrLst/>
+  </dgm:styleLbl>
+  <dgm:styleLbl name="conFgAcc1">
+    <dgm:fillClrLst meth="repeat">
+      <a:schemeClr val="accent2">
+        <a:alpha val="90000"/>
+        <a:tint val="40000"/>
+      </a:schemeClr>
+    </dgm:fillClrLst>
+    <dgm:linClrLst meth="repeat">
+      <a:schemeClr val="accent2"/>
+    </dgm:linClrLst>
+    <dgm:effectClrLst/>
+    <dgm:txLinClrLst/>
+    <dgm:txFillClrLst meth="repeat">
+      <a:schemeClr val="dk1"/>
+    </dgm:txFillClrLst>
+    <dgm:txEffectClrLst/>
+  </dgm:styleLbl>
+  <dgm:styleLbl name="alignAcc1">
+    <dgm:fillClrLst meth="repeat">
+      <a:schemeClr val="accent2">
+        <a:alpha val="90000"/>
+        <a:tint val="40000"/>
+      </a:schemeClr>
+    </dgm:fillClrLst>
+    <dgm:linClrLst meth="repeat">
+      <a:schemeClr val="accent2"/>
+    </dgm:linClrLst>
+    <dgm:effectClrLst/>
+    <dgm:txLinClrLst/>
+    <dgm:txFillClrLst meth="repeat">
+      <a:schemeClr val="dk1"/>
+    </dgm:txFillClrLst>
+    <dgm:txEffectClrLst/>
+  </dgm:styleLbl>
+  <dgm:styleLbl name="trAlignAcc1">
+    <dgm:fillClrLst meth="repeat">
+      <a:schemeClr val="accent2">
+        <a:alpha val="40000"/>
+        <a:tint val="40000"/>
+      </a:schemeClr>
+    </dgm:fillClrLst>
+    <dgm:linClrLst meth="repeat">
+      <a:schemeClr val="accent2"/>
+    </dgm:linClrLst>
+    <dgm:effectClrLst/>
+    <dgm:txLinClrLst/>
+    <dgm:txFillClrLst meth="repeat">
+      <a:schemeClr val="dk1"/>
+    </dgm:txFillClrLst>
+    <dgm:txEffectClrLst/>
+  </dgm:styleLbl>
+  <dgm:styleLbl name="bgAcc1">
+    <dgm:fillClrLst meth="repeat">
+      <a:schemeClr val="accent2">
+        <a:alpha val="90000"/>
+        <a:tint val="40000"/>
+      </a:schemeClr>
+    </dgm:fillClrLst>
+    <dgm:linClrLst meth="repeat">
+      <a:schemeClr val="accent2"/>
+    </dgm:linClrLst>
+    <dgm:effectClrLst/>
+    <dgm:txLinClrLst/>
+    <dgm:txFillClrLst meth="repeat">
+      <a:schemeClr val="dk1"/>
+    </dgm:txFillClrLst>
+    <dgm:txEffectClrLst/>
+  </dgm:styleLbl>
+  <dgm:styleLbl name="solidFgAcc1">
+    <dgm:fillClrLst meth="repeat">
+      <a:schemeClr val="lt1"/>
+    </dgm:fillClrLst>
+    <dgm:linClrLst meth="repeat">
+      <a:schemeClr val="accent2"/>
+    </dgm:linClrLst>
+    <dgm:effectClrLst/>
+    <dgm:txLinClrLst/>
+    <dgm:txFillClrLst meth="repeat">
+      <a:schemeClr val="dk1"/>
+    </dgm:txFillClrLst>
+    <dgm:txEffectClrLst/>
+  </dgm:styleLbl>
+  <dgm:styleLbl name="solidAlignAcc1">
+    <dgm:fillClrLst meth="repeat">
+      <a:schemeClr val="lt1"/>
+    </dgm:fillClrLst>
+    <dgm:linClrLst meth="repeat">
+      <a:schemeClr val="accent2"/>
+    </dgm:linClrLst>
+    <dgm:effectClrLst/>
+    <dgm:txLinClrLst/>
+    <dgm:txFillClrLst meth="repeat">
+      <a:schemeClr val="dk1"/>
+    </dgm:txFillClrLst>
+    <dgm:txEffectClrLst/>
+  </dgm:styleLbl>
+  <dgm:styleLbl name="solidBgAcc1">
+    <dgm:fillClrLst meth="repeat">
+      <a:schemeClr val="lt1"/>
+    </dgm:fillClrLst>
+    <dgm:linClrLst meth="repeat">
+      <a:schemeClr val="accent2"/>
+    </dgm:linClrLst>
+    <dgm:effectClrLst/>
+    <dgm:txLinClrLst/>
+    <dgm:txFillClrLst meth="repeat">
+      <a:schemeClr val="dk1"/>
+    </dgm:txFillClrLst>
+    <dgm:txEffectClrLst/>
+  </dgm:styleLbl>
+  <dgm:styleLbl name="fgAccFollowNode1">
+    <dgm:fillClrLst meth="repeat">
+      <a:schemeClr val="lt1">
+        <a:alpha val="90000"/>
+        <a:tint val="40000"/>
+      </a:schemeClr>
+    </dgm:fillClrLst>
+    <dgm:linClrLst meth="repeat">
+      <a:schemeClr val="accent2">
+        <a:alpha val="90000"/>
+      </a:schemeClr>
+    </dgm:linClrLst>
+    <dgm:effectClrLst/>
+    <dgm:txLinClrLst/>
+    <dgm:txFillClrLst meth="repeat">
+      <a:schemeClr val="dk1"/>
+    </dgm:txFillClrLst>
+    <dgm:txEffectClrLst/>
+  </dgm:styleLbl>
+  <dgm:styleLbl name="alignAccFollowNode1">
+    <dgm:fillClrLst meth="repeat">
+      <a:schemeClr val="lt1">
+        <a:alpha val="90000"/>
+        <a:tint val="40000"/>
+      </a:schemeClr>
+    </dgm:fillClrLst>
+    <dgm:linClrLst meth="repeat">
+      <a:schemeClr val="accent2">
+        <a:alpha val="90000"/>
+      </a:schemeClr>
+    </dgm:linClrLst>
+    <dgm:effectClrLst/>
+    <dgm:txLinClrLst/>
+    <dgm:txFillClrLst meth="repeat">
+      <a:schemeClr val="dk1"/>
+    </dgm:txFillClrLst>
+    <dgm:txEffectClrLst/>
+  </dgm:styleLbl>
+  <dgm:styleLbl name="bgAccFollowNode1">
+    <dgm:fillClrLst meth="repeat">
+      <a:schemeClr val="lt1">
+        <a:alpha val="90000"/>
+        <a:tint val="40000"/>
+      </a:schemeClr>
+    </dgm:fillClrLst>
+    <dgm:linClrLst meth="repeat">
+      <a:schemeClr val="accent2">
+        <a:alpha val="90000"/>
+      </a:schemeClr>
+    </dgm:linClrLst>
+    <dgm:effectClrLst/>
+    <dgm:txLinClrLst/>
+    <dgm:txFillClrLst meth="repeat">
+      <a:schemeClr val="dk1"/>
+    </dgm:txFillClrLst>
+    <dgm:txEffectClrLst/>
+  </dgm:styleLbl>
+  <dgm:styleLbl name="fgAcc0">
+    <dgm:fillClrLst meth="repeat">
+      <a:schemeClr val="accent2">
+        <a:alpha val="90000"/>
+        <a:tint val="40000"/>
+      </a:schemeClr>
+    </dgm:fillClrLst>
+    <dgm:linClrLst meth="repeat">
+      <a:schemeClr val="accent2"/>
+    </dgm:linClrLst>
+    <dgm:effectClrLst/>
+    <dgm:txLinClrLst/>
+    <dgm:txFillClrLst meth="repeat">
+      <a:schemeClr val="dk1"/>
+    </dgm:txFillClrLst>
+    <dgm:txEffectClrLst/>
+  </dgm:styleLbl>
+  <dgm:styleLbl name="fgAcc2">
+    <dgm:fillClrLst meth="repeat">
+      <a:schemeClr val="accent2">
+        <a:alpha val="90000"/>
+        <a:tint val="40000"/>
+      </a:schemeClr>
+    </dgm:fillClrLst>
+    <dgm:linClrLst meth="repeat">
+      <a:schemeClr val="accent2"/>
+    </dgm:linClrLst>
+    <dgm:effectClrLst/>
+    <dgm:txLinClrLst/>
+    <dgm:txFillClrLst meth="repeat">
+      <a:schemeClr val="dk1"/>
+    </dgm:txFillClrLst>
+    <dgm:txEffectClrLst/>
+  </dgm:styleLbl>
+  <dgm:styleLbl name="fgAcc3">
+    <dgm:fillClrLst meth="repeat">
+      <a:schemeClr val="accent2">
+        <a:alpha val="90000"/>
+        <a:tint val="40000"/>
+      </a:schemeClr>
+    </dgm:fillClrLst>
+    <dgm:linClrLst meth="repeat">
+      <a:schemeClr val="accent2"/>
+    </dgm:linClrLst>
+    <dgm:effectClrLst/>
+    <dgm:txLinClrLst/>
+    <dgm:txFillClrLst meth="repeat">
+      <a:schemeClr val="dk1"/>
+    </dgm:txFillClrLst>
+    <dgm:txEffectClrLst/>
+  </dgm:styleLbl>
+  <dgm:styleLbl name="fgAcc4">
+    <dgm:fillClrLst meth="repeat">
+      <a:schemeClr val="accent2">
+        <a:alpha val="90000"/>
+        <a:tint val="40000"/>
+      </a:schemeClr>
+    </dgm:fillClrLst>
+    <dgm:linClrLst meth="repeat">
+      <a:schemeClr val="accent2"/>
+    </dgm:linClrLst>
+    <dgm:effectClrLst/>
+    <dgm:txLinClrLst/>
+    <dgm:txFillClrLst meth="repeat">
+      <a:schemeClr val="dk1"/>
+    </dgm:txFillClrLst>
+    <dgm:txEffectClrLst/>
+  </dgm:styleLbl>
+  <dgm:styleLbl name="bgShp">
+    <dgm:fillClrLst meth="repeat">
+      <a:schemeClr val="accent2">
+        <a:tint val="40000"/>
+      </a:schemeClr>
+    </dgm:fillClrLst>
+    <dgm:linClrLst meth="repeat">
+      <a:schemeClr val="accent2"/>
+    </dgm:linClrLst>
+    <dgm:effectClrLst/>
+    <dgm:txLinClrLst/>
+    <dgm:txFillClrLst meth="repeat">
+      <a:schemeClr val="dk1"/>
+    </dgm:txFillClrLst>
+    <dgm:txEffectClrLst/>
+  </dgm:styleLbl>
+  <dgm:styleLbl name="dkBgShp">
+    <dgm:fillClrLst meth="repeat">
+      <a:schemeClr val="accent2">
+        <a:shade val="80000"/>
+      </a:schemeClr>
+    </dgm:fillClrLst>
+    <dgm:linClrLst meth="repeat">
+      <a:schemeClr val="accent2"/>
+    </dgm:linClrLst>
+    <dgm:effectClrLst/>
+    <dgm:txLinClrLst/>
+    <dgm:txFillClrLst meth="repeat">
+      <a:schemeClr val="lt1"/>
+    </dgm:txFillClrLst>
+    <dgm:txEffectClrLst/>
+  </dgm:styleLbl>
+  <dgm:styleLbl name="trBgShp">
+    <dgm:fillClrLst meth="repeat">
+      <a:schemeClr val="accent2">
+        <a:tint val="50000"/>
+        <a:alpha val="40000"/>
+      </a:schemeClr>
+    </dgm:fillClrLst>
+    <dgm:linClrLst meth="repeat">
+      <a:schemeClr val="accent2"/>
+    </dgm:linClrLst>
+    <dgm:effectClrLst/>
+    <dgm:txLinClrLst/>
+    <dgm:txFillClrLst meth="repeat">
+      <a:schemeClr val="lt1"/>
+    </dgm:txFillClrLst>
+    <dgm:txEffectClrLst/>
+  </dgm:styleLbl>
+  <dgm:styleLbl name="fgShp">
+    <dgm:fillClrLst meth="repeat">
+      <a:schemeClr val="accent2">
+        <a:tint val="60000"/>
+      </a:schemeClr>
+    </dgm:fillClrLst>
+    <dgm:linClrLst meth="repeat">
+      <a:schemeClr val="lt1"/>
+    </dgm:linClrLst>
+    <dgm:effectClrLst/>
+    <dgm:txLinClrLst/>
+    <dgm:txFillClrLst meth="repeat">
+      <a:schemeClr val="dk1"/>
+    </dgm:txFillClrLst>
+    <dgm:txEffectClrLst/>
+  </dgm:styleLbl>
+  <dgm:styleLbl name="revTx">
+    <dgm:fillClrLst meth="repeat">
+      <a:schemeClr val="lt1">
+        <a:alpha val="0"/>
+      </a:schemeClr>
+    </dgm:fillClrLst>
+    <dgm:linClrLst meth="repeat">
+      <a:schemeClr val="dk1">
+        <a:alpha val="0"/>
+      </a:schemeClr>
+    </dgm:linClrLst>
+    <dgm:effectClrLst/>
+    <dgm:txLinClrLst/>
+    <dgm:txFillClrLst meth="repeat">
+      <a:schemeClr val="tx1"/>
+    </dgm:txFillClrLst>
+    <dgm:txEffectClrLst/>
+  </dgm:styleLbl>
+</dgm:colorsDef>
+</file>
+
+<file path=ppt/diagrams/data1.xml><?xml version="1.0" encoding="utf-8"?>
+<dgm:dataModel xmlns:dgm="http://schemas.openxmlformats.org/drawingml/2006/diagram" xmlns:a="http://schemas.openxmlformats.org/drawingml/2006/main">
+  <dgm:ptLst>
+    <dgm:pt modelId="{A534EB3D-2129-42E3-8314-9E978BEBD610}" type="doc">
+      <dgm:prSet loTypeId="urn:microsoft.com/office/officeart/2005/8/layout/chevron1" loCatId="process" qsTypeId="urn:microsoft.com/office/officeart/2005/8/quickstyle/simple2" qsCatId="simple" csTypeId="urn:microsoft.com/office/officeart/2005/8/colors/accent2_1" csCatId="accent2" phldr="1"/>
+      <dgm:spPr/>
+    </dgm:pt>
+    <dgm:pt modelId="{2838BFAF-75F4-4AEC-9DFE-4D98FE8D6623}">
+      <dgm:prSet phldrT="[Text]"/>
+      <dgm:spPr/>
+      <dgm:t>
+        <a:bodyPr/>
+        <a:lstStyle/>
+        <a:p>
+          <a:r>
+            <a:rPr lang="en-US"/>
+            <a:t>May 28 2013: added Basic GUI</a:t>
+          </a:r>
+        </a:p>
+      </dgm:t>
+    </dgm:pt>
+    <dgm:pt modelId="{676E0993-904E-4A63-A630-20B055AD641E}" type="parTrans" cxnId="{A6BE473F-9EEE-487B-B84A-95C3358BFFF2}">
+      <dgm:prSet/>
+      <dgm:spPr/>
+      <dgm:t>
+        <a:bodyPr/>
+        <a:lstStyle/>
+        <a:p>
+          <a:endParaRPr lang="en-US"/>
+        </a:p>
+      </dgm:t>
+    </dgm:pt>
+    <dgm:pt modelId="{F748B180-38F6-4391-9D33-A5D6045642D4}" type="sibTrans" cxnId="{A6BE473F-9EEE-487B-B84A-95C3358BFFF2}">
+      <dgm:prSet/>
+      <dgm:spPr/>
+      <dgm:t>
+        <a:bodyPr/>
+        <a:lstStyle/>
+        <a:p>
+          <a:endParaRPr lang="en-US"/>
+        </a:p>
+      </dgm:t>
+    </dgm:pt>
+    <dgm:pt modelId="{6E8FBBC6-F53C-4A3A-B36E-6DE3434A9D64}">
+      <dgm:prSet phldrT="[Text]"/>
+      <dgm:spPr/>
+      <dgm:t>
+        <a:bodyPr/>
+        <a:lstStyle/>
+        <a:p>
+          <a:r>
+            <a:rPr lang="en-US"/>
+            <a:t>June 11: added phone calendar in app</a:t>
+          </a:r>
+        </a:p>
+      </dgm:t>
+    </dgm:pt>
+    <dgm:pt modelId="{C7CF43CB-FB5F-466B-9D38-DACA1F98C512}" type="parTrans" cxnId="{9262260D-8172-45F9-B821-926D0C58776B}">
+      <dgm:prSet/>
+      <dgm:spPr/>
+      <dgm:t>
+        <a:bodyPr/>
+        <a:lstStyle/>
+        <a:p>
+          <a:endParaRPr lang="en-US"/>
+        </a:p>
+      </dgm:t>
+    </dgm:pt>
+    <dgm:pt modelId="{EF78343D-8D72-461C-ACD7-97715B859967}" type="sibTrans" cxnId="{9262260D-8172-45F9-B821-926D0C58776B}">
+      <dgm:prSet/>
+      <dgm:spPr/>
+      <dgm:t>
+        <a:bodyPr/>
+        <a:lstStyle/>
+        <a:p>
+          <a:endParaRPr lang="en-US"/>
+        </a:p>
+      </dgm:t>
+    </dgm:pt>
+    <dgm:pt modelId="{AD663DE4-A230-4099-8096-E51904E0EE7C}">
+      <dgm:prSet phldrT="[Text]"/>
+      <dgm:spPr/>
+      <dgm:t>
+        <a:bodyPr/>
+        <a:lstStyle/>
+        <a:p>
+          <a:r>
+            <a:rPr lang="en-US"/>
+            <a:t>June 25: Able to Add Event without user prompting</a:t>
+          </a:r>
+        </a:p>
+      </dgm:t>
+    </dgm:pt>
+    <dgm:pt modelId="{5330670D-366F-410C-A3CD-A78D21FE9C8E}" type="parTrans" cxnId="{4EF33B1C-96DF-4CDA-B8F7-D4AD60DEF7E7}">
+      <dgm:prSet/>
+      <dgm:spPr/>
+      <dgm:t>
+        <a:bodyPr/>
+        <a:lstStyle/>
+        <a:p>
+          <a:endParaRPr lang="en-US"/>
+        </a:p>
+      </dgm:t>
+    </dgm:pt>
+    <dgm:pt modelId="{FDD1B1AF-03B4-426A-B7F6-80164B66567B}" type="sibTrans" cxnId="{4EF33B1C-96DF-4CDA-B8F7-D4AD60DEF7E7}">
+      <dgm:prSet/>
+      <dgm:spPr/>
+      <dgm:t>
+        <a:bodyPr/>
+        <a:lstStyle/>
+        <a:p>
+          <a:endParaRPr lang="en-US"/>
+        </a:p>
+      </dgm:t>
+    </dgm:pt>
+    <dgm:pt modelId="{5246842F-3E00-4E21-9571-E87756375A5C}">
+      <dgm:prSet phldrT="[Text]"/>
+      <dgm:spPr/>
+      <dgm:t>
+        <a:bodyPr/>
+        <a:lstStyle/>
+        <a:p>
+          <a:r>
+            <a:rPr lang="en-US"/>
+            <a:t>Early July: User is able to login using UC credentials</a:t>
+          </a:r>
+        </a:p>
+      </dgm:t>
+    </dgm:pt>
+    <dgm:pt modelId="{267C1D28-EC05-473C-839E-5EACDA20CF69}" type="parTrans" cxnId="{B644D726-028A-46F2-A361-F0A93B4598A9}">
+      <dgm:prSet/>
+      <dgm:spPr/>
+      <dgm:t>
+        <a:bodyPr/>
+        <a:lstStyle/>
+        <a:p>
+          <a:endParaRPr lang="en-US"/>
+        </a:p>
+      </dgm:t>
+    </dgm:pt>
+    <dgm:pt modelId="{A72DA734-1422-4C2F-B5EB-10734F98AD9D}" type="sibTrans" cxnId="{B644D726-028A-46F2-A361-F0A93B4598A9}">
+      <dgm:prSet/>
+      <dgm:spPr/>
+      <dgm:t>
+        <a:bodyPr/>
+        <a:lstStyle/>
+        <a:p>
+          <a:endParaRPr lang="en-US"/>
+        </a:p>
+      </dgm:t>
+    </dgm:pt>
+    <dgm:pt modelId="{2FF714C8-E81D-4348-95F5-F674DB1D8776}">
+      <dgm:prSet phldrT="[Text]"/>
+      <dgm:spPr/>
+      <dgm:t>
+        <a:bodyPr/>
+        <a:lstStyle/>
+        <a:p>
+          <a:r>
+            <a:rPr lang="en-US"/>
+            <a:t>Mid July: User is able to download their schedule into their phone</a:t>
+          </a:r>
+        </a:p>
+      </dgm:t>
+    </dgm:pt>
+    <dgm:pt modelId="{CDFF096F-497B-4A94-8CDE-E7EE3DAD7C9D}" type="parTrans" cxnId="{EF04E71F-D60E-4F5A-A9CE-9415036C8E81}">
+      <dgm:prSet/>
+      <dgm:spPr/>
+      <dgm:t>
+        <a:bodyPr/>
+        <a:lstStyle/>
+        <a:p>
+          <a:endParaRPr lang="en-US"/>
+        </a:p>
+      </dgm:t>
+    </dgm:pt>
+    <dgm:pt modelId="{0FE08777-DD97-45C3-A3C7-480AD17AFE66}" type="sibTrans" cxnId="{EF04E71F-D60E-4F5A-A9CE-9415036C8E81}">
+      <dgm:prSet/>
+      <dgm:spPr/>
+      <dgm:t>
+        <a:bodyPr/>
+        <a:lstStyle/>
+        <a:p>
+          <a:endParaRPr lang="en-US"/>
+        </a:p>
+      </dgm:t>
+    </dgm:pt>
+    <dgm:pt modelId="{BE973D81-101D-464C-A587-CAEE6370FAFC}">
+      <dgm:prSet phldrT="[Text]"/>
+      <dgm:spPr/>
+      <dgm:t>
+        <a:bodyPr/>
+        <a:lstStyle/>
+        <a:p>
+          <a:r>
+            <a:rPr lang="en-US"/>
+            <a:t>Late Mid July: User is able to edit events using custom fields</a:t>
+          </a:r>
+        </a:p>
+      </dgm:t>
+    </dgm:pt>
+    <dgm:pt modelId="{0AB13CF0-F2AA-47DA-8B94-160C75D20983}" type="parTrans" cxnId="{94872905-CE28-47D3-945E-31C2D1A24166}">
+      <dgm:prSet/>
+      <dgm:spPr/>
+      <dgm:t>
+        <a:bodyPr/>
+        <a:lstStyle/>
+        <a:p>
+          <a:endParaRPr lang="en-US"/>
+        </a:p>
+      </dgm:t>
+    </dgm:pt>
+    <dgm:pt modelId="{66815BA7-9373-4B3A-99C1-A095CF1C6066}" type="sibTrans" cxnId="{94872905-CE28-47D3-945E-31C2D1A24166}">
+      <dgm:prSet/>
+      <dgm:spPr/>
+      <dgm:t>
+        <a:bodyPr/>
+        <a:lstStyle/>
+        <a:p>
+          <a:endParaRPr lang="en-US"/>
+        </a:p>
+      </dgm:t>
+    </dgm:pt>
+    <dgm:pt modelId="{4F72C680-B240-44BA-8B39-636761DE1146}" type="pres">
+      <dgm:prSet presAssocID="{A534EB3D-2129-42E3-8314-9E978BEBD610}" presName="Name0" presStyleCnt="0">
+        <dgm:presLayoutVars>
+          <dgm:dir/>
+          <dgm:animLvl val="lvl"/>
+          <dgm:resizeHandles val="exact"/>
+        </dgm:presLayoutVars>
+      </dgm:prSet>
+      <dgm:spPr/>
+    </dgm:pt>
+    <dgm:pt modelId="{ED1F802A-EC6B-4AD1-9BC2-604DD1228609}" type="pres">
+      <dgm:prSet presAssocID="{2838BFAF-75F4-4AEC-9DFE-4D98FE8D6623}" presName="parTxOnly" presStyleLbl="node1" presStyleIdx="0" presStyleCnt="6">
+        <dgm:presLayoutVars>
+          <dgm:chMax val="0"/>
+          <dgm:chPref val="0"/>
+          <dgm:bulletEnabled val="1"/>
+        </dgm:presLayoutVars>
+      </dgm:prSet>
+      <dgm:spPr/>
+      <dgm:t>
+        <a:bodyPr/>
+        <a:lstStyle/>
+        <a:p>
+          <a:endParaRPr lang="en-US"/>
+        </a:p>
+      </dgm:t>
+    </dgm:pt>
+    <dgm:pt modelId="{34C00F64-2B3C-46EB-BE2D-840A47603BD9}" type="pres">
+      <dgm:prSet presAssocID="{F748B180-38F6-4391-9D33-A5D6045642D4}" presName="parTxOnlySpace" presStyleCnt="0"/>
+      <dgm:spPr/>
+    </dgm:pt>
+    <dgm:pt modelId="{89D7D2A4-3543-4390-96AD-7B1196999CE9}" type="pres">
+      <dgm:prSet presAssocID="{6E8FBBC6-F53C-4A3A-B36E-6DE3434A9D64}" presName="parTxOnly" presStyleLbl="node1" presStyleIdx="1" presStyleCnt="6">
+        <dgm:presLayoutVars>
+          <dgm:chMax val="0"/>
+          <dgm:chPref val="0"/>
+          <dgm:bulletEnabled val="1"/>
+        </dgm:presLayoutVars>
+      </dgm:prSet>
+      <dgm:spPr/>
+      <dgm:t>
+        <a:bodyPr/>
+        <a:lstStyle/>
+        <a:p>
+          <a:endParaRPr lang="en-US"/>
+        </a:p>
+      </dgm:t>
+    </dgm:pt>
+    <dgm:pt modelId="{C253AD40-AE05-40D1-AE41-089AD6A4E040}" type="pres">
+      <dgm:prSet presAssocID="{EF78343D-8D72-461C-ACD7-97715B859967}" presName="parTxOnlySpace" presStyleCnt="0"/>
+      <dgm:spPr/>
+    </dgm:pt>
+    <dgm:pt modelId="{72FB49D0-1D16-4101-9E66-ECC4EF9979BB}" type="pres">
+      <dgm:prSet presAssocID="{AD663DE4-A230-4099-8096-E51904E0EE7C}" presName="parTxOnly" presStyleLbl="node1" presStyleIdx="2" presStyleCnt="6" custLinFactNeighborX="2289" custLinFactNeighborY="4405">
+        <dgm:presLayoutVars>
+          <dgm:chMax val="0"/>
+          <dgm:chPref val="0"/>
+          <dgm:bulletEnabled val="1"/>
+        </dgm:presLayoutVars>
+      </dgm:prSet>
+      <dgm:spPr/>
+      <dgm:t>
+        <a:bodyPr/>
+        <a:lstStyle/>
+        <a:p>
+          <a:endParaRPr lang="en-US"/>
+        </a:p>
+      </dgm:t>
+    </dgm:pt>
+    <dgm:pt modelId="{572163E4-079B-4A35-98C2-33E06655B8BB}" type="pres">
+      <dgm:prSet presAssocID="{FDD1B1AF-03B4-426A-B7F6-80164B66567B}" presName="parTxOnlySpace" presStyleCnt="0"/>
+      <dgm:spPr/>
+    </dgm:pt>
+    <dgm:pt modelId="{654D7CDD-D9FD-4374-B274-929656793888}" type="pres">
+      <dgm:prSet presAssocID="{5246842F-3E00-4E21-9571-E87756375A5C}" presName="parTxOnly" presStyleLbl="node1" presStyleIdx="3" presStyleCnt="6">
+        <dgm:presLayoutVars>
+          <dgm:chMax val="0"/>
+          <dgm:chPref val="0"/>
+          <dgm:bulletEnabled val="1"/>
+        </dgm:presLayoutVars>
+      </dgm:prSet>
+      <dgm:spPr/>
+      <dgm:t>
+        <a:bodyPr/>
+        <a:lstStyle/>
+        <a:p>
+          <a:endParaRPr lang="en-US"/>
+        </a:p>
+      </dgm:t>
+    </dgm:pt>
+    <dgm:pt modelId="{1FFA1851-AF1D-417D-A237-8B0C3E8071C8}" type="pres">
+      <dgm:prSet presAssocID="{A72DA734-1422-4C2F-B5EB-10734F98AD9D}" presName="parTxOnlySpace" presStyleCnt="0"/>
+      <dgm:spPr/>
+    </dgm:pt>
+    <dgm:pt modelId="{169ADD05-B2B8-4FC0-91EC-DD3F504552C3}" type="pres">
+      <dgm:prSet presAssocID="{2FF714C8-E81D-4348-95F5-F674DB1D8776}" presName="parTxOnly" presStyleLbl="node1" presStyleIdx="4" presStyleCnt="6">
+        <dgm:presLayoutVars>
+          <dgm:chMax val="0"/>
+          <dgm:chPref val="0"/>
+          <dgm:bulletEnabled val="1"/>
+        </dgm:presLayoutVars>
+      </dgm:prSet>
+      <dgm:spPr/>
+      <dgm:t>
+        <a:bodyPr/>
+        <a:lstStyle/>
+        <a:p>
+          <a:endParaRPr lang="en-US"/>
+        </a:p>
+      </dgm:t>
+    </dgm:pt>
+    <dgm:pt modelId="{1B890ACE-30E0-4440-8E8C-AF8E7E7BA999}" type="pres">
+      <dgm:prSet presAssocID="{0FE08777-DD97-45C3-A3C7-480AD17AFE66}" presName="parTxOnlySpace" presStyleCnt="0"/>
+      <dgm:spPr/>
+    </dgm:pt>
+    <dgm:pt modelId="{AEE062A1-1F6A-49D0-AF3B-9CA86DD5B7A2}" type="pres">
+      <dgm:prSet presAssocID="{BE973D81-101D-464C-A587-CAEE6370FAFC}" presName="parTxOnly" presStyleLbl="node1" presStyleIdx="5" presStyleCnt="6">
+        <dgm:presLayoutVars>
+          <dgm:chMax val="0"/>
+          <dgm:chPref val="0"/>
+          <dgm:bulletEnabled val="1"/>
+        </dgm:presLayoutVars>
+      </dgm:prSet>
+      <dgm:spPr/>
+      <dgm:t>
+        <a:bodyPr/>
+        <a:lstStyle/>
+        <a:p>
+          <a:endParaRPr lang="en-US"/>
+        </a:p>
+      </dgm:t>
+    </dgm:pt>
+  </dgm:ptLst>
+  <dgm:cxnLst>
+    <dgm:cxn modelId="{40B18071-9C83-4AFA-B20C-CD359074B9D7}" type="presOf" srcId="{A534EB3D-2129-42E3-8314-9E978BEBD610}" destId="{4F72C680-B240-44BA-8B39-636761DE1146}" srcOrd="0" destOrd="0" presId="urn:microsoft.com/office/officeart/2005/8/layout/chevron1"/>
+    <dgm:cxn modelId="{795EFE5D-9543-452F-8031-E62AC578FA7A}" type="presOf" srcId="{BE973D81-101D-464C-A587-CAEE6370FAFC}" destId="{AEE062A1-1F6A-49D0-AF3B-9CA86DD5B7A2}" srcOrd="0" destOrd="0" presId="urn:microsoft.com/office/officeart/2005/8/layout/chevron1"/>
+    <dgm:cxn modelId="{48C4B0B4-E3C3-415F-B5A8-2FEC8D0D8F3D}" type="presOf" srcId="{5246842F-3E00-4E21-9571-E87756375A5C}" destId="{654D7CDD-D9FD-4374-B274-929656793888}" srcOrd="0" destOrd="0" presId="urn:microsoft.com/office/officeart/2005/8/layout/chevron1"/>
+    <dgm:cxn modelId="{94872905-CE28-47D3-945E-31C2D1A24166}" srcId="{A534EB3D-2129-42E3-8314-9E978BEBD610}" destId="{BE973D81-101D-464C-A587-CAEE6370FAFC}" srcOrd="5" destOrd="0" parTransId="{0AB13CF0-F2AA-47DA-8B94-160C75D20983}" sibTransId="{66815BA7-9373-4B3A-99C1-A095CF1C6066}"/>
+    <dgm:cxn modelId="{A6BE473F-9EEE-487B-B84A-95C3358BFFF2}" srcId="{A534EB3D-2129-42E3-8314-9E978BEBD610}" destId="{2838BFAF-75F4-4AEC-9DFE-4D98FE8D6623}" srcOrd="0" destOrd="0" parTransId="{676E0993-904E-4A63-A630-20B055AD641E}" sibTransId="{F748B180-38F6-4391-9D33-A5D6045642D4}"/>
+    <dgm:cxn modelId="{9262260D-8172-45F9-B821-926D0C58776B}" srcId="{A534EB3D-2129-42E3-8314-9E978BEBD610}" destId="{6E8FBBC6-F53C-4A3A-B36E-6DE3434A9D64}" srcOrd="1" destOrd="0" parTransId="{C7CF43CB-FB5F-466B-9D38-DACA1F98C512}" sibTransId="{EF78343D-8D72-461C-ACD7-97715B859967}"/>
+    <dgm:cxn modelId="{4EF33B1C-96DF-4CDA-B8F7-D4AD60DEF7E7}" srcId="{A534EB3D-2129-42E3-8314-9E978BEBD610}" destId="{AD663DE4-A230-4099-8096-E51904E0EE7C}" srcOrd="2" destOrd="0" parTransId="{5330670D-366F-410C-A3CD-A78D21FE9C8E}" sibTransId="{FDD1B1AF-03B4-426A-B7F6-80164B66567B}"/>
+    <dgm:cxn modelId="{EF04E71F-D60E-4F5A-A9CE-9415036C8E81}" srcId="{A534EB3D-2129-42E3-8314-9E978BEBD610}" destId="{2FF714C8-E81D-4348-95F5-F674DB1D8776}" srcOrd="4" destOrd="0" parTransId="{CDFF096F-497B-4A94-8CDE-E7EE3DAD7C9D}" sibTransId="{0FE08777-DD97-45C3-A3C7-480AD17AFE66}"/>
+    <dgm:cxn modelId="{BDFF53D4-3B4F-46D4-ADBE-E3595F7BC775}" type="presOf" srcId="{2838BFAF-75F4-4AEC-9DFE-4D98FE8D6623}" destId="{ED1F802A-EC6B-4AD1-9BC2-604DD1228609}" srcOrd="0" destOrd="0" presId="urn:microsoft.com/office/officeart/2005/8/layout/chevron1"/>
+    <dgm:cxn modelId="{F296CB21-74F3-4204-895E-1249D0659260}" type="presOf" srcId="{2FF714C8-E81D-4348-95F5-F674DB1D8776}" destId="{169ADD05-B2B8-4FC0-91EC-DD3F504552C3}" srcOrd="0" destOrd="0" presId="urn:microsoft.com/office/officeart/2005/8/layout/chevron1"/>
+    <dgm:cxn modelId="{31C37766-EF06-4B7F-B6A6-35C05B04F9AA}" type="presOf" srcId="{6E8FBBC6-F53C-4A3A-B36E-6DE3434A9D64}" destId="{89D7D2A4-3543-4390-96AD-7B1196999CE9}" srcOrd="0" destOrd="0" presId="urn:microsoft.com/office/officeart/2005/8/layout/chevron1"/>
+    <dgm:cxn modelId="{1A3C9592-1491-4A50-9095-7AAB29D25C0B}" type="presOf" srcId="{AD663DE4-A230-4099-8096-E51904E0EE7C}" destId="{72FB49D0-1D16-4101-9E66-ECC4EF9979BB}" srcOrd="0" destOrd="0" presId="urn:microsoft.com/office/officeart/2005/8/layout/chevron1"/>
+    <dgm:cxn modelId="{B644D726-028A-46F2-A361-F0A93B4598A9}" srcId="{A534EB3D-2129-42E3-8314-9E978BEBD610}" destId="{5246842F-3E00-4E21-9571-E87756375A5C}" srcOrd="3" destOrd="0" parTransId="{267C1D28-EC05-473C-839E-5EACDA20CF69}" sibTransId="{A72DA734-1422-4C2F-B5EB-10734F98AD9D}"/>
+    <dgm:cxn modelId="{836B7EB8-07F6-4F32-811B-515E016C53BD}" type="presParOf" srcId="{4F72C680-B240-44BA-8B39-636761DE1146}" destId="{ED1F802A-EC6B-4AD1-9BC2-604DD1228609}" srcOrd="0" destOrd="0" presId="urn:microsoft.com/office/officeart/2005/8/layout/chevron1"/>
+    <dgm:cxn modelId="{F2C51A07-4742-41DF-A78E-1A838306EC10}" type="presParOf" srcId="{4F72C680-B240-44BA-8B39-636761DE1146}" destId="{34C00F64-2B3C-46EB-BE2D-840A47603BD9}" srcOrd="1" destOrd="0" presId="urn:microsoft.com/office/officeart/2005/8/layout/chevron1"/>
+    <dgm:cxn modelId="{D10C45F9-8F72-4C8F-9C50-50E5DB5F85EB}" type="presParOf" srcId="{4F72C680-B240-44BA-8B39-636761DE1146}" destId="{89D7D2A4-3543-4390-96AD-7B1196999CE9}" srcOrd="2" destOrd="0" presId="urn:microsoft.com/office/officeart/2005/8/layout/chevron1"/>
+    <dgm:cxn modelId="{DA23056C-1D50-4D5E-9C59-C8C40F0110C9}" type="presParOf" srcId="{4F72C680-B240-44BA-8B39-636761DE1146}" destId="{C253AD40-AE05-40D1-AE41-089AD6A4E040}" srcOrd="3" destOrd="0" presId="urn:microsoft.com/office/officeart/2005/8/layout/chevron1"/>
+    <dgm:cxn modelId="{9527CCAE-5485-4E6E-9F29-FA29643C873F}" type="presParOf" srcId="{4F72C680-B240-44BA-8B39-636761DE1146}" destId="{72FB49D0-1D16-4101-9E66-ECC4EF9979BB}" srcOrd="4" destOrd="0" presId="urn:microsoft.com/office/officeart/2005/8/layout/chevron1"/>
+    <dgm:cxn modelId="{6589D452-A992-409D-B777-926E814A3247}" type="presParOf" srcId="{4F72C680-B240-44BA-8B39-636761DE1146}" destId="{572163E4-079B-4A35-98C2-33E06655B8BB}" srcOrd="5" destOrd="0" presId="urn:microsoft.com/office/officeart/2005/8/layout/chevron1"/>
+    <dgm:cxn modelId="{74775293-29D9-4397-808F-CA67436F9FED}" type="presParOf" srcId="{4F72C680-B240-44BA-8B39-636761DE1146}" destId="{654D7CDD-D9FD-4374-B274-929656793888}" srcOrd="6" destOrd="0" presId="urn:microsoft.com/office/officeart/2005/8/layout/chevron1"/>
+    <dgm:cxn modelId="{76DCCC08-3F96-4D9A-AEC2-19788CF375B2}" type="presParOf" srcId="{4F72C680-B240-44BA-8B39-636761DE1146}" destId="{1FFA1851-AF1D-417D-A237-8B0C3E8071C8}" srcOrd="7" destOrd="0" presId="urn:microsoft.com/office/officeart/2005/8/layout/chevron1"/>
+    <dgm:cxn modelId="{F06AC0E9-E74C-41C2-8762-E7429DB38BCE}" type="presParOf" srcId="{4F72C680-B240-44BA-8B39-636761DE1146}" destId="{169ADD05-B2B8-4FC0-91EC-DD3F504552C3}" srcOrd="8" destOrd="0" presId="urn:microsoft.com/office/officeart/2005/8/layout/chevron1"/>
+    <dgm:cxn modelId="{07896AAD-6D5D-426A-B684-6CDC2C4CA179}" type="presParOf" srcId="{4F72C680-B240-44BA-8B39-636761DE1146}" destId="{1B890ACE-30E0-4440-8E8C-AF8E7E7BA999}" srcOrd="9" destOrd="0" presId="urn:microsoft.com/office/officeart/2005/8/layout/chevron1"/>
+    <dgm:cxn modelId="{A870CFF7-BAE0-4871-BFA3-B8DC73A08ADC}" type="presParOf" srcId="{4F72C680-B240-44BA-8B39-636761DE1146}" destId="{AEE062A1-1F6A-49D0-AF3B-9CA86DD5B7A2}" srcOrd="10" destOrd="0" presId="urn:microsoft.com/office/officeart/2005/8/layout/chevron1"/>
+  </dgm:cxnLst>
+  <dgm:bg/>
+  <dgm:whole/>
+  <dgm:extLst>
+    <a:ext uri="http://schemas.microsoft.com/office/drawing/2008/diagram">
+      <dsp:dataModelExt xmlns:dsp="http://schemas.microsoft.com/office/drawing/2008/diagram" xmlns="" relId="rId6" minVer="http://schemas.openxmlformats.org/drawingml/2006/diagram"/>
+    </a:ext>
+  </dgm:extLst>
+</dgm:dataModel>
+</file>
+
+<file path=ppt/diagrams/drawing1.xml><?xml version="1.0" encoding="utf-8"?>
+<dsp:drawing xmlns:dgm="http://schemas.openxmlformats.org/drawingml/2006/diagram" xmlns:a="http://schemas.openxmlformats.org/drawingml/2006/main" xmlns:dsp="http://schemas.microsoft.com/office/drawing/2008/diagram">
+  <dsp:spTree>
+    <dsp:nvGrpSpPr>
+      <dsp:cNvPr id="0" name=""/>
+      <dsp:cNvGrpSpPr/>
+    </dsp:nvGrpSpPr>
+    <dsp:grpSpPr/>
+    <dsp:sp modelId="{ED1F802A-EC6B-4AD1-9BC2-604DD1228609}">
+      <dsp:nvSpPr>
+        <dsp:cNvPr id="0" name=""/>
+        <dsp:cNvSpPr/>
+      </dsp:nvSpPr>
+      <dsp:spPr>
+        <a:xfrm>
+          <a:off x="4018" y="1964015"/>
+          <a:ext cx="1494829" cy="597931"/>
+        </a:xfrm>
+        <a:prstGeom prst="chevron">
+          <a:avLst/>
+        </a:prstGeom>
+        <a:solidFill>
+          <a:schemeClr val="lt1">
+            <a:hueOff val="0"/>
+            <a:satOff val="0"/>
+            <a:lumOff val="0"/>
+            <a:alphaOff val="0"/>
+          </a:schemeClr>
+        </a:solidFill>
+        <a:ln w="38100" cap="flat" cmpd="sng" algn="ctr">
+          <a:solidFill>
+            <a:schemeClr val="accent2">
+              <a:shade val="80000"/>
+              <a:hueOff val="0"/>
+              <a:satOff val="0"/>
+              <a:lumOff val="0"/>
+              <a:alphaOff val="0"/>
+            </a:schemeClr>
+          </a:solidFill>
+          <a:prstDash val="solid"/>
+        </a:ln>
+        <a:effectLst>
+          <a:outerShdw blurRad="40000" dist="20000" dir="5400000" rotWithShape="0">
+            <a:srgbClr val="000000">
+              <a:alpha val="38000"/>
+            </a:srgbClr>
+          </a:outerShdw>
+        </a:effectLst>
+      </dsp:spPr>
+      <dsp:style>
+        <a:lnRef idx="3">
+          <a:scrgbClr r="0" g="0" b="0"/>
+        </a:lnRef>
+        <a:fillRef idx="1">
+          <a:scrgbClr r="0" g="0" b="0"/>
+        </a:fillRef>
+        <a:effectRef idx="1">
+          <a:scrgbClr r="0" g="0" b="0"/>
+        </a:effectRef>
+        <a:fontRef idx="minor">
+          <a:schemeClr val="lt1"/>
+        </a:fontRef>
+      </dsp:style>
+      <dsp:txBody>
+        <a:bodyPr spcFirstLastPara="0" vert="horz" wrap="square" lIns="36005" tIns="12002" rIns="12002" bIns="12002" numCol="1" spcCol="1270" anchor="ctr" anchorCtr="0">
+          <a:noAutofit/>
+        </a:bodyPr>
+        <a:lstStyle/>
+        <a:p>
+          <a:pPr lvl="0" algn="ctr" defTabSz="400050">
+            <a:lnSpc>
+              <a:spcPct val="90000"/>
+            </a:lnSpc>
+            <a:spcBef>
+              <a:spcPct val="0"/>
+            </a:spcBef>
+            <a:spcAft>
+              <a:spcPct val="35000"/>
+            </a:spcAft>
+          </a:pPr>
+          <a:r>
+            <a:rPr lang="en-US" sz="900" kern="1200"/>
+            <a:t>May 28 2013: added Basic GUI</a:t>
+          </a:r>
+        </a:p>
+      </dsp:txBody>
+      <dsp:txXfrm>
+        <a:off x="4018" y="1964015"/>
+        <a:ext cx="1494829" cy="597931"/>
+      </dsp:txXfrm>
+    </dsp:sp>
+    <dsp:sp modelId="{89D7D2A4-3543-4390-96AD-7B1196999CE9}">
+      <dsp:nvSpPr>
+        <dsp:cNvPr id="0" name=""/>
+        <dsp:cNvSpPr/>
+      </dsp:nvSpPr>
+      <dsp:spPr>
+        <a:xfrm>
+          <a:off x="1349365" y="1964015"/>
+          <a:ext cx="1494829" cy="597931"/>
+        </a:xfrm>
+        <a:prstGeom prst="chevron">
+          <a:avLst/>
+        </a:prstGeom>
+        <a:solidFill>
+          <a:schemeClr val="lt1">
+            <a:hueOff val="0"/>
+            <a:satOff val="0"/>
+            <a:lumOff val="0"/>
+            <a:alphaOff val="0"/>
+          </a:schemeClr>
+        </a:solidFill>
+        <a:ln w="38100" cap="flat" cmpd="sng" algn="ctr">
+          <a:solidFill>
+            <a:schemeClr val="accent2">
+              <a:shade val="80000"/>
+              <a:hueOff val="0"/>
+              <a:satOff val="0"/>
+              <a:lumOff val="0"/>
+              <a:alphaOff val="0"/>
+            </a:schemeClr>
+          </a:solidFill>
+          <a:prstDash val="solid"/>
+        </a:ln>
+        <a:effectLst>
+          <a:outerShdw blurRad="40000" dist="20000" dir="5400000" rotWithShape="0">
+            <a:srgbClr val="000000">
+              <a:alpha val="38000"/>
+            </a:srgbClr>
+          </a:outerShdw>
+        </a:effectLst>
+      </dsp:spPr>
+      <dsp:style>
+        <a:lnRef idx="3">
+          <a:scrgbClr r="0" g="0" b="0"/>
+        </a:lnRef>
+        <a:fillRef idx="1">
+          <a:scrgbClr r="0" g="0" b="0"/>
+        </a:fillRef>
+        <a:effectRef idx="1">
+          <a:scrgbClr r="0" g="0" b="0"/>
+        </a:effectRef>
+        <a:fontRef idx="minor">
+          <a:schemeClr val="lt1"/>
+        </a:fontRef>
+      </dsp:style>
+      <dsp:txBody>
+        <a:bodyPr spcFirstLastPara="0" vert="horz" wrap="square" lIns="36005" tIns="12002" rIns="12002" bIns="12002" numCol="1" spcCol="1270" anchor="ctr" anchorCtr="0">
+          <a:noAutofit/>
+        </a:bodyPr>
+        <a:lstStyle/>
+        <a:p>
+          <a:pPr lvl="0" algn="ctr" defTabSz="400050">
+            <a:lnSpc>
+              <a:spcPct val="90000"/>
+            </a:lnSpc>
+            <a:spcBef>
+              <a:spcPct val="0"/>
+            </a:spcBef>
+            <a:spcAft>
+              <a:spcPct val="35000"/>
+            </a:spcAft>
+          </a:pPr>
+          <a:r>
+            <a:rPr lang="en-US" sz="900" kern="1200"/>
+            <a:t>June 11: added phone calendar in app</a:t>
+          </a:r>
+        </a:p>
+      </dsp:txBody>
+      <dsp:txXfrm>
+        <a:off x="1349365" y="1964015"/>
+        <a:ext cx="1494829" cy="597931"/>
+      </dsp:txXfrm>
+    </dsp:sp>
+    <dsp:sp modelId="{72FB49D0-1D16-4101-9E66-ECC4EF9979BB}">
+      <dsp:nvSpPr>
+        <dsp:cNvPr id="0" name=""/>
+        <dsp:cNvSpPr/>
+      </dsp:nvSpPr>
+      <dsp:spPr>
+        <a:xfrm>
+          <a:off x="2698133" y="1990354"/>
+          <a:ext cx="1494829" cy="597931"/>
+        </a:xfrm>
+        <a:prstGeom prst="chevron">
+          <a:avLst/>
+        </a:prstGeom>
+        <a:solidFill>
+          <a:schemeClr val="lt1">
+            <a:hueOff val="0"/>
+            <a:satOff val="0"/>
+            <a:lumOff val="0"/>
+            <a:alphaOff val="0"/>
+          </a:schemeClr>
+        </a:solidFill>
+        <a:ln w="38100" cap="flat" cmpd="sng" algn="ctr">
+          <a:solidFill>
+            <a:schemeClr val="accent2">
+              <a:shade val="80000"/>
+              <a:hueOff val="0"/>
+              <a:satOff val="0"/>
+              <a:lumOff val="0"/>
+              <a:alphaOff val="0"/>
+            </a:schemeClr>
+          </a:solidFill>
+          <a:prstDash val="solid"/>
+        </a:ln>
+        <a:effectLst>
+          <a:outerShdw blurRad="40000" dist="20000" dir="5400000" rotWithShape="0">
+            <a:srgbClr val="000000">
+              <a:alpha val="38000"/>
+            </a:srgbClr>
+          </a:outerShdw>
+        </a:effectLst>
+      </dsp:spPr>
+      <dsp:style>
+        <a:lnRef idx="3">
+          <a:scrgbClr r="0" g="0" b="0"/>
+        </a:lnRef>
+        <a:fillRef idx="1">
+          <a:scrgbClr r="0" g="0" b="0"/>
+        </a:fillRef>
+        <a:effectRef idx="1">
+          <a:scrgbClr r="0" g="0" b="0"/>
+        </a:effectRef>
+        <a:fontRef idx="minor">
+          <a:schemeClr val="lt1"/>
+        </a:fontRef>
+      </dsp:style>
+      <dsp:txBody>
+        <a:bodyPr spcFirstLastPara="0" vert="horz" wrap="square" lIns="36005" tIns="12002" rIns="12002" bIns="12002" numCol="1" spcCol="1270" anchor="ctr" anchorCtr="0">
+          <a:noAutofit/>
+        </a:bodyPr>
+        <a:lstStyle/>
+        <a:p>
+          <a:pPr lvl="0" algn="ctr" defTabSz="400050">
+            <a:lnSpc>
+              <a:spcPct val="90000"/>
+            </a:lnSpc>
+            <a:spcBef>
+              <a:spcPct val="0"/>
+            </a:spcBef>
+            <a:spcAft>
+              <a:spcPct val="35000"/>
+            </a:spcAft>
+          </a:pPr>
+          <a:r>
+            <a:rPr lang="en-US" sz="900" kern="1200"/>
+            <a:t>June 25: Able to Add Event without user prompting</a:t>
+          </a:r>
+        </a:p>
+      </dsp:txBody>
+      <dsp:txXfrm>
+        <a:off x="2698133" y="1990354"/>
+        <a:ext cx="1494829" cy="597931"/>
+      </dsp:txXfrm>
+    </dsp:sp>
+    <dsp:sp modelId="{654D7CDD-D9FD-4374-B274-929656793888}">
+      <dsp:nvSpPr>
+        <dsp:cNvPr id="0" name=""/>
+        <dsp:cNvSpPr/>
+      </dsp:nvSpPr>
+      <dsp:spPr>
+        <a:xfrm>
+          <a:off x="4040058" y="1964015"/>
+          <a:ext cx="1494829" cy="597931"/>
+        </a:xfrm>
+        <a:prstGeom prst="chevron">
+          <a:avLst/>
+        </a:prstGeom>
+        <a:solidFill>
+          <a:schemeClr val="lt1">
+            <a:hueOff val="0"/>
+            <a:satOff val="0"/>
+            <a:lumOff val="0"/>
+            <a:alphaOff val="0"/>
+          </a:schemeClr>
+        </a:solidFill>
+        <a:ln w="38100" cap="flat" cmpd="sng" algn="ctr">
+          <a:solidFill>
+            <a:schemeClr val="accent2">
+              <a:shade val="80000"/>
+              <a:hueOff val="0"/>
+              <a:satOff val="0"/>
+              <a:lumOff val="0"/>
+              <a:alphaOff val="0"/>
+            </a:schemeClr>
+          </a:solidFill>
+          <a:prstDash val="solid"/>
+        </a:ln>
+        <a:effectLst>
+          <a:outerShdw blurRad="40000" dist="20000" dir="5400000" rotWithShape="0">
+            <a:srgbClr val="000000">
+              <a:alpha val="38000"/>
+            </a:srgbClr>
+          </a:outerShdw>
+        </a:effectLst>
+      </dsp:spPr>
+      <dsp:style>
+        <a:lnRef idx="3">
+          <a:scrgbClr r="0" g="0" b="0"/>
+        </a:lnRef>
+        <a:fillRef idx="1">
+          <a:scrgbClr r="0" g="0" b="0"/>
+        </a:fillRef>
+        <a:effectRef idx="1">
+          <a:scrgbClr r="0" g="0" b="0"/>
+        </a:effectRef>
+        <a:fontRef idx="minor">
+          <a:schemeClr val="lt1"/>
+        </a:fontRef>
+      </dsp:style>
+      <dsp:txBody>
+        <a:bodyPr spcFirstLastPara="0" vert="horz" wrap="square" lIns="36005" tIns="12002" rIns="12002" bIns="12002" numCol="1" spcCol="1270" anchor="ctr" anchorCtr="0">
+          <a:noAutofit/>
+        </a:bodyPr>
+        <a:lstStyle/>
+        <a:p>
+          <a:pPr lvl="0" algn="ctr" defTabSz="400050">
+            <a:lnSpc>
+              <a:spcPct val="90000"/>
+            </a:lnSpc>
+            <a:spcBef>
+              <a:spcPct val="0"/>
+            </a:spcBef>
+            <a:spcAft>
+              <a:spcPct val="35000"/>
+            </a:spcAft>
+          </a:pPr>
+          <a:r>
+            <a:rPr lang="en-US" sz="900" kern="1200"/>
+            <a:t>Early July: User is able to login using UC credentials</a:t>
+          </a:r>
+        </a:p>
+      </dsp:txBody>
+      <dsp:txXfrm>
+        <a:off x="4040058" y="1964015"/>
+        <a:ext cx="1494829" cy="597931"/>
+      </dsp:txXfrm>
+    </dsp:sp>
+    <dsp:sp modelId="{169ADD05-B2B8-4FC0-91EC-DD3F504552C3}">
+      <dsp:nvSpPr>
+        <dsp:cNvPr id="0" name=""/>
+        <dsp:cNvSpPr/>
+      </dsp:nvSpPr>
+      <dsp:spPr>
+        <a:xfrm>
+          <a:off x="5385405" y="1964015"/>
+          <a:ext cx="1494829" cy="597931"/>
+        </a:xfrm>
+        <a:prstGeom prst="chevron">
+          <a:avLst/>
+        </a:prstGeom>
+        <a:solidFill>
+          <a:schemeClr val="lt1">
+            <a:hueOff val="0"/>
+            <a:satOff val="0"/>
+            <a:lumOff val="0"/>
+            <a:alphaOff val="0"/>
+          </a:schemeClr>
+        </a:solidFill>
+        <a:ln w="38100" cap="flat" cmpd="sng" algn="ctr">
+          <a:solidFill>
+            <a:schemeClr val="accent2">
+              <a:shade val="80000"/>
+              <a:hueOff val="0"/>
+              <a:satOff val="0"/>
+              <a:lumOff val="0"/>
+              <a:alphaOff val="0"/>
+            </a:schemeClr>
+          </a:solidFill>
+          <a:prstDash val="solid"/>
+        </a:ln>
+        <a:effectLst>
+          <a:outerShdw blurRad="40000" dist="20000" dir="5400000" rotWithShape="0">
+            <a:srgbClr val="000000">
+              <a:alpha val="38000"/>
+            </a:srgbClr>
+          </a:outerShdw>
+        </a:effectLst>
+      </dsp:spPr>
+      <dsp:style>
+        <a:lnRef idx="3">
+          <a:scrgbClr r="0" g="0" b="0"/>
+        </a:lnRef>
+        <a:fillRef idx="1">
+          <a:scrgbClr r="0" g="0" b="0"/>
+        </a:fillRef>
+        <a:effectRef idx="1">
+          <a:scrgbClr r="0" g="0" b="0"/>
+        </a:effectRef>
+        <a:fontRef idx="minor">
+          <a:schemeClr val="lt1"/>
+        </a:fontRef>
+      </dsp:style>
+      <dsp:txBody>
+        <a:bodyPr spcFirstLastPara="0" vert="horz" wrap="square" lIns="36005" tIns="12002" rIns="12002" bIns="12002" numCol="1" spcCol="1270" anchor="ctr" anchorCtr="0">
+          <a:noAutofit/>
+        </a:bodyPr>
+        <a:lstStyle/>
+        <a:p>
+          <a:pPr lvl="0" algn="ctr" defTabSz="400050">
+            <a:lnSpc>
+              <a:spcPct val="90000"/>
+            </a:lnSpc>
+            <a:spcBef>
+              <a:spcPct val="0"/>
+            </a:spcBef>
+            <a:spcAft>
+              <a:spcPct val="35000"/>
+            </a:spcAft>
+          </a:pPr>
+          <a:r>
+            <a:rPr lang="en-US" sz="900" kern="1200"/>
+            <a:t>Mid July: User is able to download their schedule into their phone</a:t>
+          </a:r>
+        </a:p>
+      </dsp:txBody>
+      <dsp:txXfrm>
+        <a:off x="5385405" y="1964015"/>
+        <a:ext cx="1494829" cy="597931"/>
+      </dsp:txXfrm>
+    </dsp:sp>
+    <dsp:sp modelId="{AEE062A1-1F6A-49D0-AF3B-9CA86DD5B7A2}">
+      <dsp:nvSpPr>
+        <dsp:cNvPr id="0" name=""/>
+        <dsp:cNvSpPr/>
+      </dsp:nvSpPr>
+      <dsp:spPr>
+        <a:xfrm>
+          <a:off x="6730751" y="1964015"/>
+          <a:ext cx="1494829" cy="597931"/>
+        </a:xfrm>
+        <a:prstGeom prst="chevron">
+          <a:avLst/>
+        </a:prstGeom>
+        <a:solidFill>
+          <a:schemeClr val="lt1">
+            <a:hueOff val="0"/>
+            <a:satOff val="0"/>
+            <a:lumOff val="0"/>
+            <a:alphaOff val="0"/>
+          </a:schemeClr>
+        </a:solidFill>
+        <a:ln w="38100" cap="flat" cmpd="sng" algn="ctr">
+          <a:solidFill>
+            <a:schemeClr val="accent2">
+              <a:shade val="80000"/>
+              <a:hueOff val="0"/>
+              <a:satOff val="0"/>
+              <a:lumOff val="0"/>
+              <a:alphaOff val="0"/>
+            </a:schemeClr>
+          </a:solidFill>
+          <a:prstDash val="solid"/>
+        </a:ln>
+        <a:effectLst>
+          <a:outerShdw blurRad="40000" dist="20000" dir="5400000" rotWithShape="0">
+            <a:srgbClr val="000000">
+              <a:alpha val="38000"/>
+            </a:srgbClr>
+          </a:outerShdw>
+        </a:effectLst>
+      </dsp:spPr>
+      <dsp:style>
+        <a:lnRef idx="3">
+          <a:scrgbClr r="0" g="0" b="0"/>
+        </a:lnRef>
+        <a:fillRef idx="1">
+          <a:scrgbClr r="0" g="0" b="0"/>
+        </a:fillRef>
+        <a:effectRef idx="1">
+          <a:scrgbClr r="0" g="0" b="0"/>
+        </a:effectRef>
+        <a:fontRef idx="minor">
+          <a:schemeClr val="lt1"/>
+        </a:fontRef>
+      </dsp:style>
+      <dsp:txBody>
+        <a:bodyPr spcFirstLastPara="0" vert="horz" wrap="square" lIns="36005" tIns="12002" rIns="12002" bIns="12002" numCol="1" spcCol="1270" anchor="ctr" anchorCtr="0">
+          <a:noAutofit/>
+        </a:bodyPr>
+        <a:lstStyle/>
+        <a:p>
+          <a:pPr lvl="0" algn="ctr" defTabSz="400050">
+            <a:lnSpc>
+              <a:spcPct val="90000"/>
+            </a:lnSpc>
+            <a:spcBef>
+              <a:spcPct val="0"/>
+            </a:spcBef>
+            <a:spcAft>
+              <a:spcPct val="35000"/>
+            </a:spcAft>
+          </a:pPr>
+          <a:r>
+            <a:rPr lang="en-US" sz="900" kern="1200"/>
+            <a:t>Late Mid July: User is able to edit events using custom fields</a:t>
+          </a:r>
+        </a:p>
+      </dsp:txBody>
+      <dsp:txXfrm>
+        <a:off x="6730751" y="1964015"/>
+        <a:ext cx="1494829" cy="597931"/>
+      </dsp:txXfrm>
+    </dsp:sp>
+  </dsp:spTree>
+</dsp:drawing>
+</file>
+
+<file path=ppt/diagrams/layout1.xml><?xml version="1.0" encoding="utf-8"?>
+<dgm:layoutDef xmlns:dgm="http://schemas.openxmlformats.org/drawingml/2006/diagram" xmlns:a="http://schemas.openxmlformats.org/drawingml/2006/main" uniqueId="urn:microsoft.com/office/officeart/2005/8/layout/chevron1">
+  <dgm:title val=""/>
+  <dgm:desc val=""/>
+  <dgm:catLst>
+    <dgm:cat type="process" pri="9000"/>
+  </dgm:catLst>
+  <dgm:sampData useDef="1">
+    <dgm:dataModel>
+      <dgm:ptLst/>
+      <dgm:bg/>
+      <dgm:whole/>
+    </dgm:dataModel>
+  </dgm:sampData>
+  <dgm:styleData>
+    <dgm:dataModel>
+      <dgm:ptLst>
+        <dgm:pt modelId="0" type="doc"/>
+        <dgm:pt modelId="1"/>
+        <dgm:pt modelId="2"/>
+      </dgm:ptLst>
+      <dgm:cxnLst>
+        <dgm:cxn modelId="3" srcId="0" destId="1" srcOrd="0" destOrd="0"/>
+        <dgm:cxn modelId="4" srcId="0" destId="2" srcOrd="1" destOrd="0"/>
+      </dgm:cxnLst>
+      <dgm:bg/>
+      <dgm:whole/>
+    </dgm:dataModel>
+  </dgm:styleData>
+  <dgm:clrData>
+    <dgm:dataModel>
+      <dgm:ptLst>
+        <dgm:pt modelId="0" type="doc"/>
+        <dgm:pt modelId="1"/>
+        <dgm:pt modelId="2"/>
+        <dgm:pt modelId="3"/>
+        <dgm:pt modelId="4"/>
+      </dgm:ptLst>
+      <dgm:cxnLst>
+        <dgm:cxn modelId="5" srcId="0" destId="1" srcOrd="0" destOrd="0"/>
+        <dgm:cxn modelId="6" srcId="0" destId="2" srcOrd="1" destOrd="0"/>
+        <dgm:cxn modelId="7" srcId="0" destId="3" srcOrd="2" destOrd="0"/>
+        <dgm:cxn modelId="8" srcId="0" destId="4" srcOrd="3" destOrd="0"/>
+      </dgm:cxnLst>
+      <dgm:bg/>
+      <dgm:whole/>
+    </dgm:dataModel>
+  </dgm:clrData>
+  <dgm:layoutNode name="Name0">
+    <dgm:varLst>
+      <dgm:dir/>
+      <dgm:animLvl val="lvl"/>
+      <dgm:resizeHandles val="exact"/>
+    </dgm:varLst>
+    <dgm:choose name="Name1">
+      <dgm:if name="Name2" func="var" arg="dir" op="equ" val="norm">
+        <dgm:alg type="lin"/>
+      </dgm:if>
+      <dgm:else name="Name3">
+        <dgm:alg type="lin">
+          <dgm:param type="linDir" val="fromR"/>
+        </dgm:alg>
+      </dgm:else>
+    </dgm:choose>
+    <dgm:shape xmlns:r="http://schemas.openxmlformats.org/officeDocument/2006/relationships" r:blip="">
+      <dgm:adjLst/>
+    </dgm:shape>
+    <dgm:presOf/>
+    <dgm:choose name="Name4">
+      <dgm:if name="Name5" axis="des" func="maxDepth" op="gte" val="2">
+        <dgm:constrLst>
+          <dgm:constr type="h" for="ch" forName="composite" refType="h"/>
+          <dgm:constr type="w" for="ch" forName="composite" refType="w"/>
+          <dgm:constr type="w" for="des" forName="parTx"/>
+          <dgm:constr type="h" for="des" forName="parTx" op="equ"/>
+          <dgm:constr type="w" for="des" forName="desTx"/>
+          <dgm:constr type="h" for="des" forName="desTx" op="equ"/>
+          <dgm:constr type="primFontSz" for="des" forName="parTx" val="65"/>
+          <dgm:constr type="secFontSz" for="des" forName="desTx" refType="primFontSz" refFor="des" refForName="parTx" op="equ"/>
+          <dgm:constr type="h" for="des" forName="parTx" refType="primFontSz" refFor="des" refForName="parTx" fact="1.5"/>
+          <dgm:constr type="h" for="des" forName="desTx" refType="primFontSz" refFor="des" refForName="parTx" fact="0.5"/>
+          <dgm:constr type="w" for="ch" forName="space" op="equ" val="-6"/>
+        </dgm:constrLst>
+        <dgm:ruleLst>
+          <dgm:rule type="w" for="ch" forName="composite" val="0" fact="NaN" max="NaN"/>
+          <dgm:rule type="primFontSz" for="des" forName="parTx" val="5" fact="NaN" max="NaN"/>
+        </dgm:ruleLst>
+        <dgm:forEach name="Name6" axis="ch" ptType="node">
+          <dgm:layoutNode name="composite">
+            <dgm:alg type="composite"/>
+            <dgm:shape xmlns:r="http://schemas.openxmlformats.org/officeDocument/2006/relationships" r:blip="">
+              <dgm:adjLst/>
+            </dgm:shape>
+            <dgm:presOf/>
+            <dgm:choose name="Name7">
+              <dgm:if name="Name8" func="var" arg="dir" op="equ" val="norm">
+                <dgm:constrLst>
+                  <dgm:constr type="l" for="ch" forName="parTx"/>
+                  <dgm:constr type="w" for="ch" forName="parTx" refType="w"/>
+                  <dgm:constr type="t" for="ch" forName="parTx"/>
+                  <dgm:constr type="l" for="ch" forName="desTx"/>
+                  <dgm:constr type="w" for="ch" forName="desTx" refType="w" refFor="ch" refForName="parTx" fact="0.8"/>
+                  <dgm:constr type="t" for="ch" forName="desTx" refType="h" refFor="ch" refForName="parTx" fact="1.125"/>
+                </dgm:constrLst>
+              </dgm:if>
+              <dgm:else name="Name9">
+                <dgm:constrLst>
+                  <dgm:constr type="l" for="ch" forName="parTx"/>
+                  <dgm:constr type="w" for="ch" forName="parTx" refType="w"/>
+                  <dgm:constr type="t" for="ch" forName="parTx"/>
+                  <dgm:constr type="l" for="ch" forName="desTx" refType="w" fact="0.2"/>
+                  <dgm:constr type="w" for="ch" forName="desTx" refType="w" refFor="ch" refForName="parTx" fact="0.8"/>
+                  <dgm:constr type="t" for="ch" forName="desTx" refType="h" refFor="ch" refForName="parTx" fact="1.125"/>
+                </dgm:constrLst>
+              </dgm:else>
+            </dgm:choose>
+            <dgm:ruleLst>
+              <dgm:rule type="h" val="INF" fact="NaN" max="NaN"/>
+            </dgm:ruleLst>
+            <dgm:layoutNode name="parTx">
+              <dgm:varLst>
+                <dgm:chMax val="0"/>
+                <dgm:chPref val="0"/>
+                <dgm:bulletEnabled val="1"/>
+              </dgm:varLst>
+              <dgm:alg type="tx"/>
+              <dgm:choose name="Name10">
+                <dgm:if name="Name11" func="var" arg="dir" op="equ" val="norm">
+                  <dgm:shape xmlns:r="http://schemas.openxmlformats.org/officeDocument/2006/relationships" type="chevron" r:blip="">
+                    <dgm:adjLst/>
+                  </dgm:shape>
+                </dgm:if>
+                <dgm:else name="Name12">
+                  <dgm:shape xmlns:r="http://schemas.openxmlformats.org/officeDocument/2006/relationships" rot="180" type="chevron" r:blip="">
+                    <dgm:adjLst/>
+                  </dgm:shape>
+                </dgm:else>
+              </dgm:choose>
+              <dgm:presOf axis="self" ptType="node"/>
+              <dgm:choose name="Name13">
+                <dgm:if name="Name14" func="var" arg="dir" op="equ" val="norm">
+                  <dgm:constrLst>
+                    <dgm:constr type="h" refType="w" op="lte" fact="0.4"/>
+                    <dgm:constr type="h"/>
+                    <dgm:constr type="tMarg" refType="primFontSz" fact="0.105"/>
+                    <dgm:constr type="bMarg" refType="primFontSz" fact="0.105"/>
+                    <dgm:constr type="lMarg" refType="primFontSz" fact="0.315"/>
+                    <dgm:constr type="rMarg" refType="primFontSz" fact="0.105"/>
+                  </dgm:constrLst>
+                </dgm:if>
+                <dgm:else name="Name15">
+                  <dgm:constrLst>
+                    <dgm:constr type="h" refType="w" op="lte" fact="0.4"/>
+                    <dgm:constr type="h"/>
+                    <dgm:constr type="tMarg" refType="primFontSz" fact="0.105"/>
+                    <dgm:constr type="bMarg" refType="primFontSz" fact="0.105"/>
+                    <dgm:constr type="lMarg" refType="primFontSz" fact="0.105"/>
+                    <dgm:constr type="rMarg" refType="primFontSz" fact="0.315"/>
+                  </dgm:constrLst>
+                </dgm:else>
+              </dgm:choose>
+              <dgm:ruleLst>
+                <dgm:rule type="h" val="INF" fact="NaN" max="NaN"/>
+              </dgm:ruleLst>
+            </dgm:layoutNode>
+            <dgm:layoutNode name="desTx" styleLbl="revTx">
+              <dgm:varLst>
+                <dgm:bulletEnabled val="1"/>
+              </dgm:varLst>
+              <dgm:alg type="tx">
+                <dgm:param type="stBulletLvl" val="1"/>
+              </dgm:alg>
+              <dgm:choose name="Name16">
+                <dgm:if name="Name17" axis="ch" ptType="node" func="cnt" op="gte" val="1">
+                  <dgm:shape xmlns:r="http://schemas.openxmlformats.org/officeDocument/2006/relationships" type="rect" r:blip="">
+                    <dgm:adjLst/>
+                  </dgm:shape>
+                </dgm:if>
+                <dgm:else name="Name18">
+                  <dgm:shape xmlns:r="http://schemas.openxmlformats.org/officeDocument/2006/relationships" type="rect" r:blip="" hideGeom="1">
+                    <dgm:adjLst/>
+                  </dgm:shape>
+                </dgm:else>
+              </dgm:choose>
+              <dgm:presOf axis="des" ptType="node"/>
+              <dgm:constrLst>
+                <dgm:constr type="secFontSz" val="65"/>
+                <dgm:constr type="primFontSz" refType="secFontSz"/>
+                <dgm:constr type="h"/>
+                <dgm:constr type="tMarg"/>
+                <dgm:constr type="bMarg"/>
+                <dgm:constr type="rMarg"/>
+                <dgm:constr type="lMarg"/>
+              </dgm:constrLst>
+              <dgm:ruleLst>
+                <dgm:rule type="h" val="INF" fact="NaN" max="NaN"/>
+              </dgm:ruleLst>
+            </dgm:layoutNode>
+          </dgm:layoutNode>
+          <dgm:forEach name="Name19" axis="followSib" ptType="sibTrans" cnt="1">
+            <dgm:layoutNode name="space">
+              <dgm:alg type="sp"/>
+              <dgm:shape xmlns:r="http://schemas.openxmlformats.org/officeDocument/2006/relationships" r:blip="">
+                <dgm:adjLst/>
+              </dgm:shape>
+              <dgm:presOf/>
+              <dgm:constrLst/>
+              <dgm:ruleLst/>
+            </dgm:layoutNode>
+          </dgm:forEach>
+        </dgm:forEach>
+      </dgm:if>
+      <dgm:else name="Name20">
+        <dgm:constrLst>
+          <dgm:constr type="w" for="ch" forName="parTxOnly" refType="w"/>
+          <dgm:constr type="h" for="des" forName="parTxOnly" op="equ"/>
+          <dgm:constr type="primFontSz" for="des" forName="parTxOnly" op="equ" val="65"/>
+          <dgm:constr type="w" for="ch" forName="parTxOnlySpace" refType="w" refFor="ch" refForName="parTxOnly" fact="-0.1"/>
+        </dgm:constrLst>
+        <dgm:ruleLst/>
+        <dgm:forEach name="Name21" axis="ch" ptType="node">
+          <dgm:layoutNode name="parTxOnly">
+            <dgm:varLst>
+              <dgm:chMax val="0"/>
+              <dgm:chPref val="0"/>
+              <dgm:bulletEnabled val="1"/>
+            </dgm:varLst>
+            <dgm:alg type="tx"/>
+            <dgm:choose name="Name22">
+              <dgm:if name="Name23" func="var" arg="dir" op="equ" val="norm">
+                <dgm:shape xmlns:r="http://schemas.openxmlformats.org/officeDocument/2006/relationships" type="chevron" r:blip="">
+                  <dgm:adjLst/>
+                </dgm:shape>
+              </dgm:if>
+              <dgm:else name="Name24">
+                <dgm:shape xmlns:r="http://schemas.openxmlformats.org/officeDocument/2006/relationships" rot="180" type="chevron" r:blip="">
+                  <dgm:adjLst/>
+                </dgm:shape>
+              </dgm:else>
+            </dgm:choose>
+            <dgm:presOf axis="self" ptType="node"/>
+            <dgm:choose name="Name25">
+              <dgm:if name="Name26" func="var" arg="dir" op="equ" val="norm">
+                <dgm:constrLst>
+                  <dgm:constr type="h" refType="w" op="equ" fact="0.4"/>
+                  <dgm:constr type="tMarg" refType="primFontSz" fact="0.105"/>
+                  <dgm:constr type="bMarg" refType="primFontSz" fact="0.105"/>
+                  <dgm:constr type="lMarg" refType="primFontSz" fact="0.315"/>
+                  <dgm:constr type="rMarg" refType="primFontSz" fact="0.105"/>
+                </dgm:constrLst>
+              </dgm:if>
+              <dgm:else name="Name27">
+                <dgm:constrLst>
+                  <dgm:constr type="h" refType="w" op="equ" fact="0.4"/>
+                  <dgm:constr type="tMarg" refType="primFontSz" fact="0.105"/>
+                  <dgm:constr type="bMarg" refType="primFontSz" fact="0.105"/>
+                  <dgm:constr type="lMarg" refType="primFontSz" fact="0.105"/>
+                  <dgm:constr type="rMarg" refType="primFontSz" fact="0.315"/>
+                </dgm:constrLst>
+              </dgm:else>
+            </dgm:choose>
+            <dgm:ruleLst>
+              <dgm:rule type="primFontSz" val="5" fact="NaN" max="NaN"/>
+            </dgm:ruleLst>
+          </dgm:layoutNode>
+          <dgm:forEach name="Name28" axis="followSib" ptType="sibTrans" cnt="1">
+            <dgm:layoutNode name="parTxOnlySpace">
+              <dgm:alg type="sp"/>
+              <dgm:shape xmlns:r="http://schemas.openxmlformats.org/officeDocument/2006/relationships" r:blip="">
+                <dgm:adjLst/>
+              </dgm:shape>
+              <dgm:presOf/>
+              <dgm:constrLst/>
+              <dgm:ruleLst/>
+            </dgm:layoutNode>
+          </dgm:forEach>
+        </dgm:forEach>
+      </dgm:else>
+    </dgm:choose>
+  </dgm:layoutNode>
+</dgm:layoutDef>
+</file>
+
+<file path=ppt/diagrams/quickStyle1.xml><?xml version="1.0" encoding="utf-8"?>
+<dgm:styleDef xmlns:dgm="http://schemas.openxmlformats.org/drawingml/2006/diagram" xmlns:a="http://schemas.openxmlformats.org/drawingml/2006/main" uniqueId="urn:microsoft.com/office/officeart/2005/8/quickstyle/simple2">
+  <dgm:title val=""/>
+  <dgm:desc val=""/>
+  <dgm:catLst>
+    <dgm:cat type="simple" pri="10200"/>
+  </dgm:catLst>
+  <dgm:scene3d>
+    <a:camera prst="orthographicFront"/>
+    <a:lightRig rig="threePt" dir="t"/>
+  </dgm:scene3d>
+  <dgm:styleLbl name="node0">
+    <dgm:scene3d>
+      <a:camera prst="orthographicFront"/>
+      <a:lightRig rig="threePt" dir="t"/>
+    </dgm:scene3d>
+    <dgm:sp3d/>
+    <dgm:txPr/>
+    <dgm:style>
+      <a:lnRef idx="3">
+        <a:scrgbClr r="0" g="0" b="0"/>
+      </a:lnRef>
+      <a:fillRef idx="1">
+        <a:scrgbClr r="0" g="0" b="0"/>
+      </a:fillRef>
+      <a:effectRef idx="1">
+        <a:scrgbClr r="0" g="0" b="0"/>
+      </a:effectRef>
+      <a:fontRef idx="minor">
+        <a:schemeClr val="lt1"/>
+      </a:fontRef>
+    </dgm:style>
+  </dgm:styleLbl>
+  <dgm:styleLbl name="lnNode1">
+    <dgm:scene3d>
+      <a:camera prst="orthographicFront"/>
+      <a:lightRig rig="threePt" dir="t"/>
+    </dgm:scene3d>
+    <dgm:sp3d/>
+    <dgm:txPr/>
+    <dgm:style>
+      <a:lnRef idx="3">
+        <a:scrgbClr r="0" g="0" b="0"/>
+      </a:lnRef>
+      <a:fillRef idx="1">
+        <a:scrgbClr r="0" g="0" b="0"/>
+      </a:fillRef>
+      <a:effectRef idx="1">
+        <a:scrgbClr r="0" g="0" b="0"/>
+      </a:effectRef>
+      <a:fontRef idx="minor">
+        <a:schemeClr val="lt1"/>
+      </a:fontRef>
+    </dgm:style>
+  </dgm:styleLbl>
+  <dgm:styleLbl name="vennNode1">
+    <dgm:scene3d>
+      <a:camera prst="orthographicFront"/>
+      <a:lightRig rig="threePt" dir="t"/>
+    </dgm:scene3d>
+    <dgm:sp3d/>
+    <dgm:txPr/>
+    <dgm:style>
+      <a:lnRef idx="3">
+        <a:scrgbClr r="0" g="0" b="0"/>
+      </a:lnRef>
+      <a:fillRef idx="1">
+        <a:scrgbClr r="0" g="0" b="0"/>
+      </a:fillRef>
+      <a:effectRef idx="0">
+        <a:scrgbClr r="0" g="0" b="0"/>
+      </a:effectRef>
+      <a:fontRef idx="minor">
+        <a:schemeClr val="tx1"/>
+      </a:fontRef>
+    </dgm:style>
+  </dgm:styleLbl>
+  <dgm:styleLbl name="alignNode1">
+    <dgm:scene3d>
+      <a:camera prst="orthographicFront"/>
+      <a:lightRig rig="threePt" dir="t"/>
+    </dgm:scene3d>
+    <dgm:sp3d/>
+    <dgm:txPr/>
+    <dgm:style>
+      <a:lnRef idx="2">
+        <a:scrgbClr r="0" g="0" b="0"/>
+      </a:lnRef>
+      <a:fillRef idx="1">
+        <a:scrgbClr r="0" g="0" b="0"/>
+      </a:fillRef>
+      <a:effectRef idx="1">
+        <a:scrgbClr r="0" g="0" b="0"/>
+      </a:effectRef>
+      <a:fontRef idx="minor">
+        <a:schemeClr val="lt1"/>
+      </a:fontRef>
+    </dgm:style>
+  </dgm:styleLbl>
+  <dgm:styleLbl name="node1">
+    <dgm:scene3d>
+      <a:camera prst="orthographicFront"/>
+      <a:lightRig rig="threePt" dir="t"/>
+    </dgm:scene3d>
+    <dgm:sp3d/>
+    <dgm:txPr/>
+    <dgm:style>
+      <a:lnRef idx="3">
+        <a:scrgbClr r="0" g="0" b="0"/>
+      </a:lnRef>
+      <a:fillRef idx="1">
+        <a:scrgbClr r="0" g="0" b="0"/>
+      </a:fillRef>
+      <a:effectRef idx="1">
+        <a:scrgbClr r="0" g="0" b="0"/>
+      </a:effectRef>
+      <a:fontRef idx="minor">
+        <a:schemeClr val="lt1"/>
+      </a:fontRef>
+    </dgm:style>
+  </dgm:styleLbl>
+  <dgm:styleLbl name="node2">
+    <dgm:scene3d>
+      <a:camera prst="orthographicFront"/>
+      <a:lightRig rig="threePt" dir="t"/>
+    </dgm:scene3d>
+    <dgm:sp3d/>
+    <dgm:txPr/>
+    <dgm:style>
+      <a:lnRef idx="3">
+        <a:scrgbClr r="0" g="0" b="0"/>
+      </a:lnRef>
+      <a:fillRef idx="1">
+        <a:scrgbClr r="0" g="0" b="0"/>
+      </a:fillRef>
+      <a:effectRef idx="1">
+        <a:scrgbClr r="0" g="0" b="0"/>
+      </a:effectRef>
+      <a:fontRef idx="minor">
+        <a:schemeClr val="lt1"/>
+      </a:fontRef>
+    </dgm:style>
+  </dgm:styleLbl>
+  <dgm:styleLbl name="node3">
+    <dgm:scene3d>
+      <a:camera prst="orthographicFront"/>
+      <a:lightRig rig="threePt" dir="t"/>
+    </dgm:scene3d>
+    <dgm:sp3d/>
+    <dgm:txPr/>
+    <dgm:style>
+      <a:lnRef idx="3">
+        <a:scrgbClr r="0" g="0" b="0"/>
+      </a:lnRef>
+      <a:fillRef idx="1">
+        <a:scrgbClr r="0" g="0" b="0"/>
+      </a:fillRef>
+      <a:effectRef idx="1">
+        <a:scrgbClr r="0" g="0" b="0"/>
+      </a:effectRef>
+      <a:fontRef idx="minor">
+        <a:schemeClr val="lt1"/>
+      </a:fontRef>
+    </dgm:style>
+  </dgm:styleLbl>
+  <dgm:styleLbl name="node4">
+    <dgm:scene3d>
+      <a:camera prst="orthographicFront"/>
+      <a:lightRig rig="threePt" dir="t"/>
+    </dgm:scene3d>
+    <dgm:sp3d/>
+    <dgm:txPr/>
+    <dgm:style>
+      <a:lnRef idx="3">
+        <a:scrgbClr r="0" g="0" b="0"/>
+      </a:lnRef>
+      <a:fillRef idx="1">
+        <a:scrgbClr r="0" g="0" b="0"/>
+      </a:fillRef>
+      <a:effectRef idx="1">
+        <a:scrgbClr r="0" g="0" b="0"/>
+      </a:effectRef>
+      <a:fontRef idx="minor">
+        <a:schemeClr val="lt1"/>
+      </a:fontRef>
+    </dgm:style>
+  </dgm:styleLbl>
+  <dgm:styleLbl name="fgImgPlace1">
+    <dgm:scene3d>
+      <a:camera prst="orthographicFront"/>
+      <a:lightRig rig="threePt" dir="t"/>
+    </dgm:scene3d>
+    <dgm:sp3d/>
+    <dgm:txPr/>
+    <dgm:style>
+      <a:lnRef idx="3">
+        <a:scrgbClr r="0" g="0" b="0"/>
+      </a:lnRef>
+      <a:fillRef idx="1">
+        <a:scrgbClr r="0" g="0" b="0"/>
+      </a:fillRef>
+      <a:effectRef idx="1">
+        <a:scrgbClr r="0" g="0" b="0"/>
+      </a:effectRef>
+      <a:fontRef idx="minor"/>
+    </dgm:style>
+  </dgm:styleLbl>
+  <dgm:styleLbl name="alignImgPlace1">
+    <dgm:scene3d>
+      <a:camera prst="orthographicFront"/>
+      <a:lightRig rig="threePt" dir="t"/>
+    </dgm:scene3d>
+    <dgm:sp3d/>
+    <dgm:txPr/>
+    <dgm:style>
+      <a:lnRef idx="3">
+        <a:scrgbClr r="0" g="0" b="0"/>
+      </a:lnRef>
+      <a:fillRef idx="1">
+        <a:scrgbClr r="0" g="0" b="0"/>
+      </a:fillRef>
+      <a:effectRef idx="1">
+        <a:scrgbClr r="0" g="0" b="0"/>
+      </a:effectRef>
+      <a:fontRef idx="minor"/>
+    </dgm:style>
+  </dgm:styleLbl>
+  <dgm:styleLbl name="bgImgPlace1">
+    <dgm:scene3d>
+      <a:camera prst="orthographicFront"/>
+      <a:lightRig rig="threePt" dir="t"/>
+    </dgm:scene3d>
+    <dgm:sp3d/>
+    <dgm:txPr/>
+    <dgm:style>
+      <a:lnRef idx="3">
+        <a:scrgbClr r="0" g="0" b="0"/>
+      </a:lnRef>
+      <a:fillRef idx="1">
+        <a:scrgbClr r="0" g="0" b="0"/>
+      </a:fillRef>
+      <a:effectRef idx="1">
+        <a:scrgbClr r="0" g="0" b="0"/>
+      </a:effectRef>
+      <a:fontRef idx="minor"/>
+    </dgm:style>
+  </dgm:styleLbl>
+  <dgm:styleLbl name="sibTrans2D1">
+    <dgm:scene3d>
+      <a:camera prst="orthographicFront"/>
+      <a:lightRig rig="threePt" dir="t"/>
+    </dgm:scene3d>
+    <dgm:sp3d/>
+    <dgm:txPr/>
+    <dgm:style>
+      <a:lnRef idx="0">
+        <a:scrgbClr r="0" g="0" b="0"/>
+      </a:lnRef>
+      <a:fillRef idx="1">
+        <a:scrgbClr r="0" g="0" b="0"/>
+      </a:fillRef>
+      <a:effectRef idx="1">
+        <a:scrgbClr r="0" g="0" b="0"/>
+      </a:effectRef>
+      <a:fontRef idx="minor">
+        <a:schemeClr val="lt1"/>
+      </a:fontRef>
+    </dgm:style>
+  </dgm:styleLbl>
+  <dgm:styleLbl name="fgSibTrans2D1">
+    <dgm:scene3d>
+      <a:camera prst="orthographicFront"/>
+      <a:lightRig rig="threePt" dir="t"/>
+    </dgm:scene3d>
+    <dgm:sp3d/>
+    <dgm:txPr/>
+    <dgm:style>
+      <a:lnRef idx="0">
+        <a:scrgbClr r="0" g="0" b="0"/>
+      </a:lnRef>
+      <a:fillRef idx="1">
+        <a:scrgbClr r="0" g="0" b="0"/>
+      </a:fillRef>
+      <a:effectRef idx="1">
+        <a:scrgbClr r="0" g="0" b="0"/>
+      </a:effectRef>
+      <a:fontRef idx="minor">
+        <a:schemeClr val="lt1"/>
+      </a:fontRef>
+    </dgm:style>
+  </dgm:styleLbl>
+  <dgm:styleLbl name="bgSibTrans2D1">
+    <dgm:scene3d>
+      <a:camera prst="orthographicFront"/>
+      <a:lightRig rig="threePt" dir="t"/>
+    </dgm:scene3d>
+    <dgm:sp3d/>
+    <dgm:txPr/>
+    <dgm:style>
+      <a:lnRef idx="0">
+        <a:scrgbClr r="0" g="0" b="0"/>
+      </a:lnRef>
+      <a:fillRef idx="1">
+        <a:scrgbClr r="0" g="0" b="0"/>
+      </a:fillRef>
+      <a:effectRef idx="1">
+        <a:scrgbClr r="0" g="0" b="0"/>
+      </a:effectRef>
+      <a:fontRef idx="minor">
+        <a:schemeClr val="lt1"/>
+      </a:fontRef>
+    </dgm:style>
+  </dgm:styleLbl>
+  <dgm:styleLbl name="sibTrans1D1">
+    <dgm:scene3d>
+      <a:camera prst="orthographicFront"/>
+      <a:lightRig rig="threePt" dir="t"/>
+    </dgm:scene3d>
+    <dgm:sp3d/>
+    <dgm:txPr/>
+    <dgm:style>
+      <a:lnRef idx="1">
+        <a:scrgbClr r="0" g="0" b="0"/>
+      </a:lnRef>
+      <a:fillRef idx="0">
+        <a:scrgbClr r="0" g="0" b="0"/>
+      </a:fillRef>
+      <a:effectRef idx="0">
+        <a:scrgbClr r="0" g="0" b="0"/>
+      </a:effectRef>
+      <a:fontRef idx="minor"/>
+    </dgm:style>
+  </dgm:styleLbl>
+  <dgm:styleLbl name="callout">
+    <dgm:scene3d>
+      <a:camera prst="orthographicFront"/>
+      <a:lightRig rig="threePt" dir="t"/>
+    </dgm:scene3d>
+    <dgm:sp3d/>
+    <dgm:txPr/>
+    <dgm:style>
+      <a:lnRef idx="2">
+        <a:scrgbClr r="0" g="0" b="0"/>
+      </a:lnRef>
+      <a:fillRef idx="1">
+        <a:scrgbClr r="0" g="0" b="0"/>
+      </a:fillRef>
+      <a:effectRef idx="1">
+        <a:scrgbClr r="0" g="0" b="0"/>
+      </a:effectRef>
+      <a:fontRef idx="minor"/>
+    </dgm:style>
+  </dgm:styleLbl>
+  <dgm:styleLbl name="asst0">
+    <dgm:scene3d>
+      <a:camera prst="orthographicFront"/>
+      <a:lightRig rig="threePt" dir="t"/>
+    </dgm:scene3d>
+    <dgm:sp3d/>
+    <dgm:txPr/>
+    <dgm:style>
+      <a:lnRef idx="3">
+        <a:scrgbClr r="0" g="0" b="0"/>
+      </a:lnRef>
+      <a:fillRef idx="1">
+        <a:scrgbClr r="0" g="0" b="0"/>
+      </a:fillRef>
+      <a:effectRef idx="1">
+        <a:scrgbClr r="0" g="0" b="0"/>
+      </a:effectRef>
+      <a:fontRef idx="minor">
+        <a:schemeClr val="lt1"/>
+      </a:fontRef>
+    </dgm:style>
+  </dgm:styleLbl>
+  <dgm:styleLbl name="asst1">
+    <dgm:scene3d>
+      <a:camera prst="orthographicFront"/>
+      <a:lightRig rig="threePt" dir="t"/>
+    </dgm:scene3d>
+    <dgm:sp3d/>
+    <dgm:txPr/>
+    <dgm:style>
+      <a:lnRef idx="3">
+        <a:scrgbClr r="0" g="0" b="0"/>
+      </a:lnRef>
+      <a:fillRef idx="1">
+        <a:scrgbClr r="0" g="0" b="0"/>
+      </a:fillRef>
+      <a:effectRef idx="1">
+        <a:scrgbClr r="0" g="0" b="0"/>
+      </a:effectRef>
+      <a:fontRef idx="minor">
+        <a:schemeClr val="lt1"/>
+      </a:fontRef>
+    </dgm:style>
+  </dgm:styleLbl>
+  <dgm:styleLbl name="asst2">
+    <dgm:scene3d>
+      <a:camera prst="orthographicFront"/>
+      <a:lightRig rig="threePt" dir="t"/>
+    </dgm:scene3d>
+    <dgm:sp3d/>
+    <dgm:txPr/>
+    <dgm:style>
+      <a:lnRef idx="3">
+        <a:scrgbClr r="0" g="0" b="0"/>
+      </a:lnRef>
+      <a:fillRef idx="1">
+        <a:scrgbClr r="0" g="0" b="0"/>
+      </a:fillRef>
+      <a:effectRef idx="1">
+        <a:scrgbClr r="0" g="0" b="0"/>
+      </a:effectRef>
+      <a:fontRef idx="minor">
+        <a:schemeClr val="lt1"/>
+      </a:fontRef>
+    </dgm:style>
+  </dgm:styleLbl>
+  <dgm:styleLbl name="asst3">
+    <dgm:scene3d>
+      <a:camera prst="orthographicFront"/>
+      <a:lightRig rig="threePt" dir="t"/>
+    </dgm:scene3d>
+    <dgm:sp3d/>
+    <dgm:txPr/>
+    <dgm:style>
+      <a:lnRef idx="3">
+        <a:scrgbClr r="0" g="0" b="0"/>
+      </a:lnRef>
+      <a:fillRef idx="1">
+        <a:scrgbClr r="0" g="0" b="0"/>
+      </a:fillRef>
+      <a:effectRef idx="1">
+        <a:scrgbClr r="0" g="0" b="0"/>
+      </a:effectRef>
+      <a:fontRef idx="minor">
+        <a:schemeClr val="lt1"/>
+      </a:fontRef>
+    </dgm:style>
+  </dgm:styleLbl>
+  <dgm:styleLbl name="asst4">
+    <dgm:scene3d>
+      <a:camera prst="orthographicFront"/>
+      <a:lightRig rig="threePt" dir="t"/>
+    </dgm:scene3d>
+    <dgm:sp3d/>
+    <dgm:txPr/>
+    <dgm:style>
+      <a:lnRef idx="3">
+        <a:scrgbClr r="0" g="0" b="0"/>
+      </a:lnRef>
+      <a:fillRef idx="1">
+        <a:scrgbClr r="0" g="0" b="0"/>
+      </a:fillRef>
+      <a:effectRef idx="1">
+        <a:scrgbClr r="0" g="0" b="0"/>
+      </a:effectRef>
+      <a:fontRef idx="minor">
+        <a:schemeClr val="lt1"/>
+      </a:fontRef>
+    </dgm:style>
+  </dgm:styleLbl>
+  <dgm:styleLbl name="parChTrans2D1">
+    <dgm:scene3d>
+      <a:camera prst="orthographicFront"/>
+      <a:lightRig rig="threePt" dir="t"/>
+    </dgm:scene3d>
+    <dgm:sp3d/>
+    <dgm:txPr/>
+    <dgm:style>
+      <a:lnRef idx="3">
+        <a:scrgbClr r="0" g="0" b="0"/>
+      </a:lnRef>
+      <a:fillRef idx="1">
+        <a:scrgbClr r="0" g="0" b="0"/>
+      </a:fillRef>
+      <a:effectRef idx="1">
+        <a:scrgbClr r="0" g="0" b="0"/>
+      </a:effectRef>
+      <a:fontRef idx="minor">
+        <a:schemeClr val="lt1"/>
+      </a:fontRef>
+    </dgm:style>
+  </dgm:styleLbl>
+  <dgm:styleLbl name="parChTrans2D2">
+    <dgm:scene3d>
+      <a:camera prst="orthographicFront"/>
+      <a:lightRig rig="threePt" dir="t"/>
+    </dgm:scene3d>
+    <dgm:sp3d/>
+    <dgm:txPr/>
+    <dgm:style>
+      <a:lnRef idx="3">
+        <a:scrgbClr r="0" g="0" b="0"/>
+      </a:lnRef>
+      <a:fillRef idx="1">
+        <a:scrgbClr r="0" g="0" b="0"/>
+      </a:fillRef>
+      <a:effectRef idx="1">
+        <a:scrgbClr r="0" g="0" b="0"/>
+      </a:effectRef>
+      <a:fontRef idx="minor">
+        <a:schemeClr val="lt1"/>
+      </a:fontRef>
+    </dgm:style>
+  </dgm:styleLbl>
+  <dgm:styleLbl name="parChTrans2D3">
+    <dgm:scene3d>
+      <a:camera prst="orthographicFront"/>
+      <a:lightRig rig="threePt" dir="t"/>
+    </dgm:scene3d>
+    <dgm:sp3d/>
+    <dgm:txPr/>
+    <dgm:style>
+      <a:lnRef idx="3">
+        <a:scrgbClr r="0" g="0" b="0"/>
+      </a:lnRef>
+      <a:fillRef idx="1">
+        <a:scrgbClr r="0" g="0" b="0"/>
+      </a:fillRef>
+      <a:effectRef idx="1">
+        <a:scrgbClr r="0" g="0" b="0"/>
+      </a:effectRef>
+      <a:fontRef idx="minor">
+        <a:schemeClr val="lt1"/>
+      </a:fontRef>
+    </dgm:style>
+  </dgm:styleLbl>
+  <dgm:styleLbl name="parChTrans2D4">
+    <dgm:scene3d>
+      <a:camera prst="orthographicFront"/>
+      <a:lightRig rig="threePt" dir="t"/>
+    </dgm:scene3d>
+    <dgm:sp3d/>
+    <dgm:txPr/>
+    <dgm:style>
+      <a:lnRef idx="3">
+        <a:scrgbClr r="0" g="0" b="0"/>
+      </a:lnRef>
+      <a:fillRef idx="1">
+        <a:scrgbClr r="0" g="0" b="0"/>
+      </a:fillRef>
+      <a:effectRef idx="1">
+        <a:scrgbClr r="0" g="0" b="0"/>
+      </a:effectRef>
+      <a:fontRef idx="minor">
+        <a:schemeClr val="lt1"/>
+      </a:fontRef>
+    </dgm:style>
+  </dgm:styleLbl>
+  <dgm:styleLbl name="parChTrans1D1">
+    <dgm:scene3d>
+      <a:camera prst="orthographicFront"/>
+      <a:lightRig rig="threePt" dir="t"/>
+    </dgm:scene3d>
+    <dgm:sp3d/>
+    <dgm:txPr/>
+    <dgm:style>
+      <a:lnRef idx="2">
+        <a:scrgbClr r="0" g="0" b="0"/>
+      </a:lnRef>
+      <a:fillRef idx="0">
+        <a:scrgbClr r="0" g="0" b="0"/>
+      </a:fillRef>
+      <a:effectRef idx="0">
+        <a:scrgbClr r="0" g="0" b="0"/>
+      </a:effectRef>
+      <a:fontRef idx="minor"/>
+    </dgm:style>
+  </dgm:styleLbl>
+  <dgm:styleLbl name="parChTrans1D2">
+    <dgm:scene3d>
+      <a:camera prst="orthographicFront"/>
+      <a:lightRig rig="threePt" dir="t"/>
+    </dgm:scene3d>
+    <dgm:sp3d/>
+    <dgm:txPr/>
+    <dgm:style>
+      <a:lnRef idx="2">
+        <a:scrgbClr r="0" g="0" b="0"/>
+      </a:lnRef>
+      <a:fillRef idx="0">
+        <a:scrgbClr r="0" g="0" b="0"/>
+      </a:fillRef>
+      <a:effectRef idx="0">
+        <a:scrgbClr r="0" g="0" b="0"/>
+      </a:effectRef>
+      <a:fontRef idx="minor"/>
+    </dgm:style>
+  </dgm:styleLbl>
+  <dgm:styleLbl name="parChTrans1D3">
+    <dgm:scene3d>
+      <a:camera prst="orthographicFront"/>
+      <a:lightRig rig="threePt" dir="t"/>
+    </dgm:scene3d>
+    <dgm:sp3d/>
+    <dgm:txPr/>
+    <dgm:style>
+      <a:lnRef idx="2">
+        <a:scrgbClr r="0" g="0" b="0"/>
+      </a:lnRef>
+      <a:fillRef idx="0">
+        <a:scrgbClr r="0" g="0" b="0"/>
+      </a:fillRef>
+      <a:effectRef idx="0">
+        <a:scrgbClr r="0" g="0" b="0"/>
+      </a:effectRef>
+      <a:fontRef idx="minor"/>
+    </dgm:style>
+  </dgm:styleLbl>
+  <dgm:styleLbl name="parChTrans1D4">
+    <dgm:scene3d>
+      <a:camera prst="orthographicFront"/>
+      <a:lightRig rig="threePt" dir="t"/>
+    </dgm:scene3d>
+    <dgm:sp3d/>
+    <dgm:txPr/>
+    <dgm:style>
+      <a:lnRef idx="2">
+        <a:scrgbClr r="0" g="0" b="0"/>
+      </a:lnRef>
+      <a:fillRef idx="0">
+        <a:scrgbClr r="0" g="0" b="0"/>
+      </a:fillRef>
+      <a:effectRef idx="0">
+        <a:scrgbClr r="0" g="0" b="0"/>
+      </a:effectRef>
+      <a:fontRef idx="minor"/>
+    </dgm:style>
+  </dgm:styleLbl>
+  <dgm:styleLbl name="fgAcc1">
+    <dgm:scene3d>
+      <a:camera prst="orthographicFront"/>
+      <a:lightRig rig="threePt" dir="t"/>
+    </dgm:scene3d>
+    <dgm:sp3d/>
+    <dgm:txPr/>
+    <dgm:style>
+      <a:lnRef idx="2">
+        <a:scrgbClr r="0" g="0" b="0"/>
+      </a:lnRef>
+      <a:fillRef idx="1">
+        <a:scrgbClr r="0" g="0" b="0"/>
+      </a:fillRef>
+      <a:effectRef idx="0">
+        <a:scrgbClr r="0" g="0" b="0"/>
+      </a:effectRef>
+      <a:fontRef idx="minor"/>
+    </dgm:style>
+  </dgm:styleLbl>
+  <dgm:styleLbl name="conFgAcc1">
+    <dgm:scene3d>
+      <a:camera prst="orthographicFront"/>
+      <a:lightRig rig="threePt" dir="t"/>
+    </dgm:scene3d>
+    <dgm:sp3d/>
+    <dgm:txPr/>
+    <dgm:style>
+      <a:lnRef idx="2">
+        <a:scrgbClr r="0" g="0" b="0"/>
+      </a:lnRef>
+      <a:fillRef idx="1">
+        <a:scrgbClr r="0" g="0" b="0"/>
+      </a:fillRef>
+      <a:effectRef idx="0">
+        <a:scrgbClr r="0" g="0" b="0"/>
+      </a:effectRef>
+      <a:fontRef idx="minor"/>
+    </dgm:style>
+  </dgm:styleLbl>
+  <dgm:styleLbl name="alignAcc1">
+    <dgm:scene3d>
+      <a:camera prst="orthographicFront"/>
+      <a:lightRig rig="threePt" dir="t"/>
+    </dgm:scene3d>
+    <dgm:sp3d/>
+    <dgm:txPr/>
+    <dgm:style>
+      <a:lnRef idx="2">
+        <a:scrgbClr r="0" g="0" b="0"/>
+      </a:lnRef>
+      <a:fillRef idx="1">
+        <a:scrgbClr r="0" g="0" b="0"/>
+      </a:fillRef>
+      <a:effectRef idx="0">
+        <a:scrgbClr r="0" g="0" b="0"/>
+      </a:effectRef>
+      <a:fontRef idx="minor"/>
+    </dgm:style>
+  </dgm:styleLbl>
+  <dgm:styleLbl name="trAlignAcc1">
+    <dgm:scene3d>
+      <a:camera prst="orthographicFront"/>
+      <a:lightRig rig="threePt" dir="t"/>
+    </dgm:scene3d>
+    <dgm:sp3d/>
+    <dgm:txPr/>
+    <dgm:style>
+      <a:lnRef idx="1">
+        <a:scrgbClr r="0" g="0" b="0"/>
+      </a:lnRef>
+      <a:fillRef idx="1">
+        <a:scrgbClr r="0" g="0" b="0"/>
+      </a:fillRef>
+      <a:effectRef idx="0">
+        <a:scrgbClr r="0" g="0" b="0"/>
+      </a:effectRef>
+      <a:fontRef idx="minor"/>
+    </dgm:style>
+  </dgm:styleLbl>
+  <dgm:styleLbl name="bgAcc1">
+    <dgm:scene3d>
+      <a:camera prst="orthographicFront"/>
+      <a:lightRig rig="threePt" dir="t"/>
+    </dgm:scene3d>
+    <dgm:sp3d/>
+    <dgm:txPr/>
+    <dgm:style>
+      <a:lnRef idx="2">
+        <a:scrgbClr r="0" g="0" b="0"/>
+      </a:lnRef>
+      <a:fillRef idx="1">
+        <a:scrgbClr r="0" g="0" b="0"/>
+      </a:fillRef>
+      <a:effectRef idx="0">
+        <a:scrgbClr r="0" g="0" b="0"/>
+      </a:effectRef>
+      <a:fontRef idx="minor"/>
+    </dgm:style>
+  </dgm:styleLbl>
+  <dgm:styleLbl name="solidFgAcc1">
+    <dgm:scene3d>
+      <a:camera prst="orthographicFront"/>
+      <a:lightRig rig="threePt" dir="t"/>
+    </dgm:scene3d>
+    <dgm:sp3d/>
+    <dgm:txPr/>
+    <dgm:style>
+      <a:lnRef idx="2">
+        <a:scrgbClr r="0" g="0" b="0"/>
+      </a:lnRef>
+      <a:fillRef idx="1">
+        <a:scrgbClr r="0" g="0" b="0"/>
+      </a:fillRef>
+      <a:effectRef idx="0">
+        <a:scrgbClr r="0" g="0" b="0"/>
+      </a:effectRef>
+      <a:fontRef idx="minor"/>
+    </dgm:style>
+  </dgm:styleLbl>
+  <dgm:styleLbl name="solidAlignAcc1">
+    <dgm:scene3d>
+      <a:camera prst="orthographicFront"/>
+      <a:lightRig rig="threePt" dir="t"/>
+    </dgm:scene3d>
+    <dgm:sp3d/>
+    <dgm:txPr/>
+    <dgm:style>
+      <a:lnRef idx="2">
+        <a:scrgbClr r="0" g="0" b="0"/>
+      </a:lnRef>
+      <a:fillRef idx="1">
+        <a:scrgbClr r="0" g="0" b="0"/>
+      </a:fillRef>
+      <a:effectRef idx="0">
+        <a:scrgbClr r="0" g="0" b="0"/>
+      </a:effectRef>
+      <a:fontRef idx="minor"/>
+    </dgm:style>
+  </dgm:styleLbl>
+  <dgm:styleLbl name="solidBgAcc1">
+    <dgm:scene3d>
+      <a:camera prst="orthographicFront"/>
+      <a:lightRig rig="threePt" dir="t"/>
+    </dgm:scene3d>
+    <dgm:sp3d/>
+    <dgm:txPr/>
+    <dgm:style>
+      <a:lnRef idx="2">
+        <a:scrgbClr r="0" g="0" b="0"/>
+      </a:lnRef>
+      <a:fillRef idx="1">
+        <a:scrgbClr r="0" g="0" b="0"/>
+      </a:fillRef>
+      <a:effectRef idx="0">
+        <a:scrgbClr r="0" g="0" b="0"/>
+      </a:effectRef>
+      <a:fontRef idx="minor"/>
+    </dgm:style>
+  </dgm:styleLbl>
+  <dgm:styleLbl name="fgAccFollowNode1">
+    <dgm:scene3d>
+      <a:camera prst="orthographicFront"/>
+      <a:lightRig rig="threePt" dir="t"/>
+    </dgm:scene3d>
+    <dgm:sp3d/>
+    <dgm:txPr/>
+    <dgm:style>
+      <a:lnRef idx="2">
+        <a:scrgbClr r="0" g="0" b="0"/>
+      </a:lnRef>
+      <a:fillRef idx="1">
+        <a:scrgbClr r="0" g="0" b="0"/>
+      </a:fillRef>
+      <a:effectRef idx="0">
+        <a:scrgbClr r="0" g="0" b="0"/>
+      </a:effectRef>
+      <a:fontRef idx="minor"/>
+    </dgm:style>
+  </dgm:styleLbl>
+  <dgm:styleLbl name="alignAccFollowNode1">
+    <dgm:scene3d>
+      <a:camera prst="orthographicFront"/>
+      <a:lightRig rig="threePt" dir="t"/>
+    </dgm:scene3d>
+    <dgm:sp3d/>
+    <dgm:txPr/>
+    <dgm:style>
+      <a:lnRef idx="2">
+        <a:scrgbClr r="0" g="0" b="0"/>
+      </a:lnRef>
+      <a:fillRef idx="1">
+        <a:scrgbClr r="0" g="0" b="0"/>
+      </a:fillRef>
+      <a:effectRef idx="0">
+        <a:scrgbClr r="0" g="0" b="0"/>
+      </a:effectRef>
+      <a:fontRef idx="minor"/>
+    </dgm:style>
+  </dgm:styleLbl>
+  <dgm:styleLbl name="bgAccFollowNode1">
+    <dgm:scene3d>
+      <a:camera prst="orthographicFront"/>
+      <a:lightRig rig="threePt" dir="t"/>
+    </dgm:scene3d>
+    <dgm:sp3d/>
+    <dgm:txPr/>
+    <dgm:style>
+      <a:lnRef idx="2">
+        <a:scrgbClr r="0" g="0" b="0"/>
+      </a:lnRef>
+      <a:fillRef idx="1">
+        <a:scrgbClr r="0" g="0" b="0"/>
+      </a:fillRef>
+      <a:effectRef idx="0">
+        <a:scrgbClr r="0" g="0" b="0"/>
+      </a:effectRef>
+      <a:fontRef idx="minor"/>
+    </dgm:style>
+  </dgm:styleLbl>
+  <dgm:styleLbl name="fgAcc0">
+    <dgm:scene3d>
+      <a:camera prst="orthographicFront"/>
+      <a:lightRig rig="threePt" dir="t"/>
+    </dgm:scene3d>
+    <dgm:sp3d/>
+    <dgm:txPr/>
+    <dgm:style>
+      <a:lnRef idx="2">
+        <a:scrgbClr r="0" g="0" b="0"/>
+      </a:lnRef>
+      <a:fillRef idx="1">
+        <a:scrgbClr r="0" g="0" b="0"/>
+      </a:fillRef>
+      <a:effectRef idx="0">
+        <a:scrgbClr r="0" g="0" b="0"/>
+      </a:effectRef>
+      <a:fontRef idx="minor"/>
+    </dgm:style>
+  </dgm:styleLbl>
+  <dgm:styleLbl name="fgAcc2">
+    <dgm:scene3d>
+      <a:camera prst="orthographicFront"/>
+      <a:lightRig rig="threePt" dir="t"/>
+    </dgm:scene3d>
+    <dgm:sp3d/>
+    <dgm:txPr/>
+    <dgm:style>
+      <a:lnRef idx="2">
+        <a:scrgbClr r="0" g="0" b="0"/>
+      </a:lnRef>
+      <a:fillRef idx="1">
+        <a:scrgbClr r="0" g="0" b="0"/>
+      </a:fillRef>
+      <a:effectRef idx="0">
+        <a:scrgbClr r="0" g="0" b="0"/>
+      </a:effectRef>
+      <a:fontRef idx="minor"/>
+    </dgm:style>
+  </dgm:styleLbl>
+  <dgm:styleLbl name="fgAcc3">
+    <dgm:scene3d>
+      <a:camera prst="orthographicFront"/>
+      <a:lightRig rig="threePt" dir="t"/>
+    </dgm:scene3d>
+    <dgm:sp3d/>
+    <dgm:txPr/>
+    <dgm:style>
+      <a:lnRef idx="2">
+        <a:scrgbClr r="0" g="0" b="0"/>
+      </a:lnRef>
+      <a:fillRef idx="1">
+        <a:scrgbClr r="0" g="0" b="0"/>
+      </a:fillRef>
+      <a:effectRef idx="0">
+        <a:scrgbClr r="0" g="0" b="0"/>
+      </a:effectRef>
+      <a:fontRef idx="minor"/>
+    </dgm:style>
+  </dgm:styleLbl>
+  <dgm:styleLbl name="fgAcc4">
+    <dgm:scene3d>
+      <a:camera prst="orthographicFront"/>
+      <a:lightRig rig="threePt" dir="t"/>
+    </dgm:scene3d>
+    <dgm:sp3d/>
+    <dgm:txPr/>
+    <dgm:style>
+      <a:lnRef idx="2">
+        <a:scrgbClr r="0" g="0" b="0"/>
+      </a:lnRef>
+      <a:fillRef idx="1">
+        <a:scrgbClr r="0" g="0" b="0"/>
+      </a:fillRef>
+      <a:effectRef idx="0">
+        <a:scrgbClr r="0" g="0" b="0"/>
+      </a:effectRef>
+      <a:fontRef idx="minor"/>
+    </dgm:style>
+  </dgm:styleLbl>
+  <dgm:styleLbl name="bgShp">
+    <dgm:scene3d>
+      <a:camera prst="orthographicFront"/>
+      <a:lightRig rig="threePt" dir="t"/>
+    </dgm:scene3d>
+    <dgm:sp3d/>
+    <dgm:txPr/>
+    <dgm:style>
+      <a:lnRef idx="0">
+        <a:scrgbClr r="0" g="0" b="0"/>
+      </a:lnRef>
+      <a:fillRef idx="1">
+        <a:scrgbClr r="0" g="0" b="0"/>
+      </a:fillRef>
+      <a:effectRef idx="0">
+        <a:scrgbClr r="0" g="0" b="0"/>
+      </a:effectRef>
+      <a:fontRef idx="minor"/>
+    </dgm:style>
+  </dgm:styleLbl>
+  <dgm:styleLbl name="dkBgShp">
+    <dgm:scene3d>
+      <a:camera prst="orthographicFront"/>
+      <a:lightRig rig="threePt" dir="t"/>
+    </dgm:scene3d>
+    <dgm:sp3d/>
+    <dgm:txPr/>
+    <dgm:style>
+      <a:lnRef idx="0">
+        <a:scrgbClr r="0" g="0" b="0"/>
+      </a:lnRef>
+      <a:fillRef idx="1">
+        <a:scrgbClr r="0" g="0" b="0"/>
+      </a:fillRef>
+      <a:effectRef idx="0">
+        <a:scrgbClr r="0" g="0" b="0"/>
+      </a:effectRef>
+      <a:fontRef idx="minor"/>
+    </dgm:style>
+  </dgm:styleLbl>
+  <dgm:styleLbl name="trBgShp">
+    <dgm:scene3d>
+      <a:camera prst="orthographicFront"/>
+      <a:lightRig rig="threePt" dir="t"/>
+    </dgm:scene3d>
+    <dgm:sp3d/>
+    <dgm:txPr/>
+    <dgm:style>
+      <a:lnRef idx="0">
+        <a:scrgbClr r="0" g="0" b="0"/>
+      </a:lnRef>
+      <a:fillRef idx="1">
+        <a:scrgbClr r="0" g="0" b="0"/>
+      </a:fillRef>
+      <a:effectRef idx="0">
+        <a:scrgbClr r="0" g="0" b="0"/>
+      </a:effectRef>
+      <a:fontRef idx="minor"/>
+    </dgm:style>
+  </dgm:styleLbl>
+  <dgm:styleLbl name="fgShp">
+    <dgm:scene3d>
+      <a:camera prst="orthographicFront"/>
+      <a:lightRig rig="threePt" dir="t"/>
+    </dgm:scene3d>
+    <dgm:sp3d/>
+    <dgm:txPr/>
+    <dgm:style>
+      <a:lnRef idx="3">
+        <a:scrgbClr r="0" g="0" b="0"/>
+      </a:lnRef>
+      <a:fillRef idx="1">
+        <a:scrgbClr r="0" g="0" b="0"/>
+      </a:fillRef>
+      <a:effectRef idx="1">
+        <a:scrgbClr r="0" g="0" b="0"/>
+      </a:effectRef>
+      <a:fontRef idx="minor"/>
+    </dgm:style>
+  </dgm:styleLbl>
+  <dgm:styleLbl name="revTx">
+    <dgm:scene3d>
+      <a:camera prst="orthographicFront"/>
+      <a:lightRig rig="threePt" dir="t"/>
+    </dgm:scene3d>
+    <dgm:sp3d/>
+    <dgm:txPr/>
+    <dgm:style>
+      <a:lnRef idx="0">
+        <a:scrgbClr r="0" g="0" b="0"/>
+      </a:lnRef>
+      <a:fillRef idx="0">
+        <a:scrgbClr r="0" g="0" b="0"/>
+      </a:fillRef>
+      <a:effectRef idx="0">
+        <a:scrgbClr r="0" g="0" b="0"/>
+      </a:effectRef>
+      <a:fontRef idx="minor"/>
+    </dgm:style>
+  </dgm:styleLbl>
+</dgm:styleDef>
+</file>
+
 <file path=ppt/slideLayouts/slideLayout1.xml><?xml version="1.0" encoding="utf-8"?>
 <p:sldLayout xmlns:a="http://schemas.openxmlformats.org/drawingml/2006/main" xmlns:r="http://schemas.openxmlformats.org/officeDocument/2006/relationships" xmlns:p="http://schemas.openxmlformats.org/presentationml/2006/main" type="title" preserve="1">
   <p:cSld name="Title Slide">
@@ -309,7 +3335,7 @@
             <a:fld id="{FD2FD237-61D0-4D32-B24F-B08EC9205759}" type="datetimeFigureOut">
               <a:rPr lang="en-US" smtClean="0"/>
               <a:pPr/>
-              <a:t>6/25/2013</a:t>
+              <a:t>6/27/2013</a:t>
             </a:fld>
             <a:endParaRPr lang="en-US"/>
           </a:p>
@@ -476,7 +3502,7 @@
             <a:fld id="{FD2FD237-61D0-4D32-B24F-B08EC9205759}" type="datetimeFigureOut">
               <a:rPr lang="en-US" smtClean="0"/>
               <a:pPr/>
-              <a:t>6/25/2013</a:t>
+              <a:t>6/27/2013</a:t>
             </a:fld>
             <a:endParaRPr lang="en-US"/>
           </a:p>
@@ -653,7 +3679,7 @@
             <a:fld id="{FD2FD237-61D0-4D32-B24F-B08EC9205759}" type="datetimeFigureOut">
               <a:rPr lang="en-US" smtClean="0"/>
               <a:pPr/>
-              <a:t>6/25/2013</a:t>
+              <a:t>6/27/2013</a:t>
             </a:fld>
             <a:endParaRPr lang="en-US"/>
           </a:p>
@@ -820,7 +3846,7 @@
             <a:fld id="{FD2FD237-61D0-4D32-B24F-B08EC9205759}" type="datetimeFigureOut">
               <a:rPr lang="en-US" smtClean="0"/>
               <a:pPr/>
-              <a:t>6/25/2013</a:t>
+              <a:t>6/27/2013</a:t>
             </a:fld>
             <a:endParaRPr lang="en-US"/>
           </a:p>
@@ -1063,7 +4089,7 @@
             <a:fld id="{FD2FD237-61D0-4D32-B24F-B08EC9205759}" type="datetimeFigureOut">
               <a:rPr lang="en-US" smtClean="0"/>
               <a:pPr/>
-              <a:t>6/25/2013</a:t>
+              <a:t>6/27/2013</a:t>
             </a:fld>
             <a:endParaRPr lang="en-US"/>
           </a:p>
@@ -1348,7 +4374,7 @@
             <a:fld id="{FD2FD237-61D0-4D32-B24F-B08EC9205759}" type="datetimeFigureOut">
               <a:rPr lang="en-US" smtClean="0"/>
               <a:pPr/>
-              <a:t>6/25/2013</a:t>
+              <a:t>6/27/2013</a:t>
             </a:fld>
             <a:endParaRPr lang="en-US"/>
           </a:p>
@@ -1767,7 +4793,7 @@
             <a:fld id="{FD2FD237-61D0-4D32-B24F-B08EC9205759}" type="datetimeFigureOut">
               <a:rPr lang="en-US" smtClean="0"/>
               <a:pPr/>
-              <a:t>6/25/2013</a:t>
+              <a:t>6/27/2013</a:t>
             </a:fld>
             <a:endParaRPr lang="en-US"/>
           </a:p>
@@ -1882,7 +4908,7 @@
             <a:fld id="{FD2FD237-61D0-4D32-B24F-B08EC9205759}" type="datetimeFigureOut">
               <a:rPr lang="en-US" smtClean="0"/>
               <a:pPr/>
-              <a:t>6/25/2013</a:t>
+              <a:t>6/27/2013</a:t>
             </a:fld>
             <a:endParaRPr lang="en-US"/>
           </a:p>
@@ -1974,7 +5000,7 @@
             <a:fld id="{FD2FD237-61D0-4D32-B24F-B08EC9205759}" type="datetimeFigureOut">
               <a:rPr lang="en-US" smtClean="0"/>
               <a:pPr/>
-              <a:t>6/25/2013</a:t>
+              <a:t>6/27/2013</a:t>
             </a:fld>
             <a:endParaRPr lang="en-US"/>
           </a:p>
@@ -2248,7 +5274,7 @@
             <a:fld id="{FD2FD237-61D0-4D32-B24F-B08EC9205759}" type="datetimeFigureOut">
               <a:rPr lang="en-US" smtClean="0"/>
               <a:pPr/>
-              <a:t>6/25/2013</a:t>
+              <a:t>6/27/2013</a:t>
             </a:fld>
             <a:endParaRPr lang="en-US"/>
           </a:p>
@@ -2498,7 +5524,7 @@
             <a:fld id="{FD2FD237-61D0-4D32-B24F-B08EC9205759}" type="datetimeFigureOut">
               <a:rPr lang="en-US" smtClean="0"/>
               <a:pPr/>
-              <a:t>6/25/2013</a:t>
+              <a:t>6/27/2013</a:t>
             </a:fld>
             <a:endParaRPr lang="en-US"/>
           </a:p>
@@ -2708,7 +5734,7 @@
             <a:fld id="{FD2FD237-61D0-4D32-B24F-B08EC9205759}" type="datetimeFigureOut">
               <a:rPr lang="en-US" smtClean="0"/>
               <a:pPr/>
-              <a:t>6/25/2013</a:t>
+              <a:t>6/27/2013</a:t>
             </a:fld>
             <a:endParaRPr lang="en-US"/>
           </a:p>
@@ -3185,25 +6211,26 @@
           </a:p>
         </p:txBody>
       </p:sp>
-      <p:sp>
-        <p:nvSpPr>
-          <p:cNvPr id="3" name="Content Placeholder 2"/>
-          <p:cNvSpPr>
-            <a:spLocks noGrp="1"/>
-          </p:cNvSpPr>
+      <p:graphicFrame>
+        <p:nvGraphicFramePr>
+          <p:cNvPr id="5" name="Content Placeholder 4"/>
+          <p:cNvGraphicFramePr>
+            <a:graphicFrameLocks noGrp="1"/>
+          </p:cNvGraphicFramePr>
           <p:nvPr>
             <p:ph idx="1"/>
           </p:nvPr>
-        </p:nvSpPr>
-        <p:spPr/>
-        <p:txBody>
-          <a:bodyPr/>
-          <a:lstStyle/>
-          <a:p>
-            <a:endParaRPr lang="en-US"/>
-          </a:p>
-        </p:txBody>
-      </p:sp>
+        </p:nvGraphicFramePr>
+        <p:xfrm>
+          <a:off x="457200" y="1600200"/>
+          <a:ext cx="8229600" cy="4525963"/>
+        </p:xfrm>
+        <a:graphic>
+          <a:graphicData uri="http://schemas.openxmlformats.org/drawingml/2006/diagram">
+            <dgm:relIds xmlns:dgm="http://schemas.openxmlformats.org/drawingml/2006/diagram" xmlns:r="http://schemas.openxmlformats.org/officeDocument/2006/relationships" r:dm="rId2" r:lo="rId3" r:qs="rId4" r:cs="rId5"/>
+          </a:graphicData>
+        </a:graphic>
+      </p:graphicFrame>
     </p:spTree>
   </p:cSld>
   <p:clrMapOvr>
@@ -3246,7 +6273,11 @@
           <a:p>
             <a:r>
               <a:rPr lang="en-US" dirty="0" smtClean="0"/>
-              <a:t>Test Plan</a:t>
+              <a:t>Test </a:t>
+            </a:r>
+            <a:r>
+              <a:rPr lang="en-US" dirty="0" smtClean="0"/>
+              <a:t>Plan</a:t>
             </a:r>
             <a:endParaRPr lang="en-US" dirty="0"/>
           </a:p>
@@ -3267,7 +6298,17 @@
           <a:bodyPr/>
           <a:lstStyle/>
           <a:p>
-            <a:endParaRPr lang="en-US"/>
+            <a:r>
+              <a:rPr lang="en-US" dirty="0" smtClean="0"/>
+              <a:t>Think of everything that could possibly go wrong in a feature our app (because more times than not it will go wrong) and write a test case for it.</a:t>
+            </a:r>
+          </a:p>
+          <a:p>
+            <a:r>
+              <a:rPr lang="en-US" dirty="0" smtClean="0"/>
+              <a:t>Once the code is implemented for that feature, test all of the test cases and make sure that they are handled properly (so the app doesn’t crash)</a:t>
+            </a:r>
+            <a:endParaRPr lang="en-US" dirty="0"/>
           </a:p>
         </p:txBody>
       </p:sp>
@@ -3334,14 +6375,393 @@
           <a:bodyPr/>
           <a:lstStyle/>
           <a:p>
-            <a:r>
-              <a:rPr lang="en-US" dirty="0" smtClean="0"/>
-              <a:t>(add example test case)</a:t>
-            </a:r>
+            <a:pPr>
+              <a:buNone/>
+            </a:pPr>
+            <a:endParaRPr lang="en-US" dirty="0" smtClean="0"/>
+          </a:p>
+          <a:p>
             <a:endParaRPr lang="en-US" dirty="0"/>
           </a:p>
         </p:txBody>
       </p:sp>
+      <p:graphicFrame>
+        <p:nvGraphicFramePr>
+          <p:cNvPr id="4" name="Table 3"/>
+          <p:cNvGraphicFramePr>
+            <a:graphicFrameLocks noGrp="1"/>
+          </p:cNvGraphicFramePr>
+          <p:nvPr/>
+        </p:nvGraphicFramePr>
+        <p:xfrm>
+          <a:off x="1600200" y="1828800"/>
+          <a:ext cx="6096000" cy="3397885"/>
+        </p:xfrm>
+        <a:graphic>
+          <a:graphicData uri="http://schemas.openxmlformats.org/drawingml/2006/table">
+            <a:tbl>
+              <a:tblPr firstRow="1" bandRow="1">
+                <a:tableStyleId>{72833802-FEF1-4C79-8D5D-14CF1EAF98D9}</a:tableStyleId>
+              </a:tblPr>
+              <a:tblGrid>
+                <a:gridCol w="1524000"/>
+                <a:gridCol w="1524000"/>
+                <a:gridCol w="1524000"/>
+                <a:gridCol w="1524000"/>
+              </a:tblGrid>
+              <a:tr h="370840">
+                <a:tc gridSpan="4">
+                  <a:txBody>
+                    <a:bodyPr/>
+                    <a:lstStyle/>
+                    <a:p>
+                      <a:r>
+                        <a:rPr lang="en-US" dirty="0" smtClean="0"/>
+                        <a:t>Add Event</a:t>
+                      </a:r>
+                      <a:endParaRPr lang="en-US" dirty="0"/>
+                    </a:p>
+                  </a:txBody>
+                  <a:tcPr>
+                    <a:lnB w="12700" cap="flat" cmpd="sng" algn="ctr">
+                      <a:solidFill>
+                        <a:schemeClr val="tx1"/>
+                      </a:solidFill>
+                      <a:prstDash val="solid"/>
+                      <a:round/>
+                      <a:headEnd type="none" w="med" len="med"/>
+                      <a:tailEnd type="none" w="med" len="med"/>
+                    </a:lnB>
+                  </a:tcPr>
+                </a:tc>
+                <a:tc hMerge="1">
+                  <a:txBody>
+                    <a:bodyPr/>
+                    <a:lstStyle/>
+                    <a:p>
+                      <a:endParaRPr lang="en-US" dirty="0"/>
+                    </a:p>
+                  </a:txBody>
+                  <a:tcPr/>
+                </a:tc>
+                <a:tc hMerge="1">
+                  <a:txBody>
+                    <a:bodyPr/>
+                    <a:lstStyle/>
+                    <a:p>
+                      <a:endParaRPr lang="en-US" dirty="0"/>
+                    </a:p>
+                  </a:txBody>
+                  <a:tcPr/>
+                </a:tc>
+                <a:tc hMerge="1">
+                  <a:txBody>
+                    <a:bodyPr/>
+                    <a:lstStyle/>
+                    <a:p>
+                      <a:endParaRPr lang="en-US" dirty="0"/>
+                    </a:p>
+                  </a:txBody>
+                  <a:tcPr/>
+                </a:tc>
+              </a:tr>
+              <a:tr h="370840">
+                <a:tc>
+                  <a:txBody>
+                    <a:bodyPr/>
+                    <a:lstStyle/>
+                    <a:p>
+                      <a:r>
+                        <a:rPr lang="en-US" dirty="0" smtClean="0"/>
+                        <a:t>1</a:t>
+                      </a:r>
+                      <a:endParaRPr lang="en-US" dirty="0"/>
+                    </a:p>
+                  </a:txBody>
+                  <a:tcPr>
+                    <a:lnL w="12700" cap="flat" cmpd="sng" algn="ctr">
+                      <a:solidFill>
+                        <a:schemeClr val="tx1"/>
+                      </a:solidFill>
+                      <a:prstDash val="solid"/>
+                      <a:round/>
+                      <a:headEnd type="none" w="med" len="med"/>
+                      <a:tailEnd type="none" w="med" len="med"/>
+                    </a:lnL>
+                    <a:lnR w="12700" cap="flat" cmpd="sng" algn="ctr">
+                      <a:solidFill>
+                        <a:schemeClr val="tx1"/>
+                      </a:solidFill>
+                      <a:prstDash val="solid"/>
+                      <a:round/>
+                      <a:headEnd type="none" w="med" len="med"/>
+                      <a:tailEnd type="none" w="med" len="med"/>
+                    </a:lnR>
+                    <a:lnT w="12700" cap="flat" cmpd="sng" algn="ctr">
+                      <a:solidFill>
+                        <a:schemeClr val="tx1"/>
+                      </a:solidFill>
+                      <a:prstDash val="solid"/>
+                      <a:round/>
+                      <a:headEnd type="none" w="med" len="med"/>
+                      <a:tailEnd type="none" w="med" len="med"/>
+                    </a:lnT>
+                    <a:lnB w="12700" cap="flat" cmpd="sng" algn="ctr">
+                      <a:solidFill>
+                        <a:schemeClr val="tx1"/>
+                      </a:solidFill>
+                      <a:prstDash val="solid"/>
+                      <a:round/>
+                      <a:headEnd type="none" w="med" len="med"/>
+                      <a:tailEnd type="none" w="med" len="med"/>
+                    </a:lnB>
+                  </a:tcPr>
+                </a:tc>
+                <a:tc>
+                  <a:txBody>
+                    <a:bodyPr/>
+                    <a:lstStyle/>
+                    <a:p>
+                      <a:pPr algn="l" fontAlgn="b"/>
+                      <a:r>
+                        <a:rPr lang="en-US" sz="1800" b="0" i="0" u="none" strike="noStrike" dirty="0">
+                          <a:solidFill>
+                            <a:srgbClr val="000000"/>
+                          </a:solidFill>
+                          <a:latin typeface="Calibri"/>
+                        </a:rPr>
+                        <a:t>Precondition: app is trying to add an event with </a:t>
+                      </a:r>
+                      <a:r>
+                        <a:rPr lang="en-US" sz="1800" b="0" i="0" u="none" strike="noStrike" dirty="0" err="1">
+                          <a:solidFill>
+                            <a:srgbClr val="000000"/>
+                          </a:solidFill>
+                          <a:latin typeface="Calibri"/>
+                        </a:rPr>
+                        <a:t>startDay</a:t>
+                      </a:r>
+                      <a:r>
+                        <a:rPr lang="en-US" sz="1800" b="0" i="0" u="none" strike="noStrike" dirty="0">
+                          <a:solidFill>
+                            <a:srgbClr val="000000"/>
+                          </a:solidFill>
+                          <a:latin typeface="Calibri"/>
+                        </a:rPr>
+                        <a:t> &gt; 28 when </a:t>
+                      </a:r>
+                      <a:r>
+                        <a:rPr lang="en-US" sz="1800" b="0" i="0" u="none" strike="noStrike" dirty="0" err="1">
+                          <a:solidFill>
+                            <a:srgbClr val="000000"/>
+                          </a:solidFill>
+                          <a:latin typeface="Calibri"/>
+                        </a:rPr>
+                        <a:t>startMonth</a:t>
+                      </a:r>
+                      <a:r>
+                        <a:rPr lang="en-US" sz="1800" b="0" i="0" u="none" strike="noStrike" dirty="0">
+                          <a:solidFill>
+                            <a:srgbClr val="000000"/>
+                          </a:solidFill>
+                          <a:latin typeface="Calibri"/>
+                        </a:rPr>
+                        <a:t> = 2 and </a:t>
+                      </a:r>
+                      <a:r>
+                        <a:rPr lang="en-US" sz="1800" b="0" i="0" u="none" strike="noStrike" dirty="0" err="1">
+                          <a:solidFill>
+                            <a:srgbClr val="000000"/>
+                          </a:solidFill>
+                          <a:latin typeface="Calibri"/>
+                        </a:rPr>
+                        <a:t>startYear</a:t>
+                      </a:r>
+                      <a:r>
+                        <a:rPr lang="en-US" sz="1800" b="0" i="0" u="none" strike="noStrike" dirty="0">
+                          <a:solidFill>
+                            <a:srgbClr val="000000"/>
+                          </a:solidFill>
+                          <a:latin typeface="Calibri"/>
+                        </a:rPr>
+                        <a:t> is not (divisible by 400) nor (divisible by 4 and not by 100)</a:t>
+                      </a:r>
+                    </a:p>
+                  </a:txBody>
+                  <a:tcPr marL="9525" marR="9525" marT="9525" marB="0" anchor="b">
+                    <a:lnL w="12700" cap="flat" cmpd="sng" algn="ctr">
+                      <a:solidFill>
+                        <a:schemeClr val="tx1"/>
+                      </a:solidFill>
+                      <a:prstDash val="solid"/>
+                      <a:round/>
+                      <a:headEnd type="none" w="med" len="med"/>
+                      <a:tailEnd type="none" w="med" len="med"/>
+                    </a:lnL>
+                    <a:lnR w="12700" cap="flat" cmpd="sng" algn="ctr">
+                      <a:solidFill>
+                        <a:schemeClr val="tx1"/>
+                      </a:solidFill>
+                      <a:prstDash val="solid"/>
+                      <a:round/>
+                      <a:headEnd type="none" w="med" len="med"/>
+                      <a:tailEnd type="none" w="med" len="med"/>
+                    </a:lnR>
+                    <a:lnT w="12700" cap="flat" cmpd="sng" algn="ctr">
+                      <a:solidFill>
+                        <a:schemeClr val="tx1"/>
+                      </a:solidFill>
+                      <a:prstDash val="solid"/>
+                      <a:round/>
+                      <a:headEnd type="none" w="med" len="med"/>
+                      <a:tailEnd type="none" w="med" len="med"/>
+                    </a:lnT>
+                    <a:lnB w="12700" cap="flat" cmpd="sng" algn="ctr">
+                      <a:solidFill>
+                        <a:schemeClr val="tx1"/>
+                      </a:solidFill>
+                      <a:prstDash val="solid"/>
+                      <a:round/>
+                      <a:headEnd type="none" w="med" len="med"/>
+                      <a:tailEnd type="none" w="med" len="med"/>
+                    </a:lnB>
+                  </a:tcPr>
+                </a:tc>
+                <a:tc>
+                  <a:txBody>
+                    <a:bodyPr/>
+                    <a:lstStyle/>
+                    <a:p>
+                      <a:r>
+                        <a:rPr lang="en-US" dirty="0" smtClean="0"/>
+                        <a:t>The</a:t>
+                      </a:r>
+                      <a:r>
+                        <a:rPr lang="en-US" baseline="0" dirty="0" smtClean="0"/>
+                        <a:t> event was not able to be added</a:t>
+                      </a:r>
+                      <a:endParaRPr lang="en-US" dirty="0"/>
+                    </a:p>
+                  </a:txBody>
+                  <a:tcPr>
+                    <a:lnL w="12700" cap="flat" cmpd="sng" algn="ctr">
+                      <a:solidFill>
+                        <a:schemeClr val="tx1"/>
+                      </a:solidFill>
+                      <a:prstDash val="solid"/>
+                      <a:round/>
+                      <a:headEnd type="none" w="med" len="med"/>
+                      <a:tailEnd type="none" w="med" len="med"/>
+                    </a:lnL>
+                    <a:lnR w="12700" cap="flat" cmpd="sng" algn="ctr">
+                      <a:solidFill>
+                        <a:schemeClr val="tx1"/>
+                      </a:solidFill>
+                      <a:prstDash val="solid"/>
+                      <a:round/>
+                      <a:headEnd type="none" w="med" len="med"/>
+                      <a:tailEnd type="none" w="med" len="med"/>
+                    </a:lnR>
+                    <a:lnT w="12700" cap="flat" cmpd="sng" algn="ctr">
+                      <a:solidFill>
+                        <a:schemeClr val="tx1"/>
+                      </a:solidFill>
+                      <a:prstDash val="solid"/>
+                      <a:round/>
+                      <a:headEnd type="none" w="med" len="med"/>
+                      <a:tailEnd type="none" w="med" len="med"/>
+                    </a:lnT>
+                    <a:lnB w="12700" cap="flat" cmpd="sng" algn="ctr">
+                      <a:solidFill>
+                        <a:schemeClr val="tx1"/>
+                      </a:solidFill>
+                      <a:prstDash val="solid"/>
+                      <a:round/>
+                      <a:headEnd type="none" w="med" len="med"/>
+                      <a:tailEnd type="none" w="med" len="med"/>
+                    </a:lnB>
+                  </a:tcPr>
+                </a:tc>
+                <a:tc>
+                  <a:txBody>
+                    <a:bodyPr/>
+                    <a:lstStyle/>
+                    <a:p>
+                      <a:pPr marL="0" marR="0" indent="0" algn="l" defTabSz="914400" rtl="0" eaLnBrk="1" fontAlgn="auto" latinLnBrk="0" hangingPunct="1">
+                        <a:lnSpc>
+                          <a:spcPct val="100000"/>
+                        </a:lnSpc>
+                        <a:spcBef>
+                          <a:spcPts val="0"/>
+                        </a:spcBef>
+                        <a:spcAft>
+                          <a:spcPts val="0"/>
+                        </a:spcAft>
+                        <a:buClrTx/>
+                        <a:buSzTx/>
+                        <a:buFontTx/>
+                        <a:buNone/>
+                        <a:tabLst/>
+                        <a:defRPr/>
+                      </a:pPr>
+                      <a:r>
+                        <a:rPr lang="en-US" dirty="0" smtClean="0"/>
+                        <a:t>The</a:t>
+                      </a:r>
+                      <a:r>
+                        <a:rPr lang="en-US" baseline="0" dirty="0" smtClean="0"/>
+                        <a:t> event was not able to be added. An exception was thrown to prompt the user of this failure.</a:t>
+                      </a:r>
+                      <a:endParaRPr lang="en-US" dirty="0" smtClean="0"/>
+                    </a:p>
+                    <a:p>
+                      <a:endParaRPr lang="en-US" dirty="0"/>
+                    </a:p>
+                  </a:txBody>
+                  <a:tcPr>
+                    <a:lnL w="12700" cap="flat" cmpd="sng" algn="ctr">
+                      <a:solidFill>
+                        <a:schemeClr val="tx1"/>
+                      </a:solidFill>
+                      <a:prstDash val="solid"/>
+                      <a:round/>
+                      <a:headEnd type="none" w="med" len="med"/>
+                      <a:tailEnd type="none" w="med" len="med"/>
+                    </a:lnL>
+                    <a:lnR w="12700" cap="flat" cmpd="sng" algn="ctr">
+                      <a:solidFill>
+                        <a:schemeClr val="tx1"/>
+                      </a:solidFill>
+                      <a:prstDash val="solid"/>
+                      <a:round/>
+                      <a:headEnd type="none" w="med" len="med"/>
+                      <a:tailEnd type="none" w="med" len="med"/>
+                    </a:lnR>
+                    <a:lnT w="12700" cap="flat" cmpd="sng" algn="ctr">
+                      <a:solidFill>
+                        <a:schemeClr val="tx1"/>
+                      </a:solidFill>
+                      <a:prstDash val="solid"/>
+                      <a:round/>
+                      <a:headEnd type="none" w="med" len="med"/>
+                      <a:tailEnd type="none" w="med" len="med"/>
+                    </a:lnT>
+                    <a:lnB w="12700" cap="flat" cmpd="sng" algn="ctr">
+                      <a:solidFill>
+                        <a:schemeClr val="tx1"/>
+                      </a:solidFill>
+                      <a:prstDash val="solid"/>
+                      <a:round/>
+                      <a:headEnd type="none" w="med" len="med"/>
+                      <a:tailEnd type="none" w="med" len="med"/>
+                    </a:lnB>
+                  </a:tcPr>
+                </a:tc>
+              </a:tr>
+            </a:tbl>
+          </a:graphicData>
+        </a:graphic>
+      </p:graphicFrame>
     </p:spTree>
   </p:cSld>
   <p:clrMapOvr>
@@ -3407,7 +6827,13 @@
           <a:p>
             <a:r>
               <a:rPr lang="en-US" dirty="0" smtClean="0"/>
-              <a:t>(describe how it works)</a:t>
+              <a:t>The calendar API allows the programmer to create a calendar or modify an existing calendar.</a:t>
+            </a:r>
+          </a:p>
+          <a:p>
+            <a:r>
+              <a:rPr lang="en-US" dirty="0" smtClean="0"/>
+              <a:t>The API can be used to add events, edit events, delete events, add notifications, etc.</a:t>
             </a:r>
             <a:endParaRPr lang="en-US" dirty="0"/>
           </a:p>
@@ -3471,26 +6897,69 @@
             <p:ph idx="1"/>
           </p:nvPr>
         </p:nvSpPr>
-        <p:spPr/>
+        <p:spPr>
+          <a:xfrm>
+            <a:off x="381000" y="1600200"/>
+            <a:ext cx="8229600" cy="4525963"/>
+          </a:xfrm>
+        </p:spPr>
         <p:txBody>
           <a:bodyPr/>
           <a:lstStyle/>
           <a:p>
             <a:r>
               <a:rPr lang="en-US" dirty="0" smtClean="0"/>
-              <a:t>(description)</a:t>
-            </a:r>
-          </a:p>
-          <a:p>
-            <a:r>
-              <a:rPr lang="en-US" dirty="0" smtClean="0"/>
-              <a:t>Pros:</a:t>
-            </a:r>
-          </a:p>
-          <a:p>
-            <a:r>
-              <a:rPr lang="en-US" dirty="0" smtClean="0"/>
-              <a:t>Cons:</a:t>
+              <a:t>This will pull up a window with all of the users’ event data inside the default add event intent.</a:t>
+            </a:r>
+            <a:endParaRPr lang="en-US" dirty="0" smtClean="0"/>
+          </a:p>
+          <a:p>
+            <a:r>
+              <a:rPr lang="en-US" dirty="0" smtClean="0"/>
+              <a:t>Pros</a:t>
+            </a:r>
+            <a:r>
+              <a:rPr lang="en-US" dirty="0" smtClean="0"/>
+              <a:t>:</a:t>
+            </a:r>
+          </a:p>
+          <a:p>
+            <a:pPr lvl="1"/>
+            <a:r>
+              <a:rPr lang="en-US" dirty="0" smtClean="0"/>
+              <a:t>It’s vey easy to code</a:t>
+            </a:r>
+          </a:p>
+          <a:p>
+            <a:pPr lvl="1"/>
+            <a:r>
+              <a:rPr lang="en-US" dirty="0" smtClean="0"/>
+              <a:t>Easy to get info from the user</a:t>
+            </a:r>
+            <a:endParaRPr lang="en-US" dirty="0" smtClean="0"/>
+          </a:p>
+          <a:p>
+            <a:r>
+              <a:rPr lang="en-US" dirty="0" smtClean="0"/>
+              <a:t>Cons</a:t>
+            </a:r>
+            <a:r>
+              <a:rPr lang="en-US" dirty="0" smtClean="0"/>
+              <a:t>:</a:t>
+            </a:r>
+          </a:p>
+          <a:p>
+            <a:pPr lvl="1"/>
+            <a:r>
+              <a:rPr lang="en-US" dirty="0" smtClean="0"/>
+              <a:t>The user needs to do this for every event they add</a:t>
+            </a:r>
+          </a:p>
+          <a:p>
+            <a:pPr lvl="1"/>
+            <a:r>
+              <a:rPr lang="en-US" dirty="0" smtClean="0"/>
+              <a:t>This is very slow and very annoying</a:t>
             </a:r>
             <a:endParaRPr lang="en-US" dirty="0"/>
           </a:p>
@@ -3507,6 +6976,14 @@
 <file path=ppt/slides/slide15.xml><?xml version="1.0" encoding="utf-8"?>
 <p:sld xmlns:a="http://schemas.openxmlformats.org/drawingml/2006/main" xmlns:r="http://schemas.openxmlformats.org/officeDocument/2006/relationships" xmlns:p="http://schemas.openxmlformats.org/presentationml/2006/main">
   <p:cSld>
+    <p:bg>
+      <p:bgPr>
+        <a:solidFill>
+          <a:srgbClr val="FF0000"/>
+        </a:solidFill>
+        <a:effectLst/>
+      </p:bgPr>
+    </p:bg>
     <p:spTree>
       <p:nvGrpSpPr>
         <p:cNvPr id="1" name=""/>
@@ -3578,6 +7055,14 @@
 <file path=ppt/slides/slide16.xml><?xml version="1.0" encoding="utf-8"?>
 <p:sld xmlns:a="http://schemas.openxmlformats.org/drawingml/2006/main" xmlns:r="http://schemas.openxmlformats.org/officeDocument/2006/relationships" xmlns:p="http://schemas.openxmlformats.org/presentationml/2006/main">
   <p:cSld>
+    <p:bg>
+      <p:bgPr>
+        <a:solidFill>
+          <a:srgbClr val="FF0000"/>
+        </a:solidFill>
+        <a:effectLst/>
+      </p:bgPr>
+    </p:bg>
     <p:spTree>
       <p:nvGrpSpPr>
         <p:cNvPr id="1" name=""/>
@@ -3661,6 +7146,14 @@
 <file path=ppt/slides/slide17.xml><?xml version="1.0" encoding="utf-8"?>
 <p:sld xmlns:a="http://schemas.openxmlformats.org/drawingml/2006/main" xmlns:r="http://schemas.openxmlformats.org/officeDocument/2006/relationships" xmlns:p="http://schemas.openxmlformats.org/presentationml/2006/main">
   <p:cSld>
+    <p:bg>
+      <p:bgPr>
+        <a:solidFill>
+          <a:srgbClr val="FF0000"/>
+        </a:solidFill>
+        <a:effectLst/>
+      </p:bgPr>
+    </p:bg>
     <p:spTree>
       <p:nvGrpSpPr>
         <p:cNvPr id="1" name=""/>
@@ -3692,7 +7185,7 @@
           <a:p>
             <a:r>
               <a:rPr lang="en-US" dirty="0" smtClean="0"/>
-              <a:t>Composite Design Pattern</a:t>
+              <a:t>Sync Adapters </a:t>
             </a:r>
             <a:endParaRPr lang="en-US" dirty="0"/>
           </a:p>
@@ -3715,19 +7208,11 @@
           <a:p>
             <a:r>
               <a:rPr lang="en-US" dirty="0" smtClean="0"/>
-              <a:t>Also known as:</a:t>
-            </a:r>
-          </a:p>
-          <a:p>
-            <a:r>
-              <a:rPr lang="en-US" dirty="0" smtClean="0"/>
-              <a:t>Motivation:</a:t>
-            </a:r>
-          </a:p>
-          <a:p>
-            <a:r>
-              <a:rPr lang="en-US" dirty="0" smtClean="0"/>
-              <a:t>Intent:</a:t>
+              <a:t>(describe </a:t>
+            </a:r>
+            <a:r>
+              <a:rPr lang="en-US" smtClean="0"/>
+              <a:t>what they are and how they are used)</a:t>
             </a:r>
             <a:endParaRPr lang="en-US" dirty="0"/>
           </a:p>
@@ -3744,6 +7229,14 @@
 <file path=ppt/slides/slide18.xml><?xml version="1.0" encoding="utf-8"?>
 <p:sld xmlns:a="http://schemas.openxmlformats.org/drawingml/2006/main" xmlns:r="http://schemas.openxmlformats.org/officeDocument/2006/relationships" xmlns:p="http://schemas.openxmlformats.org/presentationml/2006/main">
   <p:cSld>
+    <p:bg>
+      <p:bgPr>
+        <a:solidFill>
+          <a:srgbClr val="FFFF00"/>
+        </a:solidFill>
+        <a:effectLst/>
+      </p:bgPr>
+    </p:bg>
     <p:spTree>
       <p:nvGrpSpPr>
         <p:cNvPr id="1" name=""/>
@@ -3775,7 +7268,7 @@
           <a:p>
             <a:r>
               <a:rPr lang="en-US" dirty="0" smtClean="0"/>
-              <a:t>Sync Adapters </a:t>
+              <a:t>Composite Design Pattern</a:t>
             </a:r>
             <a:endParaRPr lang="en-US" dirty="0"/>
           </a:p>
@@ -3798,11 +7291,33 @@
           <a:p>
             <a:r>
               <a:rPr lang="en-US" dirty="0" smtClean="0"/>
-              <a:t>(describe </a:t>
-            </a:r>
-            <a:r>
-              <a:rPr lang="en-US" smtClean="0"/>
-              <a:t>what they are and how they are used)</a:t>
+              <a:t>Also known as</a:t>
+            </a:r>
+            <a:r>
+              <a:rPr lang="en-US" dirty="0" smtClean="0"/>
+              <a:t>: Tree Design</a:t>
+            </a:r>
+            <a:endParaRPr lang="en-US" dirty="0" smtClean="0"/>
+          </a:p>
+          <a:p>
+            <a:r>
+              <a:rPr lang="en-US" dirty="0" smtClean="0"/>
+              <a:t>Motivation</a:t>
+            </a:r>
+            <a:r>
+              <a:rPr lang="en-US" dirty="0" smtClean="0"/>
+              <a:t>:  When dealing with a tree structure, it is at times difficult to determine what is a branch and what is a leaf(or node).</a:t>
+            </a:r>
+            <a:endParaRPr lang="en-US" dirty="0" smtClean="0"/>
+          </a:p>
+          <a:p>
+            <a:r>
+              <a:rPr lang="en-US" dirty="0" smtClean="0"/>
+              <a:t>Intent</a:t>
+            </a:r>
+            <a:r>
+              <a:rPr lang="en-US" dirty="0" smtClean="0"/>
+              <a:t>: Organize objects into tree structures. This allows objects and compositions of objects to be treated the same.</a:t>
             </a:r>
             <a:endParaRPr lang="en-US" dirty="0"/>
           </a:p>
@@ -3819,6 +7334,14 @@
 <file path=ppt/slides/slide19.xml><?xml version="1.0" encoding="utf-8"?>
 <p:sld xmlns:a="http://schemas.openxmlformats.org/drawingml/2006/main" xmlns:r="http://schemas.openxmlformats.org/officeDocument/2006/relationships" xmlns:p="http://schemas.openxmlformats.org/presentationml/2006/main">
   <p:cSld>
+    <p:bg>
+      <p:bgPr>
+        <a:solidFill>
+          <a:srgbClr val="FFFF00"/>
+        </a:solidFill>
+        <a:effectLst/>
+      </p:bgPr>
+    </p:bg>
     <p:spTree>
       <p:nvGrpSpPr>
         <p:cNvPr id="1" name=""/>
@@ -3873,37 +7396,71 @@
           <a:p>
             <a:r>
               <a:rPr lang="en-US" dirty="0" smtClean="0"/>
-              <a:t>Classification:</a:t>
-            </a:r>
-          </a:p>
-          <a:p>
-            <a:r>
-              <a:rPr lang="en-US" dirty="0" smtClean="0"/>
-              <a:t>Implementation:</a:t>
+              <a:t>Classification</a:t>
+            </a:r>
+            <a:r>
+              <a:rPr lang="en-US" dirty="0" smtClean="0"/>
+              <a:t>: Structural</a:t>
+            </a:r>
+            <a:endParaRPr lang="en-US" dirty="0" smtClean="0"/>
+          </a:p>
+          <a:p>
+            <a:r>
+              <a:rPr lang="en-US" dirty="0" smtClean="0"/>
+              <a:t>Implementation</a:t>
+            </a:r>
+            <a:r>
+              <a:rPr lang="en-US" dirty="0" smtClean="0"/>
+              <a:t>:</a:t>
+            </a:r>
+          </a:p>
+          <a:p>
+            <a:pPr lvl="1"/>
+            <a:r>
+              <a:rPr lang="en-US" dirty="0" smtClean="0"/>
+              <a:t>Compose objects into tree structure</a:t>
+            </a:r>
+          </a:p>
+          <a:p>
+            <a:pPr lvl="1"/>
+            <a:r>
+              <a:rPr lang="en-US" dirty="0" smtClean="0"/>
+              <a:t>Relationships are hierarchical</a:t>
+            </a:r>
+          </a:p>
+          <a:p>
+            <a:pPr lvl="1"/>
+            <a:r>
+              <a:rPr lang="en-US" dirty="0" smtClean="0"/>
+              <a:t>Be able to manage child nodes (default commands in tree structure).</a:t>
             </a:r>
             <a:endParaRPr lang="en-US" dirty="0"/>
           </a:p>
         </p:txBody>
       </p:sp>
-      <p:sp>
-        <p:nvSpPr>
-          <p:cNvPr id="4" name="Content Placeholder 3"/>
-          <p:cNvSpPr>
-            <a:spLocks noGrp="1"/>
-          </p:cNvSpPr>
+      <p:pic>
+        <p:nvPicPr>
+          <p:cNvPr id="5" name="Content Placeholder 4" descr="Composite.gif"/>
+          <p:cNvPicPr>
+            <a:picLocks noGrp="1" noChangeAspect="1"/>
+          </p:cNvPicPr>
           <p:nvPr>
             <p:ph sz="half" idx="2"/>
           </p:nvPr>
-        </p:nvSpPr>
-        <p:spPr/>
-        <p:txBody>
-          <a:bodyPr/>
-          <a:lstStyle/>
-          <a:p>
-            <a:endParaRPr lang="en-US"/>
-          </a:p>
-        </p:txBody>
-      </p:sp>
+        </p:nvPicPr>
+        <p:blipFill>
+          <a:blip r:embed="rId2" cstate="print"/>
+          <a:stretch>
+            <a:fillRect/>
+          </a:stretch>
+        </p:blipFill>
+        <p:spPr>
+          <a:xfrm>
+            <a:off x="5088676" y="2499519"/>
+            <a:ext cx="3521924" cy="2910681"/>
+          </a:xfrm>
+        </p:spPr>
+      </p:pic>
     </p:spTree>
   </p:cSld>
   <p:clrMapOvr>
@@ -3969,8 +7526,32 @@
           <a:p>
             <a:r>
               <a:rPr lang="en-US" dirty="0" smtClean="0"/>
-              <a:t>(why this is needed)</a:t>
-            </a:r>
+              <a:t>In a nutshell: takes your schedule from the UC database and adds it to your phone calendar.</a:t>
+            </a:r>
+          </a:p>
+          <a:p>
+            <a:r>
+              <a:rPr lang="en-US" dirty="0" smtClean="0"/>
+              <a:t>Events are able to be modified to fit in hw due dates, </a:t>
+            </a:r>
+            <a:r>
+              <a:rPr lang="en-US" dirty="0" err="1" smtClean="0"/>
+              <a:t>exam,etc</a:t>
+            </a:r>
+            <a:r>
+              <a:rPr lang="en-US" dirty="0" smtClean="0"/>
+              <a:t>.</a:t>
+            </a:r>
+            <a:endParaRPr lang="en-US" dirty="0" smtClean="0"/>
+          </a:p>
+          <a:p>
+            <a:r>
+              <a:rPr lang="en-US" dirty="0" smtClean="0"/>
+              <a:t>System Metaphor: Scheduler, calendar, event holder?</a:t>
+            </a:r>
+          </a:p>
+          <a:p>
+            <a:endParaRPr lang="en-US" dirty="0"/>
           </a:p>
         </p:txBody>
       </p:sp>
@@ -3985,6 +7566,14 @@
 <file path=ppt/slides/slide20.xml><?xml version="1.0" encoding="utf-8"?>
 <p:sld xmlns:a="http://schemas.openxmlformats.org/drawingml/2006/main" xmlns:r="http://schemas.openxmlformats.org/officeDocument/2006/relationships" xmlns:p="http://schemas.openxmlformats.org/presentationml/2006/main">
   <p:cSld>
+    <p:bg>
+      <p:bgPr>
+        <a:solidFill>
+          <a:srgbClr val="FFFF00"/>
+        </a:solidFill>
+        <a:effectLst/>
+      </p:bgPr>
+    </p:bg>
     <p:spTree>
       <p:nvGrpSpPr>
         <p:cNvPr id="1" name=""/>
@@ -4029,7 +7618,7 @@
             <a:spLocks noGrp="1"/>
           </p:cNvSpPr>
           <p:nvPr>
-            <p:ph idx="1"/>
+            <p:ph sz="half" idx="1"/>
           </p:nvPr>
         </p:nvSpPr>
         <p:spPr/>
@@ -4039,18 +7628,65 @@
           <a:p>
             <a:r>
               <a:rPr lang="en-US" dirty="0" smtClean="0"/>
-              <a:t>Applicability:</a:t>
-            </a:r>
-          </a:p>
+              <a:t>Applicability</a:t>
+            </a:r>
+            <a:r>
+              <a:rPr lang="en-US" dirty="0" smtClean="0"/>
+              <a:t>: Calculator app that must abide by the order of operations or anything that contains a priority  </a:t>
+            </a:r>
+            <a:endParaRPr lang="en-US" dirty="0" smtClean="0"/>
+          </a:p>
+        </p:txBody>
+      </p:sp>
+      <p:sp>
+        <p:nvSpPr>
+          <p:cNvPr id="4" name="Content Placeholder 3"/>
+          <p:cNvSpPr>
+            <a:spLocks noGrp="1"/>
+          </p:cNvSpPr>
+          <p:nvPr>
+            <p:ph sz="half" idx="2"/>
+          </p:nvPr>
+        </p:nvSpPr>
+        <p:spPr/>
+        <p:txBody>
+          <a:bodyPr/>
+          <a:lstStyle/>
           <a:p>
             <a:r>
               <a:rPr lang="en-US" dirty="0" smtClean="0"/>
               <a:t>Structure and Implementation:</a:t>
             </a:r>
+          </a:p>
+          <a:p>
             <a:endParaRPr lang="en-US" dirty="0"/>
           </a:p>
         </p:txBody>
       </p:sp>
+      <p:pic>
+        <p:nvPicPr>
+          <p:cNvPr id="7" name="Picture 6" descr="Composite_example1.gif"/>
+          <p:cNvPicPr>
+            <a:picLocks noChangeAspect="1"/>
+          </p:cNvPicPr>
+          <p:nvPr/>
+        </p:nvPicPr>
+        <p:blipFill>
+          <a:blip r:embed="rId2" cstate="print"/>
+          <a:stretch>
+            <a:fillRect/>
+          </a:stretch>
+        </p:blipFill>
+        <p:spPr>
+          <a:xfrm>
+            <a:off x="5181600" y="2971801"/>
+            <a:ext cx="2438400" cy="1446380"/>
+          </a:xfrm>
+          <a:prstGeom prst="rect">
+            <a:avLst/>
+          </a:prstGeom>
+        </p:spPr>
+      </p:pic>
     </p:spTree>
   </p:cSld>
   <p:clrMapOvr>
@@ -4062,6 +7698,14 @@
 <file path=ppt/slides/slide21.xml><?xml version="1.0" encoding="utf-8"?>
 <p:sld xmlns:a="http://schemas.openxmlformats.org/drawingml/2006/main" xmlns:r="http://schemas.openxmlformats.org/officeDocument/2006/relationships" xmlns:p="http://schemas.openxmlformats.org/presentationml/2006/main">
   <p:cSld>
+    <p:bg>
+      <p:bgPr>
+        <a:solidFill>
+          <a:srgbClr val="FFFF00"/>
+        </a:solidFill>
+        <a:effectLst/>
+      </p:bgPr>
+    </p:bg>
     <p:spTree>
       <p:nvGrpSpPr>
         <p:cNvPr id="1" name=""/>
@@ -4116,13 +7760,61 @@
           <a:p>
             <a:r>
               <a:rPr lang="en-US" dirty="0" smtClean="0"/>
-              <a:t>Participants:</a:t>
-            </a:r>
+              <a:t>Participants</a:t>
+            </a:r>
+            <a:r>
+              <a:rPr lang="en-US" dirty="0" smtClean="0"/>
+              <a:t>: Leaf, Composite, Component</a:t>
+            </a:r>
+            <a:endParaRPr lang="en-US" dirty="0" smtClean="0"/>
           </a:p>
           <a:p>
             <a:r>
               <a:rPr lang="en-US" dirty="0" smtClean="0"/>
               <a:t>Related Patterns: </a:t>
+            </a:r>
+            <a:r>
+              <a:rPr lang="en-US" dirty="0" smtClean="0"/>
+              <a:t> </a:t>
+            </a:r>
+          </a:p>
+          <a:p>
+            <a:pPr lvl="1"/>
+            <a:r>
+              <a:rPr lang="en-US" dirty="0" smtClean="0"/>
+              <a:t>Decorator Pattern: Decorators and Composites will usually share a common parent class. The Decorators support the Composite with functions such as </a:t>
+            </a:r>
+            <a:r>
+              <a:rPr lang="en-US" dirty="0" err="1" smtClean="0"/>
+              <a:t>g</a:t>
+            </a:r>
+            <a:r>
+              <a:rPr lang="en-US" dirty="0" err="1" smtClean="0"/>
+              <a:t>etChild</a:t>
+            </a:r>
+            <a:r>
+              <a:rPr lang="en-US" dirty="0" smtClean="0"/>
+              <a:t>, </a:t>
+            </a:r>
+            <a:r>
+              <a:rPr lang="en-US" dirty="0" err="1" smtClean="0"/>
+              <a:t>addChild</a:t>
+            </a:r>
+            <a:r>
+              <a:rPr lang="en-US" dirty="0" smtClean="0"/>
+              <a:t> </a:t>
+            </a:r>
+            <a:r>
+              <a:rPr lang="en-US" dirty="0" smtClean="0"/>
+              <a:t>and </a:t>
+            </a:r>
+            <a:r>
+              <a:rPr lang="en-US" dirty="0" err="1" smtClean="0"/>
+              <a:t>removeChild</a:t>
+            </a:r>
+            <a:r>
+              <a:rPr lang="en-US" dirty="0" smtClean="0"/>
+              <a:t>.</a:t>
             </a:r>
             <a:endParaRPr lang="en-US" dirty="0"/>
           </a:p>
@@ -4193,8 +7885,35 @@
           <a:p>
             <a:r>
               <a:rPr lang="en-US" dirty="0" smtClean="0"/>
-              <a:t>(describe functionality)</a:t>
-            </a:r>
+              <a:t>Uses </a:t>
+            </a:r>
+            <a:r>
+              <a:rPr lang="en-US" dirty="0" smtClean="0"/>
+              <a:t>UC Scheduling </a:t>
+            </a:r>
+            <a:r>
+              <a:rPr lang="en-US" dirty="0" smtClean="0"/>
+              <a:t>API and Calendar API</a:t>
+            </a:r>
+          </a:p>
+          <a:p>
+            <a:r>
+              <a:rPr lang="en-US" dirty="0" smtClean="0"/>
+              <a:t>The user needs to login using their UC credentials.</a:t>
+            </a:r>
+          </a:p>
+          <a:p>
+            <a:r>
+              <a:rPr lang="en-US" dirty="0" smtClean="0"/>
+              <a:t>???</a:t>
+            </a:r>
+          </a:p>
+          <a:p>
+            <a:r>
+              <a:rPr lang="en-US" dirty="0" smtClean="0"/>
+              <a:t>Profit (the user will get their schedule on their phone calendar without any prompts).</a:t>
+            </a:r>
+            <a:endParaRPr lang="en-US" dirty="0" smtClean="0"/>
           </a:p>
           <a:p>
             <a:endParaRPr lang="en-US" dirty="0"/>
@@ -4266,9 +7985,33 @@
           <a:p>
             <a:r>
               <a:rPr lang="en-US" dirty="0" smtClean="0"/>
-              <a:t>(System Metaphor)</a:t>
-            </a:r>
-            <a:endParaRPr lang="en-US" dirty="0"/>
+              <a:t>A portable version of the UC schedule (no paper)</a:t>
+            </a:r>
+          </a:p>
+          <a:p>
+            <a:r>
+              <a:rPr lang="en-US" dirty="0" smtClean="0"/>
+              <a:t>You don’t always have internet access (a local copy wouldn’t be a bad thing)</a:t>
+            </a:r>
+          </a:p>
+          <a:p>
+            <a:r>
+              <a:rPr lang="en-US" dirty="0" smtClean="0"/>
+              <a:t>The current mobile schedule viewer sucks</a:t>
+            </a:r>
+          </a:p>
+          <a:p>
+            <a:r>
+              <a:rPr lang="en-US" dirty="0" smtClean="0"/>
+              <a:t>Contains room for notes and what not.</a:t>
+            </a:r>
+            <a:r>
+              <a:rPr lang="en-US" dirty="0" smtClean="0"/>
+              <a:t> </a:t>
+            </a:r>
+          </a:p>
+          <a:p>
+            <a:endParaRPr lang="en-US" dirty="0" smtClean="0"/>
           </a:p>
         </p:txBody>
       </p:sp>
@@ -4335,7 +8078,32 @@
           <a:bodyPr/>
           <a:lstStyle/>
           <a:p>
-            <a:endParaRPr lang="en-US"/>
+            <a:r>
+              <a:rPr lang="en-US" dirty="0" smtClean="0"/>
+              <a:t>User needs to log in with proper UC credentials</a:t>
+            </a:r>
+          </a:p>
+          <a:p>
+            <a:r>
+              <a:rPr lang="en-US" dirty="0" smtClean="0"/>
+              <a:t>User needs to be able to confirm online schedule before adding</a:t>
+            </a:r>
+          </a:p>
+          <a:p>
+            <a:r>
+              <a:rPr lang="en-US" dirty="0" smtClean="0"/>
+              <a:t>Events need to be added with a notification when everything is completed</a:t>
+            </a:r>
+          </a:p>
+          <a:p>
+            <a:r>
+              <a:rPr lang="en-US" dirty="0" smtClean="0"/>
+              <a:t>User needs to be able to update schedule </a:t>
+            </a:r>
+            <a:endParaRPr lang="en-US" dirty="0" smtClean="0"/>
+          </a:p>
+          <a:p>
+            <a:endParaRPr lang="en-US" dirty="0"/>
           </a:p>
         </p:txBody>
       </p:sp>
@@ -4399,10 +8167,34 @@
         </p:nvSpPr>
         <p:spPr/>
         <p:txBody>
-          <a:bodyPr/>
+          <a:bodyPr>
+            <a:normAutofit lnSpcReduction="10000"/>
+          </a:bodyPr>
           <a:lstStyle/>
           <a:p>
-            <a:endParaRPr lang="en-US"/>
+            <a:r>
+              <a:rPr lang="en-US" dirty="0" smtClean="0"/>
+              <a:t>Application needs to perform smoothly (non-specific requirements yet</a:t>
+            </a:r>
+          </a:p>
+          <a:p>
+            <a:r>
+              <a:rPr lang="en-US" dirty="0" smtClean="0"/>
+              <a:t> Login credentials need to be secure (password field)</a:t>
+            </a:r>
+          </a:p>
+          <a:p>
+            <a:r>
+              <a:rPr lang="en-US" dirty="0" smtClean="0"/>
+              <a:t>Text and color need to be the same on each page.</a:t>
+            </a:r>
+          </a:p>
+          <a:p>
+            <a:r>
+              <a:rPr lang="en-US" dirty="0" smtClean="0"/>
+              <a:t>Calendar needs to account for the user updating the event(not overriding user changes)</a:t>
+            </a:r>
+            <a:endParaRPr lang="en-US" dirty="0"/>
           </a:p>
         </p:txBody>
       </p:sp>
@@ -4469,7 +8261,29 @@
           <a:bodyPr/>
           <a:lstStyle/>
           <a:p>
-            <a:endParaRPr lang="en-US"/>
+            <a:r>
+              <a:rPr lang="en-US" dirty="0" smtClean="0"/>
+              <a:t>A basic GUI for the login page has been implemented</a:t>
+            </a:r>
+          </a:p>
+          <a:p>
+            <a:r>
+              <a:rPr lang="en-US" dirty="0" smtClean="0"/>
+              <a:t>The calendar can be opened within the app</a:t>
+            </a:r>
+          </a:p>
+          <a:p>
+            <a:r>
+              <a:rPr lang="en-US" dirty="0" smtClean="0"/>
+              <a:t>Events can be added without any user prompting</a:t>
+            </a:r>
+          </a:p>
+          <a:p>
+            <a:r>
+              <a:rPr lang="en-US" dirty="0" smtClean="0"/>
+              <a:t>Test cases for add Event have been implemented.</a:t>
+            </a:r>
+            <a:endParaRPr lang="en-US" dirty="0"/>
           </a:p>
         </p:txBody>
       </p:sp>
@@ -4536,7 +8350,41 @@
           <a:bodyPr/>
           <a:lstStyle/>
           <a:p>
-            <a:endParaRPr lang="en-US"/>
+            <a:r>
+              <a:rPr lang="en-US" dirty="0" smtClean="0"/>
+              <a:t>With the </a:t>
+            </a:r>
+            <a:r>
+              <a:rPr lang="en-US" dirty="0" smtClean="0"/>
+              <a:t>UC Scheduling </a:t>
+            </a:r>
+            <a:r>
+              <a:rPr lang="en-US" dirty="0" smtClean="0"/>
+              <a:t>API, we plan to test the login credentials using a test account</a:t>
+            </a:r>
+          </a:p>
+          <a:p>
+            <a:r>
+              <a:rPr lang="en-US" dirty="0" smtClean="0"/>
+              <a:t>Once that is done, we will tr</a:t>
+            </a:r>
+            <a:r>
+              <a:rPr lang="en-US" dirty="0" smtClean="0"/>
+              <a:t>y to sort the schedule into events that we can put on the calendar and… put them on the calendar</a:t>
+            </a:r>
+          </a:p>
+          <a:p>
+            <a:r>
+              <a:rPr lang="en-US" dirty="0" smtClean="0"/>
+              <a:t>After that, we will try to add custom fields to make it easy for the user to input data.</a:t>
+            </a:r>
+          </a:p>
+          <a:p>
+            <a:r>
+              <a:rPr lang="en-US" dirty="0" smtClean="0"/>
+              <a:t>Test in between each phase.</a:t>
+            </a:r>
+            <a:endParaRPr lang="en-US" dirty="0"/>
           </a:p>
         </p:txBody>
       </p:sp>
@@ -4603,7 +8451,41 @@
           <a:bodyPr/>
           <a:lstStyle/>
           <a:p>
-            <a:endParaRPr lang="en-US"/>
+            <a:r>
+              <a:rPr lang="en-US" dirty="0" smtClean="0"/>
+              <a:t>GUI created (completed)</a:t>
+            </a:r>
+          </a:p>
+          <a:p>
+            <a:r>
+              <a:rPr lang="en-US" dirty="0" smtClean="0"/>
+              <a:t>Calendar in app (completed)</a:t>
+            </a:r>
+          </a:p>
+          <a:p>
+            <a:r>
+              <a:rPr lang="en-US" dirty="0" smtClean="0"/>
+              <a:t>Add event to calendar without intent (completed)</a:t>
+            </a:r>
+          </a:p>
+          <a:p>
+            <a:r>
+              <a:rPr lang="en-US" dirty="0" smtClean="0"/>
+              <a:t>Login to UC</a:t>
+            </a:r>
+          </a:p>
+          <a:p>
+            <a:r>
+              <a:rPr lang="en-US" dirty="0" smtClean="0"/>
+              <a:t>Download schedule</a:t>
+            </a:r>
+          </a:p>
+          <a:p>
+            <a:r>
+              <a:rPr lang="en-US" dirty="0" smtClean="0"/>
+              <a:t>Add custom fields</a:t>
+            </a:r>
+            <a:endParaRPr lang="en-US" dirty="0"/>
           </a:p>
         </p:txBody>
       </p:sp>

</xml_diff>

<commit_message>
Document and ppt changes
Changed system metaphor
Added meeting minutes 3 and 4
Updated ppt
</commit_message>
<xml_diff>
--- a/docs/UC Schedule App.pptx
+++ b/docs/UC Schedule App.pptx
@@ -128,249 +128,37 @@
 </file>
 
 <file path=ppt/diagrams/colors1.xml><?xml version="1.0" encoding="utf-8"?>
-<dgm:colorsDef xmlns:dgm="http://schemas.openxmlformats.org/drawingml/2006/diagram" xmlns:a="http://schemas.openxmlformats.org/drawingml/2006/main" uniqueId="urn:microsoft.com/office/officeart/2005/8/colors/accent2_1">
+<dgm:colorsDef xmlns:dgm="http://schemas.openxmlformats.org/drawingml/2006/diagram" xmlns:a="http://schemas.openxmlformats.org/drawingml/2006/main" uniqueId="urn:microsoft.com/office/officeart/2005/8/colors/accent2_2">
   <dgm:title val=""/>
   <dgm:desc val=""/>
   <dgm:catLst>
-    <dgm:cat type="accent2" pri="11100"/>
+    <dgm:cat type="accent2" pri="11200"/>
   </dgm:catLst>
   <dgm:styleLbl name="node0">
     <dgm:fillClrLst meth="repeat">
-      <a:schemeClr val="lt1"/>
+      <a:schemeClr val="accent2"/>
     </dgm:fillClrLst>
     <dgm:linClrLst meth="repeat">
-      <a:schemeClr val="accent2">
-        <a:shade val="80000"/>
-      </a:schemeClr>
-    </dgm:linClrLst>
-    <dgm:effectClrLst/>
-    <dgm:txLinClrLst/>
-    <dgm:txFillClrLst meth="repeat">
-      <a:schemeClr val="dk1"/>
-    </dgm:txFillClrLst>
-    <dgm:txEffectClrLst/>
-  </dgm:styleLbl>
-  <dgm:styleLbl name="node1">
-    <dgm:fillClrLst meth="repeat">
       <a:schemeClr val="lt1"/>
-    </dgm:fillClrLst>
-    <dgm:linClrLst meth="repeat">
-      <a:schemeClr val="accent2">
-        <a:shade val="80000"/>
-      </a:schemeClr>
-    </dgm:linClrLst>
-    <dgm:effectClrLst/>
-    <dgm:txLinClrLst/>
-    <dgm:txFillClrLst meth="repeat">
-      <a:schemeClr val="dk1"/>
-    </dgm:txFillClrLst>
-    <dgm:txEffectClrLst/>
-  </dgm:styleLbl>
-  <dgm:styleLbl name="alignNode1">
-    <dgm:fillClrLst meth="repeat">
-      <a:schemeClr val="lt1"/>
-    </dgm:fillClrLst>
-    <dgm:linClrLst meth="repeat">
-      <a:schemeClr val="accent2">
-        <a:shade val="80000"/>
-      </a:schemeClr>
-    </dgm:linClrLst>
-    <dgm:effectClrLst/>
-    <dgm:txLinClrLst/>
-    <dgm:txFillClrLst meth="repeat">
-      <a:schemeClr val="dk1"/>
-    </dgm:txFillClrLst>
-    <dgm:txEffectClrLst/>
-  </dgm:styleLbl>
-  <dgm:styleLbl name="lnNode1">
-    <dgm:fillClrLst meth="repeat">
-      <a:schemeClr val="lt1"/>
-    </dgm:fillClrLst>
-    <dgm:linClrLst meth="repeat">
-      <a:schemeClr val="accent2">
-        <a:shade val="80000"/>
-      </a:schemeClr>
-    </dgm:linClrLst>
-    <dgm:effectClrLst/>
-    <dgm:txLinClrLst/>
-    <dgm:txFillClrLst meth="repeat">
-      <a:schemeClr val="dk1"/>
-    </dgm:txFillClrLst>
-    <dgm:txEffectClrLst/>
-  </dgm:styleLbl>
-  <dgm:styleLbl name="vennNode1">
-    <dgm:fillClrLst meth="repeat">
-      <a:schemeClr val="lt1">
-        <a:alpha val="50000"/>
-      </a:schemeClr>
-    </dgm:fillClrLst>
-    <dgm:linClrLst meth="repeat">
-      <a:schemeClr val="accent2">
-        <a:shade val="80000"/>
-      </a:schemeClr>
     </dgm:linClrLst>
     <dgm:effectClrLst/>
     <dgm:txLinClrLst/>
     <dgm:txFillClrLst/>
     <dgm:txEffectClrLst/>
   </dgm:styleLbl>
-  <dgm:styleLbl name="node2">
+  <dgm:styleLbl name="node1">
     <dgm:fillClrLst meth="repeat">
-      <a:schemeClr val="lt1"/>
+      <a:schemeClr val="accent2"/>
     </dgm:fillClrLst>
     <dgm:linClrLst meth="repeat">
-      <a:schemeClr val="accent2">
-        <a:shade val="80000"/>
-      </a:schemeClr>
+      <a:schemeClr val="lt1"/>
     </dgm:linClrLst>
     <dgm:effectClrLst/>
     <dgm:txLinClrLst/>
-    <dgm:txFillClrLst meth="repeat">
-      <a:schemeClr val="dk1"/>
-    </dgm:txFillClrLst>
+    <dgm:txFillClrLst/>
     <dgm:txEffectClrLst/>
   </dgm:styleLbl>
-  <dgm:styleLbl name="node3">
-    <dgm:fillClrLst meth="repeat">
-      <a:schemeClr val="lt1"/>
-    </dgm:fillClrLst>
-    <dgm:linClrLst meth="repeat">
-      <a:schemeClr val="accent2">
-        <a:shade val="80000"/>
-      </a:schemeClr>
-    </dgm:linClrLst>
-    <dgm:effectClrLst/>
-    <dgm:txLinClrLst/>
-    <dgm:txFillClrLst meth="repeat">
-      <a:schemeClr val="dk1"/>
-    </dgm:txFillClrLst>
-    <dgm:txEffectClrLst/>
-  </dgm:styleLbl>
-  <dgm:styleLbl name="node4">
-    <dgm:fillClrLst meth="repeat">
-      <a:schemeClr val="lt1"/>
-    </dgm:fillClrLst>
-    <dgm:linClrLst meth="repeat">
-      <a:schemeClr val="accent2">
-        <a:shade val="80000"/>
-      </a:schemeClr>
-    </dgm:linClrLst>
-    <dgm:effectClrLst/>
-    <dgm:txLinClrLst/>
-    <dgm:txFillClrLst meth="repeat">
-      <a:schemeClr val="dk1"/>
-    </dgm:txFillClrLst>
-    <dgm:txEffectClrLst/>
-  </dgm:styleLbl>
-  <dgm:styleLbl name="fgImgPlace1">
-    <dgm:fillClrLst meth="repeat">
-      <a:schemeClr val="accent2">
-        <a:tint val="40000"/>
-      </a:schemeClr>
-    </dgm:fillClrLst>
-    <dgm:linClrLst meth="repeat">
-      <a:schemeClr val="accent2">
-        <a:shade val="80000"/>
-      </a:schemeClr>
-    </dgm:linClrLst>
-    <dgm:effectClrLst/>
-    <dgm:txLinClrLst/>
-    <dgm:txFillClrLst meth="repeat">
-      <a:schemeClr val="lt1"/>
-    </dgm:txFillClrLst>
-    <dgm:txEffectClrLst/>
-  </dgm:styleLbl>
-  <dgm:styleLbl name="alignImgPlace1">
-    <dgm:fillClrLst meth="repeat">
-      <a:schemeClr val="accent2">
-        <a:tint val="40000"/>
-      </a:schemeClr>
-    </dgm:fillClrLst>
-    <dgm:linClrLst meth="repeat">
-      <a:schemeClr val="accent2">
-        <a:shade val="80000"/>
-      </a:schemeClr>
-    </dgm:linClrLst>
-    <dgm:effectClrLst/>
-    <dgm:txLinClrLst/>
-    <dgm:txFillClrLst meth="repeat">
-      <a:schemeClr val="lt1"/>
-    </dgm:txFillClrLst>
-    <dgm:txEffectClrLst/>
-  </dgm:styleLbl>
-  <dgm:styleLbl name="bgImgPlace1">
-    <dgm:fillClrLst meth="repeat">
-      <a:schemeClr val="accent2">
-        <a:tint val="40000"/>
-      </a:schemeClr>
-    </dgm:fillClrLst>
-    <dgm:linClrLst meth="repeat">
-      <a:schemeClr val="accent2">
-        <a:shade val="80000"/>
-      </a:schemeClr>
-    </dgm:linClrLst>
-    <dgm:effectClrLst/>
-    <dgm:txLinClrLst/>
-    <dgm:txFillClrLst meth="repeat">
-      <a:schemeClr val="lt1"/>
-    </dgm:txFillClrLst>
-    <dgm:txEffectClrLst/>
-  </dgm:styleLbl>
-  <dgm:styleLbl name="sibTrans2D1">
-    <dgm:fillClrLst meth="repeat">
-      <a:schemeClr val="accent2">
-        <a:tint val="60000"/>
-      </a:schemeClr>
-    </dgm:fillClrLst>
-    <dgm:linClrLst meth="repeat">
-      <a:schemeClr val="accent2">
-        <a:tint val="60000"/>
-      </a:schemeClr>
-    </dgm:linClrLst>
-    <dgm:effectClrLst/>
-    <dgm:txLinClrLst/>
-    <dgm:txFillClrLst meth="repeat">
-      <a:schemeClr val="dk1"/>
-    </dgm:txFillClrLst>
-    <dgm:txEffectClrLst/>
-  </dgm:styleLbl>
-  <dgm:styleLbl name="fgSibTrans2D1">
-    <dgm:fillClrLst meth="repeat">
-      <a:schemeClr val="accent2">
-        <a:tint val="60000"/>
-      </a:schemeClr>
-    </dgm:fillClrLst>
-    <dgm:linClrLst meth="repeat">
-      <a:schemeClr val="accent2">
-        <a:tint val="60000"/>
-      </a:schemeClr>
-    </dgm:linClrLst>
-    <dgm:effectClrLst/>
-    <dgm:txLinClrLst/>
-    <dgm:txFillClrLst meth="repeat">
-      <a:schemeClr val="dk1"/>
-    </dgm:txFillClrLst>
-    <dgm:txEffectClrLst/>
-  </dgm:styleLbl>
-  <dgm:styleLbl name="bgSibTrans2D1">
-    <dgm:fillClrLst meth="repeat">
-      <a:schemeClr val="accent2">
-        <a:tint val="60000"/>
-      </a:schemeClr>
-    </dgm:fillClrLst>
-    <dgm:linClrLst meth="repeat">
-      <a:schemeClr val="accent2">
-        <a:tint val="60000"/>
-      </a:schemeClr>
-    </dgm:linClrLst>
-    <dgm:effectClrLst/>
-    <dgm:txLinClrLst/>
-    <dgm:txFillClrLst meth="repeat">
-      <a:schemeClr val="dk1"/>
-    </dgm:txFillClrLst>
-    <dgm:txEffectClrLst/>
-  </dgm:styleLbl>
-  <dgm:styleLbl name="sibTrans1D1">
+  <dgm:styleLbl name="alignNode1">
     <dgm:fillClrLst meth="repeat">
       <a:schemeClr val="accent2"/>
     </dgm:fillClrLst>
@@ -379,106 +167,120 @@
     </dgm:linClrLst>
     <dgm:effectClrLst/>
     <dgm:txLinClrLst/>
-    <dgm:txFillClrLst meth="repeat">
-      <a:schemeClr val="tx1"/>
-    </dgm:txFillClrLst>
+    <dgm:txFillClrLst/>
     <dgm:txEffectClrLst/>
   </dgm:styleLbl>
-  <dgm:styleLbl name="callout">
+  <dgm:styleLbl name="lnNode1">
     <dgm:fillClrLst meth="repeat">
       <a:schemeClr val="accent2"/>
     </dgm:fillClrLst>
     <dgm:linClrLst meth="repeat">
+      <a:schemeClr val="lt1"/>
+    </dgm:linClrLst>
+    <dgm:effectClrLst/>
+    <dgm:txLinClrLst/>
+    <dgm:txFillClrLst/>
+    <dgm:txEffectClrLst/>
+  </dgm:styleLbl>
+  <dgm:styleLbl name="vennNode1">
+    <dgm:fillClrLst meth="repeat">
+      <a:schemeClr val="accent2">
+        <a:alpha val="50000"/>
+      </a:schemeClr>
+    </dgm:fillClrLst>
+    <dgm:linClrLst meth="repeat">
+      <a:schemeClr val="lt1"/>
+    </dgm:linClrLst>
+    <dgm:effectClrLst/>
+    <dgm:txLinClrLst/>
+    <dgm:txFillClrLst/>
+    <dgm:txEffectClrLst/>
+  </dgm:styleLbl>
+  <dgm:styleLbl name="node2">
+    <dgm:fillClrLst meth="repeat">
       <a:schemeClr val="accent2"/>
+    </dgm:fillClrLst>
+    <dgm:linClrLst meth="repeat">
+      <a:schemeClr val="lt1"/>
+    </dgm:linClrLst>
+    <dgm:effectClrLst/>
+    <dgm:txLinClrLst/>
+    <dgm:txFillClrLst/>
+    <dgm:txEffectClrLst/>
+  </dgm:styleLbl>
+  <dgm:styleLbl name="node3">
+    <dgm:fillClrLst meth="repeat">
+      <a:schemeClr val="accent2"/>
+    </dgm:fillClrLst>
+    <dgm:linClrLst meth="repeat">
+      <a:schemeClr val="lt1"/>
+    </dgm:linClrLst>
+    <dgm:effectClrLst/>
+    <dgm:txLinClrLst/>
+    <dgm:txFillClrLst/>
+    <dgm:txEffectClrLst/>
+  </dgm:styleLbl>
+  <dgm:styleLbl name="node4">
+    <dgm:fillClrLst meth="repeat">
+      <a:schemeClr val="accent2"/>
+    </dgm:fillClrLst>
+    <dgm:linClrLst meth="repeat">
+      <a:schemeClr val="lt1"/>
+    </dgm:linClrLst>
+    <dgm:effectClrLst/>
+    <dgm:txLinClrLst/>
+    <dgm:txFillClrLst/>
+    <dgm:txEffectClrLst/>
+  </dgm:styleLbl>
+  <dgm:styleLbl name="fgImgPlace1">
+    <dgm:fillClrLst meth="repeat">
+      <a:schemeClr val="accent2">
+        <a:tint val="50000"/>
+      </a:schemeClr>
+    </dgm:fillClrLst>
+    <dgm:linClrLst meth="repeat">
+      <a:schemeClr val="lt1"/>
     </dgm:linClrLst>
     <dgm:effectClrLst/>
     <dgm:txLinClrLst/>
     <dgm:txFillClrLst meth="repeat">
-      <a:schemeClr val="tx1"/>
+      <a:schemeClr val="lt1"/>
     </dgm:txFillClrLst>
     <dgm:txEffectClrLst/>
   </dgm:styleLbl>
-  <dgm:styleLbl name="asst0">
+  <dgm:styleLbl name="alignImgPlace1">
     <dgm:fillClrLst meth="repeat">
-      <a:schemeClr val="lt1"/>
+      <a:schemeClr val="accent2">
+        <a:tint val="50000"/>
+      </a:schemeClr>
     </dgm:fillClrLst>
     <dgm:linClrLst meth="repeat">
-      <a:schemeClr val="accent2">
-        <a:shade val="80000"/>
-      </a:schemeClr>
+      <a:schemeClr val="lt1"/>
     </dgm:linClrLst>
     <dgm:effectClrLst/>
     <dgm:txLinClrLst/>
     <dgm:txFillClrLst meth="repeat">
-      <a:schemeClr val="dk1"/>
+      <a:schemeClr val="lt1"/>
     </dgm:txFillClrLst>
     <dgm:txEffectClrLst/>
   </dgm:styleLbl>
-  <dgm:styleLbl name="asst1">
+  <dgm:styleLbl name="bgImgPlace1">
     <dgm:fillClrLst meth="repeat">
-      <a:schemeClr val="lt1"/>
+      <a:schemeClr val="accent2">
+        <a:tint val="50000"/>
+      </a:schemeClr>
     </dgm:fillClrLst>
     <dgm:linClrLst meth="repeat">
-      <a:schemeClr val="accent2">
-        <a:shade val="80000"/>
-      </a:schemeClr>
+      <a:schemeClr val="lt1"/>
     </dgm:linClrLst>
     <dgm:effectClrLst/>
     <dgm:txLinClrLst/>
     <dgm:txFillClrLst meth="repeat">
-      <a:schemeClr val="dk1"/>
+      <a:schemeClr val="lt1"/>
     </dgm:txFillClrLst>
     <dgm:txEffectClrLst/>
   </dgm:styleLbl>
-  <dgm:styleLbl name="asst2">
-    <dgm:fillClrLst meth="repeat">
-      <a:schemeClr val="lt1"/>
-    </dgm:fillClrLst>
-    <dgm:linClrLst meth="repeat">
-      <a:schemeClr val="accent2">
-        <a:shade val="80000"/>
-      </a:schemeClr>
-    </dgm:linClrLst>
-    <dgm:effectClrLst/>
-    <dgm:txLinClrLst/>
-    <dgm:txFillClrLst meth="repeat">
-      <a:schemeClr val="dk1"/>
-    </dgm:txFillClrLst>
-    <dgm:txEffectClrLst/>
-  </dgm:styleLbl>
-  <dgm:styleLbl name="asst3">
-    <dgm:fillClrLst meth="repeat">
-      <a:schemeClr val="lt1"/>
-    </dgm:fillClrLst>
-    <dgm:linClrLst meth="repeat">
-      <a:schemeClr val="accent2">
-        <a:shade val="80000"/>
-      </a:schemeClr>
-    </dgm:linClrLst>
-    <dgm:effectClrLst/>
-    <dgm:txLinClrLst/>
-    <dgm:txFillClrLst meth="repeat">
-      <a:schemeClr val="dk1"/>
-    </dgm:txFillClrLst>
-    <dgm:txEffectClrLst/>
-  </dgm:styleLbl>
-  <dgm:styleLbl name="asst4">
-    <dgm:fillClrLst meth="repeat">
-      <a:schemeClr val="lt1"/>
-    </dgm:fillClrLst>
-    <dgm:linClrLst meth="repeat">
-      <a:schemeClr val="accent2">
-        <a:shade val="80000"/>
-      </a:schemeClr>
-    </dgm:linClrLst>
-    <dgm:effectClrLst/>
-    <dgm:txLinClrLst/>
-    <dgm:txFillClrLst meth="repeat">
-      <a:schemeClr val="dk1"/>
-    </dgm:txFillClrLst>
-    <dgm:txEffectClrLst/>
-  </dgm:styleLbl>
-  <dgm:styleLbl name="parChTrans2D1">
+  <dgm:styleLbl name="sibTrans2D1">
     <dgm:fillClrLst meth="repeat">
       <a:schemeClr val="accent2">
         <a:tint val="60000"/>
@@ -494,6 +296,146 @@
     <dgm:txFillClrLst/>
     <dgm:txEffectClrLst/>
   </dgm:styleLbl>
+  <dgm:styleLbl name="fgSibTrans2D1">
+    <dgm:fillClrLst meth="repeat">
+      <a:schemeClr val="accent2">
+        <a:tint val="60000"/>
+      </a:schemeClr>
+    </dgm:fillClrLst>
+    <dgm:linClrLst meth="repeat">
+      <a:schemeClr val="accent2">
+        <a:tint val="60000"/>
+      </a:schemeClr>
+    </dgm:linClrLst>
+    <dgm:effectClrLst/>
+    <dgm:txLinClrLst/>
+    <dgm:txFillClrLst/>
+    <dgm:txEffectClrLst/>
+  </dgm:styleLbl>
+  <dgm:styleLbl name="bgSibTrans2D1">
+    <dgm:fillClrLst meth="repeat">
+      <a:schemeClr val="accent2">
+        <a:tint val="60000"/>
+      </a:schemeClr>
+    </dgm:fillClrLst>
+    <dgm:linClrLst meth="repeat">
+      <a:schemeClr val="accent2">
+        <a:tint val="60000"/>
+      </a:schemeClr>
+    </dgm:linClrLst>
+    <dgm:effectClrLst/>
+    <dgm:txLinClrLst/>
+    <dgm:txFillClrLst/>
+    <dgm:txEffectClrLst/>
+  </dgm:styleLbl>
+  <dgm:styleLbl name="sibTrans1D1">
+    <dgm:fillClrLst meth="repeat">
+      <a:schemeClr val="accent2"/>
+    </dgm:fillClrLst>
+    <dgm:linClrLst meth="repeat">
+      <a:schemeClr val="accent2"/>
+    </dgm:linClrLst>
+    <dgm:effectClrLst/>
+    <dgm:txLinClrLst/>
+    <dgm:txFillClrLst meth="repeat">
+      <a:schemeClr val="tx1"/>
+    </dgm:txFillClrLst>
+    <dgm:txEffectClrLst/>
+  </dgm:styleLbl>
+  <dgm:styleLbl name="callout">
+    <dgm:fillClrLst meth="repeat">
+      <a:schemeClr val="accent2"/>
+    </dgm:fillClrLst>
+    <dgm:linClrLst meth="repeat">
+      <a:schemeClr val="accent2">
+        <a:tint val="50000"/>
+      </a:schemeClr>
+    </dgm:linClrLst>
+    <dgm:effectClrLst/>
+    <dgm:txLinClrLst/>
+    <dgm:txFillClrLst meth="repeat">
+      <a:schemeClr val="tx1"/>
+    </dgm:txFillClrLst>
+    <dgm:txEffectClrLst/>
+  </dgm:styleLbl>
+  <dgm:styleLbl name="asst0">
+    <dgm:fillClrLst meth="repeat">
+      <a:schemeClr val="accent2"/>
+    </dgm:fillClrLst>
+    <dgm:linClrLst meth="repeat">
+      <a:schemeClr val="lt1"/>
+    </dgm:linClrLst>
+    <dgm:effectClrLst/>
+    <dgm:txLinClrLst/>
+    <dgm:txFillClrLst/>
+    <dgm:txEffectClrLst/>
+  </dgm:styleLbl>
+  <dgm:styleLbl name="asst1">
+    <dgm:fillClrLst meth="repeat">
+      <a:schemeClr val="accent2"/>
+    </dgm:fillClrLst>
+    <dgm:linClrLst meth="repeat">
+      <a:schemeClr val="lt1"/>
+    </dgm:linClrLst>
+    <dgm:effectClrLst/>
+    <dgm:txLinClrLst/>
+    <dgm:txFillClrLst/>
+    <dgm:txEffectClrLst/>
+  </dgm:styleLbl>
+  <dgm:styleLbl name="asst2">
+    <dgm:fillClrLst meth="repeat">
+      <a:schemeClr val="accent2"/>
+    </dgm:fillClrLst>
+    <dgm:linClrLst meth="repeat">
+      <a:schemeClr val="lt1"/>
+    </dgm:linClrLst>
+    <dgm:effectClrLst/>
+    <dgm:txLinClrLst/>
+    <dgm:txFillClrLst/>
+    <dgm:txEffectClrLst/>
+  </dgm:styleLbl>
+  <dgm:styleLbl name="asst3">
+    <dgm:fillClrLst meth="repeat">
+      <a:schemeClr val="accent2"/>
+    </dgm:fillClrLst>
+    <dgm:linClrLst meth="repeat">
+      <a:schemeClr val="lt1"/>
+    </dgm:linClrLst>
+    <dgm:effectClrLst/>
+    <dgm:txLinClrLst/>
+    <dgm:txFillClrLst/>
+    <dgm:txEffectClrLst/>
+  </dgm:styleLbl>
+  <dgm:styleLbl name="asst4">
+    <dgm:fillClrLst meth="repeat">
+      <a:schemeClr val="accent2"/>
+    </dgm:fillClrLst>
+    <dgm:linClrLst meth="repeat">
+      <a:schemeClr val="lt1"/>
+    </dgm:linClrLst>
+    <dgm:effectClrLst/>
+    <dgm:txLinClrLst/>
+    <dgm:txFillClrLst/>
+    <dgm:txEffectClrLst/>
+  </dgm:styleLbl>
+  <dgm:styleLbl name="parChTrans2D1">
+    <dgm:fillClrLst meth="repeat">
+      <a:schemeClr val="accent2">
+        <a:tint val="60000"/>
+      </a:schemeClr>
+    </dgm:fillClrLst>
+    <dgm:linClrLst meth="repeat">
+      <a:schemeClr val="accent2">
+        <a:tint val="60000"/>
+      </a:schemeClr>
+    </dgm:linClrLst>
+    <dgm:effectClrLst/>
+    <dgm:txLinClrLst/>
+    <dgm:txFillClrLst meth="repeat">
+      <a:schemeClr val="lt1"/>
+    </dgm:txFillClrLst>
+    <dgm:txEffectClrLst/>
+  </dgm:styleLbl>
   <dgm:styleLbl name="parChTrans2D2">
     <dgm:fillClrLst meth="repeat">
       <a:schemeClr val="accent2"/>
@@ -503,7 +445,9 @@
     </dgm:linClrLst>
     <dgm:effectClrLst/>
     <dgm:txLinClrLst/>
-    <dgm:txFillClrLst/>
+    <dgm:txFillClrLst meth="repeat">
+      <a:schemeClr val="lt1"/>
+    </dgm:txFillClrLst>
     <dgm:txEffectClrLst/>
   </dgm:styleLbl>
   <dgm:styleLbl name="parChTrans2D3">
@@ -515,7 +459,9 @@
     </dgm:linClrLst>
     <dgm:effectClrLst/>
     <dgm:txLinClrLst/>
-    <dgm:txFillClrLst/>
+    <dgm:txFillClrLst meth="repeat">
+      <a:schemeClr val="lt1"/>
+    </dgm:txFillClrLst>
     <dgm:txEffectClrLst/>
   </dgm:styleLbl>
   <dgm:styleLbl name="parChTrans2D4">
@@ -598,9 +544,8 @@
   </dgm:styleLbl>
   <dgm:styleLbl name="fgAcc1">
     <dgm:fillClrLst meth="repeat">
-      <a:schemeClr val="accent2">
+      <a:schemeClr val="lt1">
         <a:alpha val="90000"/>
-        <a:tint val="40000"/>
       </a:schemeClr>
     </dgm:fillClrLst>
     <dgm:linClrLst meth="repeat">
@@ -615,9 +560,8 @@
   </dgm:styleLbl>
   <dgm:styleLbl name="conFgAcc1">
     <dgm:fillClrLst meth="repeat">
-      <a:schemeClr val="accent2">
+      <a:schemeClr val="lt1">
         <a:alpha val="90000"/>
-        <a:tint val="40000"/>
       </a:schemeClr>
     </dgm:fillClrLst>
     <dgm:linClrLst meth="repeat">
@@ -632,9 +576,8 @@
   </dgm:styleLbl>
   <dgm:styleLbl name="alignAcc1">
     <dgm:fillClrLst meth="repeat">
-      <a:schemeClr val="accent2">
+      <a:schemeClr val="lt1">
         <a:alpha val="90000"/>
-        <a:tint val="40000"/>
       </a:schemeClr>
     </dgm:fillClrLst>
     <dgm:linClrLst meth="repeat">
@@ -649,9 +592,8 @@
   </dgm:styleLbl>
   <dgm:styleLbl name="trAlignAcc1">
     <dgm:fillClrLst meth="repeat">
-      <a:schemeClr val="accent2">
+      <a:schemeClr val="lt1">
         <a:alpha val="40000"/>
-        <a:tint val="40000"/>
       </a:schemeClr>
     </dgm:fillClrLst>
     <dgm:linClrLst meth="repeat">
@@ -666,9 +608,8 @@
   </dgm:styleLbl>
   <dgm:styleLbl name="bgAcc1">
     <dgm:fillClrLst meth="repeat">
-      <a:schemeClr val="accent2">
+      <a:schemeClr val="lt1">
         <a:alpha val="90000"/>
-        <a:tint val="40000"/>
       </a:schemeClr>
     </dgm:fillClrLst>
     <dgm:linClrLst meth="repeat">
@@ -725,7 +666,7 @@
   </dgm:styleLbl>
   <dgm:styleLbl name="fgAccFollowNode1">
     <dgm:fillClrLst meth="repeat">
-      <a:schemeClr val="lt1">
+      <a:schemeClr val="accent2">
         <a:alpha val="90000"/>
         <a:tint val="40000"/>
       </a:schemeClr>
@@ -733,6 +674,7 @@
     <dgm:linClrLst meth="repeat">
       <a:schemeClr val="accent2">
         <a:alpha val="90000"/>
+        <a:tint val="40000"/>
       </a:schemeClr>
     </dgm:linClrLst>
     <dgm:effectClrLst/>
@@ -744,7 +686,7 @@
   </dgm:styleLbl>
   <dgm:styleLbl name="alignAccFollowNode1">
     <dgm:fillClrLst meth="repeat">
-      <a:schemeClr val="lt1">
+      <a:schemeClr val="accent2">
         <a:alpha val="90000"/>
         <a:tint val="40000"/>
       </a:schemeClr>
@@ -752,6 +694,7 @@
     <dgm:linClrLst meth="repeat">
       <a:schemeClr val="accent2">
         <a:alpha val="90000"/>
+        <a:tint val="40000"/>
       </a:schemeClr>
     </dgm:linClrLst>
     <dgm:effectClrLst/>
@@ -763,7 +706,7 @@
   </dgm:styleLbl>
   <dgm:styleLbl name="bgAccFollowNode1">
     <dgm:fillClrLst meth="repeat">
-      <a:schemeClr val="lt1">
+      <a:schemeClr val="accent2">
         <a:alpha val="90000"/>
         <a:tint val="40000"/>
       </a:schemeClr>
@@ -771,6 +714,7 @@
     <dgm:linClrLst meth="repeat">
       <a:schemeClr val="accent2">
         <a:alpha val="90000"/>
+        <a:tint val="40000"/>
       </a:schemeClr>
     </dgm:linClrLst>
     <dgm:effectClrLst/>
@@ -782,9 +726,8 @@
   </dgm:styleLbl>
   <dgm:styleLbl name="fgAcc0">
     <dgm:fillClrLst meth="repeat">
-      <a:schemeClr val="accent2">
+      <a:schemeClr val="lt1">
         <a:alpha val="90000"/>
-        <a:tint val="40000"/>
       </a:schemeClr>
     </dgm:fillClrLst>
     <dgm:linClrLst meth="repeat">
@@ -799,9 +742,8 @@
   </dgm:styleLbl>
   <dgm:styleLbl name="fgAcc2">
     <dgm:fillClrLst meth="repeat">
-      <a:schemeClr val="accent2">
+      <a:schemeClr val="lt1">
         <a:alpha val="90000"/>
-        <a:tint val="40000"/>
       </a:schemeClr>
     </dgm:fillClrLst>
     <dgm:linClrLst meth="repeat">
@@ -816,9 +758,8 @@
   </dgm:styleLbl>
   <dgm:styleLbl name="fgAcc3">
     <dgm:fillClrLst meth="repeat">
-      <a:schemeClr val="accent2">
+      <a:schemeClr val="lt1">
         <a:alpha val="90000"/>
-        <a:tint val="40000"/>
       </a:schemeClr>
     </dgm:fillClrLst>
     <dgm:linClrLst meth="repeat">
@@ -833,9 +774,8 @@
   </dgm:styleLbl>
   <dgm:styleLbl name="fgAcc4">
     <dgm:fillClrLst meth="repeat">
-      <a:schemeClr val="accent2">
+      <a:schemeClr val="lt1">
         <a:alpha val="90000"/>
-        <a:tint val="40000"/>
       </a:schemeClr>
     </dgm:fillClrLst>
     <dgm:linClrLst meth="repeat">
@@ -938,18 +878,18 @@
 <dgm:dataModel xmlns:dgm="http://schemas.openxmlformats.org/drawingml/2006/diagram" xmlns:a="http://schemas.openxmlformats.org/drawingml/2006/main">
   <dgm:ptLst>
     <dgm:pt modelId="{A534EB3D-2129-42E3-8314-9E978BEBD610}" type="doc">
-      <dgm:prSet loTypeId="urn:microsoft.com/office/officeart/2005/8/layout/chevron1" loCatId="process" qsTypeId="urn:microsoft.com/office/officeart/2005/8/quickstyle/simple2" qsCatId="simple" csTypeId="urn:microsoft.com/office/officeart/2005/8/colors/accent2_1" csCatId="accent2" phldr="1"/>
+      <dgm:prSet loTypeId="urn:microsoft.com/office/officeart/2005/8/layout/hProcess11" loCatId="process" qsTypeId="urn:microsoft.com/office/officeart/2005/8/quickstyle/simple5" qsCatId="simple" csTypeId="urn:microsoft.com/office/officeart/2005/8/colors/accent2_2" csCatId="accent2" phldr="1"/>
       <dgm:spPr/>
     </dgm:pt>
     <dgm:pt modelId="{2838BFAF-75F4-4AEC-9DFE-4D98FE8D6623}">
-      <dgm:prSet phldrT="[Text]"/>
+      <dgm:prSet phldrT="[Text]" custT="1"/>
       <dgm:spPr/>
       <dgm:t>
         <a:bodyPr/>
         <a:lstStyle/>
         <a:p>
           <a:r>
-            <a:rPr lang="en-US"/>
+            <a:rPr lang="en-US" sz="1600" dirty="0"/>
             <a:t>May 28 2013: added Basic GUI</a:t>
           </a:r>
         </a:p>
@@ -978,14 +918,14 @@
       </dgm:t>
     </dgm:pt>
     <dgm:pt modelId="{6E8FBBC6-F53C-4A3A-B36E-6DE3434A9D64}">
-      <dgm:prSet phldrT="[Text]"/>
+      <dgm:prSet phldrT="[Text]" custT="1"/>
       <dgm:spPr/>
       <dgm:t>
         <a:bodyPr/>
         <a:lstStyle/>
         <a:p>
           <a:r>
-            <a:rPr lang="en-US"/>
+            <a:rPr lang="en-US" sz="1600" dirty="0"/>
             <a:t>June 11: added phone calendar in app</a:t>
           </a:r>
         </a:p>
@@ -1014,14 +954,14 @@
       </dgm:t>
     </dgm:pt>
     <dgm:pt modelId="{AD663DE4-A230-4099-8096-E51904E0EE7C}">
-      <dgm:prSet phldrT="[Text]"/>
+      <dgm:prSet phldrT="[Text]" custT="1"/>
       <dgm:spPr/>
       <dgm:t>
         <a:bodyPr/>
         <a:lstStyle/>
         <a:p>
           <a:r>
-            <a:rPr lang="en-US"/>
+            <a:rPr lang="en-US" sz="1600" dirty="0"/>
             <a:t>June 25: Able to Add Event without user prompting</a:t>
           </a:r>
         </a:p>
@@ -1050,14 +990,14 @@
       </dgm:t>
     </dgm:pt>
     <dgm:pt modelId="{5246842F-3E00-4E21-9571-E87756375A5C}">
-      <dgm:prSet phldrT="[Text]"/>
+      <dgm:prSet phldrT="[Text]" custT="1"/>
       <dgm:spPr/>
       <dgm:t>
         <a:bodyPr/>
         <a:lstStyle/>
         <a:p>
           <a:r>
-            <a:rPr lang="en-US"/>
+            <a:rPr lang="en-US" sz="1600" dirty="0"/>
             <a:t>Early July: User is able to login using UC credentials</a:t>
           </a:r>
         </a:p>
@@ -1086,14 +1026,14 @@
       </dgm:t>
     </dgm:pt>
     <dgm:pt modelId="{2FF714C8-E81D-4348-95F5-F674DB1D8776}">
-      <dgm:prSet phldrT="[Text]"/>
+      <dgm:prSet phldrT="[Text]" custT="1"/>
       <dgm:spPr/>
       <dgm:t>
         <a:bodyPr/>
         <a:lstStyle/>
         <a:p>
           <a:r>
-            <a:rPr lang="en-US"/>
+            <a:rPr lang="en-US" sz="1600" dirty="0"/>
             <a:t>Mid July: User is able to download their schedule into their phone</a:t>
           </a:r>
         </a:p>
@@ -1122,16 +1062,21 @@
       </dgm:t>
     </dgm:pt>
     <dgm:pt modelId="{BE973D81-101D-464C-A587-CAEE6370FAFC}">
-      <dgm:prSet phldrT="[Text]"/>
+      <dgm:prSet phldrT="[Text]" custT="1"/>
       <dgm:spPr/>
       <dgm:t>
         <a:bodyPr/>
         <a:lstStyle/>
         <a:p>
           <a:r>
-            <a:rPr lang="en-US"/>
-            <a:t>Late Mid July: User is able to edit events using custom fields</a:t>
+            <a:rPr lang="en-US" sz="1600" dirty="0"/>
+            <a:t>Late Mid July</a:t>
           </a:r>
+          <a:r>
+            <a:rPr lang="en-US" sz="1600" dirty="0" smtClean="0"/>
+            <a:t>: User is able to edit events using custom fields</a:t>
+          </a:r>
+          <a:endParaRPr lang="en-US" sz="1600" dirty="0"/>
         </a:p>
       </dgm:t>
     </dgm:pt>
@@ -1157,21 +1102,30 @@
         </a:p>
       </dgm:t>
     </dgm:pt>
-    <dgm:pt modelId="{4F72C680-B240-44BA-8B39-636761DE1146}" type="pres">
+    <dgm:pt modelId="{67B2BCEB-1DC8-48C6-AEA6-A9AC671DB9A3}" type="pres">
       <dgm:prSet presAssocID="{A534EB3D-2129-42E3-8314-9E978BEBD610}" presName="Name0" presStyleCnt="0">
         <dgm:presLayoutVars>
           <dgm:dir/>
-          <dgm:animLvl val="lvl"/>
           <dgm:resizeHandles val="exact"/>
         </dgm:presLayoutVars>
       </dgm:prSet>
       <dgm:spPr/>
     </dgm:pt>
-    <dgm:pt modelId="{ED1F802A-EC6B-4AD1-9BC2-604DD1228609}" type="pres">
-      <dgm:prSet presAssocID="{2838BFAF-75F4-4AEC-9DFE-4D98FE8D6623}" presName="parTxOnly" presStyleLbl="node1" presStyleIdx="0" presStyleCnt="6">
+    <dgm:pt modelId="{919F12E4-B3D8-4D76-9844-F39C076B4389}" type="pres">
+      <dgm:prSet presAssocID="{A534EB3D-2129-42E3-8314-9E978BEBD610}" presName="arrow" presStyleLbl="bgShp" presStyleIdx="0" presStyleCnt="1"/>
+      <dgm:spPr/>
+    </dgm:pt>
+    <dgm:pt modelId="{C3250EB5-9BC6-449F-8023-E9877E9ED594}" type="pres">
+      <dgm:prSet presAssocID="{A534EB3D-2129-42E3-8314-9E978BEBD610}" presName="points" presStyleCnt="0"/>
+      <dgm:spPr/>
+    </dgm:pt>
+    <dgm:pt modelId="{05C53E79-0FB8-48DC-81F0-B69656619F93}" type="pres">
+      <dgm:prSet presAssocID="{2838BFAF-75F4-4AEC-9DFE-4D98FE8D6623}" presName="compositeA" presStyleCnt="0"/>
+      <dgm:spPr/>
+    </dgm:pt>
+    <dgm:pt modelId="{2EB0D192-DBD9-4898-AE05-90F9583F6102}" type="pres">
+      <dgm:prSet presAssocID="{2838BFAF-75F4-4AEC-9DFE-4D98FE8D6623}" presName="textA" presStyleLbl="revTx" presStyleIdx="0" presStyleCnt="6">
         <dgm:presLayoutVars>
-          <dgm:chMax val="0"/>
-          <dgm:chPref val="0"/>
           <dgm:bulletEnabled val="1"/>
         </dgm:presLayoutVars>
       </dgm:prSet>
@@ -1184,15 +1138,25 @@
         </a:p>
       </dgm:t>
     </dgm:pt>
-    <dgm:pt modelId="{34C00F64-2B3C-46EB-BE2D-840A47603BD9}" type="pres">
-      <dgm:prSet presAssocID="{F748B180-38F6-4391-9D33-A5D6045642D4}" presName="parTxOnlySpace" presStyleCnt="0"/>
+    <dgm:pt modelId="{E36372B1-BE5B-4860-8975-15C51578710D}" type="pres">
+      <dgm:prSet presAssocID="{2838BFAF-75F4-4AEC-9DFE-4D98FE8D6623}" presName="circleA" presStyleLbl="node1" presStyleIdx="0" presStyleCnt="6"/>
       <dgm:spPr/>
     </dgm:pt>
-    <dgm:pt modelId="{89D7D2A4-3543-4390-96AD-7B1196999CE9}" type="pres">
-      <dgm:prSet presAssocID="{6E8FBBC6-F53C-4A3A-B36E-6DE3434A9D64}" presName="parTxOnly" presStyleLbl="node1" presStyleIdx="1" presStyleCnt="6">
+    <dgm:pt modelId="{A32D9D2A-2D2D-4739-98B9-D9228C0DB962}" type="pres">
+      <dgm:prSet presAssocID="{2838BFAF-75F4-4AEC-9DFE-4D98FE8D6623}" presName="spaceA" presStyleCnt="0"/>
+      <dgm:spPr/>
+    </dgm:pt>
+    <dgm:pt modelId="{F43FB3D1-C761-4C10-9830-76D26B498B5E}" type="pres">
+      <dgm:prSet presAssocID="{F748B180-38F6-4391-9D33-A5D6045642D4}" presName="space" presStyleCnt="0"/>
+      <dgm:spPr/>
+    </dgm:pt>
+    <dgm:pt modelId="{E1E74044-D8E8-4252-9122-0CB13F5BDB0A}" type="pres">
+      <dgm:prSet presAssocID="{6E8FBBC6-F53C-4A3A-B36E-6DE3434A9D64}" presName="compositeB" presStyleCnt="0"/>
+      <dgm:spPr/>
+    </dgm:pt>
+    <dgm:pt modelId="{3BD835FA-2A05-4374-8821-8CF674B28D48}" type="pres">
+      <dgm:prSet presAssocID="{6E8FBBC6-F53C-4A3A-B36E-6DE3434A9D64}" presName="textB" presStyleLbl="revTx" presStyleIdx="1" presStyleCnt="6">
         <dgm:presLayoutVars>
-          <dgm:chMax val="0"/>
-          <dgm:chPref val="0"/>
           <dgm:bulletEnabled val="1"/>
         </dgm:presLayoutVars>
       </dgm:prSet>
@@ -1205,15 +1169,25 @@
         </a:p>
       </dgm:t>
     </dgm:pt>
-    <dgm:pt modelId="{C253AD40-AE05-40D1-AE41-089AD6A4E040}" type="pres">
-      <dgm:prSet presAssocID="{EF78343D-8D72-461C-ACD7-97715B859967}" presName="parTxOnlySpace" presStyleCnt="0"/>
+    <dgm:pt modelId="{2D9CB9D8-2230-4D92-94FB-65FBAE615D35}" type="pres">
+      <dgm:prSet presAssocID="{6E8FBBC6-F53C-4A3A-B36E-6DE3434A9D64}" presName="circleB" presStyleLbl="node1" presStyleIdx="1" presStyleCnt="6"/>
       <dgm:spPr/>
     </dgm:pt>
-    <dgm:pt modelId="{72FB49D0-1D16-4101-9E66-ECC4EF9979BB}" type="pres">
-      <dgm:prSet presAssocID="{AD663DE4-A230-4099-8096-E51904E0EE7C}" presName="parTxOnly" presStyleLbl="node1" presStyleIdx="2" presStyleCnt="6" custLinFactNeighborX="2289" custLinFactNeighborY="4405">
+    <dgm:pt modelId="{0B0140E2-9314-4D54-8FA8-0ED49AD9F243}" type="pres">
+      <dgm:prSet presAssocID="{6E8FBBC6-F53C-4A3A-B36E-6DE3434A9D64}" presName="spaceB" presStyleCnt="0"/>
+      <dgm:spPr/>
+    </dgm:pt>
+    <dgm:pt modelId="{0FD8D836-B7F5-443B-A62C-C1642B6AC79B}" type="pres">
+      <dgm:prSet presAssocID="{EF78343D-8D72-461C-ACD7-97715B859967}" presName="space" presStyleCnt="0"/>
+      <dgm:spPr/>
+    </dgm:pt>
+    <dgm:pt modelId="{AD21F801-77E2-4489-A796-4B5AC1D8A60A}" type="pres">
+      <dgm:prSet presAssocID="{AD663DE4-A230-4099-8096-E51904E0EE7C}" presName="compositeA" presStyleCnt="0"/>
+      <dgm:spPr/>
+    </dgm:pt>
+    <dgm:pt modelId="{F1F40154-6763-46D5-9069-A7FE2A9D6775}" type="pres">
+      <dgm:prSet presAssocID="{AD663DE4-A230-4099-8096-E51904E0EE7C}" presName="textA" presStyleLbl="revTx" presStyleIdx="2" presStyleCnt="6">
         <dgm:presLayoutVars>
-          <dgm:chMax val="0"/>
-          <dgm:chPref val="0"/>
           <dgm:bulletEnabled val="1"/>
         </dgm:presLayoutVars>
       </dgm:prSet>
@@ -1226,15 +1200,25 @@
         </a:p>
       </dgm:t>
     </dgm:pt>
-    <dgm:pt modelId="{572163E4-079B-4A35-98C2-33E06655B8BB}" type="pres">
-      <dgm:prSet presAssocID="{FDD1B1AF-03B4-426A-B7F6-80164B66567B}" presName="parTxOnlySpace" presStyleCnt="0"/>
+    <dgm:pt modelId="{1DA19041-52FF-4B12-BBDD-3EAB8A916E19}" type="pres">
+      <dgm:prSet presAssocID="{AD663DE4-A230-4099-8096-E51904E0EE7C}" presName="circleA" presStyleLbl="node1" presStyleIdx="2" presStyleCnt="6"/>
       <dgm:spPr/>
     </dgm:pt>
-    <dgm:pt modelId="{654D7CDD-D9FD-4374-B274-929656793888}" type="pres">
-      <dgm:prSet presAssocID="{5246842F-3E00-4E21-9571-E87756375A5C}" presName="parTxOnly" presStyleLbl="node1" presStyleIdx="3" presStyleCnt="6">
+    <dgm:pt modelId="{8BA818A7-0F21-4737-B754-E42378A42179}" type="pres">
+      <dgm:prSet presAssocID="{AD663DE4-A230-4099-8096-E51904E0EE7C}" presName="spaceA" presStyleCnt="0"/>
+      <dgm:spPr/>
+    </dgm:pt>
+    <dgm:pt modelId="{2F55D03B-822C-4DFF-A29D-E245FFA6F972}" type="pres">
+      <dgm:prSet presAssocID="{FDD1B1AF-03B4-426A-B7F6-80164B66567B}" presName="space" presStyleCnt="0"/>
+      <dgm:spPr/>
+    </dgm:pt>
+    <dgm:pt modelId="{0EFA07A8-E4EA-4A6E-9A54-A1FF6FF962CB}" type="pres">
+      <dgm:prSet presAssocID="{5246842F-3E00-4E21-9571-E87756375A5C}" presName="compositeB" presStyleCnt="0"/>
+      <dgm:spPr/>
+    </dgm:pt>
+    <dgm:pt modelId="{4331F4DB-EFDD-41F0-BA61-CCCB4F607233}" type="pres">
+      <dgm:prSet presAssocID="{5246842F-3E00-4E21-9571-E87756375A5C}" presName="textB" presStyleLbl="revTx" presStyleIdx="3" presStyleCnt="6">
         <dgm:presLayoutVars>
-          <dgm:chMax val="0"/>
-          <dgm:chPref val="0"/>
           <dgm:bulletEnabled val="1"/>
         </dgm:presLayoutVars>
       </dgm:prSet>
@@ -1247,15 +1231,25 @@
         </a:p>
       </dgm:t>
     </dgm:pt>
-    <dgm:pt modelId="{1FFA1851-AF1D-417D-A237-8B0C3E8071C8}" type="pres">
-      <dgm:prSet presAssocID="{A72DA734-1422-4C2F-B5EB-10734F98AD9D}" presName="parTxOnlySpace" presStyleCnt="0"/>
+    <dgm:pt modelId="{00072152-31CB-4DB7-B9A8-0AB0F8BCD661}" type="pres">
+      <dgm:prSet presAssocID="{5246842F-3E00-4E21-9571-E87756375A5C}" presName="circleB" presStyleLbl="node1" presStyleIdx="3" presStyleCnt="6"/>
       <dgm:spPr/>
     </dgm:pt>
-    <dgm:pt modelId="{169ADD05-B2B8-4FC0-91EC-DD3F504552C3}" type="pres">
-      <dgm:prSet presAssocID="{2FF714C8-E81D-4348-95F5-F674DB1D8776}" presName="parTxOnly" presStyleLbl="node1" presStyleIdx="4" presStyleCnt="6">
+    <dgm:pt modelId="{601B44E2-1EFE-49CE-9E54-D902F9D58689}" type="pres">
+      <dgm:prSet presAssocID="{5246842F-3E00-4E21-9571-E87756375A5C}" presName="spaceB" presStyleCnt="0"/>
+      <dgm:spPr/>
+    </dgm:pt>
+    <dgm:pt modelId="{FA23871F-127F-42E0-8681-5E2822051ED8}" type="pres">
+      <dgm:prSet presAssocID="{A72DA734-1422-4C2F-B5EB-10734F98AD9D}" presName="space" presStyleCnt="0"/>
+      <dgm:spPr/>
+    </dgm:pt>
+    <dgm:pt modelId="{75159108-22E1-49E9-88B6-761ED2D91567}" type="pres">
+      <dgm:prSet presAssocID="{2FF714C8-E81D-4348-95F5-F674DB1D8776}" presName="compositeA" presStyleCnt="0"/>
+      <dgm:spPr/>
+    </dgm:pt>
+    <dgm:pt modelId="{2644E4AF-CCD3-4356-8C4B-D65B7DE606AF}" type="pres">
+      <dgm:prSet presAssocID="{2FF714C8-E81D-4348-95F5-F674DB1D8776}" presName="textA" presStyleLbl="revTx" presStyleIdx="4" presStyleCnt="6">
         <dgm:presLayoutVars>
-          <dgm:chMax val="0"/>
-          <dgm:chPref val="0"/>
           <dgm:bulletEnabled val="1"/>
         </dgm:presLayoutVars>
       </dgm:prSet>
@@ -1268,15 +1262,25 @@
         </a:p>
       </dgm:t>
     </dgm:pt>
-    <dgm:pt modelId="{1B890ACE-30E0-4440-8E8C-AF8E7E7BA999}" type="pres">
-      <dgm:prSet presAssocID="{0FE08777-DD97-45C3-A3C7-480AD17AFE66}" presName="parTxOnlySpace" presStyleCnt="0"/>
+    <dgm:pt modelId="{3DD7FA47-7F07-47B8-BC00-EE5E3CDC9446}" type="pres">
+      <dgm:prSet presAssocID="{2FF714C8-E81D-4348-95F5-F674DB1D8776}" presName="circleA" presStyleLbl="node1" presStyleIdx="4" presStyleCnt="6"/>
       <dgm:spPr/>
     </dgm:pt>
-    <dgm:pt modelId="{AEE062A1-1F6A-49D0-AF3B-9CA86DD5B7A2}" type="pres">
-      <dgm:prSet presAssocID="{BE973D81-101D-464C-A587-CAEE6370FAFC}" presName="parTxOnly" presStyleLbl="node1" presStyleIdx="5" presStyleCnt="6">
+    <dgm:pt modelId="{49D46546-B99D-409F-9233-D6213EF5A100}" type="pres">
+      <dgm:prSet presAssocID="{2FF714C8-E81D-4348-95F5-F674DB1D8776}" presName="spaceA" presStyleCnt="0"/>
+      <dgm:spPr/>
+    </dgm:pt>
+    <dgm:pt modelId="{138F5F25-0F74-4358-80B5-8BB6E14F5624}" type="pres">
+      <dgm:prSet presAssocID="{0FE08777-DD97-45C3-A3C7-480AD17AFE66}" presName="space" presStyleCnt="0"/>
+      <dgm:spPr/>
+    </dgm:pt>
+    <dgm:pt modelId="{0EA6A204-4499-4E9B-936F-97C01FD16AE6}" type="pres">
+      <dgm:prSet presAssocID="{BE973D81-101D-464C-A587-CAEE6370FAFC}" presName="compositeB" presStyleCnt="0"/>
+      <dgm:spPr/>
+    </dgm:pt>
+    <dgm:pt modelId="{9CBBCB3B-C286-4AEF-8B61-32E7E94B66BA}" type="pres">
+      <dgm:prSet presAssocID="{BE973D81-101D-464C-A587-CAEE6370FAFC}" presName="textB" presStyleLbl="revTx" presStyleIdx="5" presStyleCnt="6">
         <dgm:presLayoutVars>
-          <dgm:chMax val="0"/>
-          <dgm:chPref val="0"/>
           <dgm:bulletEnabled val="1"/>
         </dgm:presLayoutVars>
       </dgm:prSet>
@@ -1289,32 +1293,60 @@
         </a:p>
       </dgm:t>
     </dgm:pt>
+    <dgm:pt modelId="{CA34FBA4-8FB7-45BD-9CF5-DB47E36F0979}" type="pres">
+      <dgm:prSet presAssocID="{BE973D81-101D-464C-A587-CAEE6370FAFC}" presName="circleB" presStyleLbl="node1" presStyleIdx="5" presStyleCnt="6"/>
+      <dgm:spPr/>
+    </dgm:pt>
+    <dgm:pt modelId="{8297DFFD-0E90-4340-B22A-7A602F6940EF}" type="pres">
+      <dgm:prSet presAssocID="{BE973D81-101D-464C-A587-CAEE6370FAFC}" presName="spaceB" presStyleCnt="0"/>
+      <dgm:spPr/>
+    </dgm:pt>
   </dgm:ptLst>
   <dgm:cxnLst>
-    <dgm:cxn modelId="{40B18071-9C83-4AFA-B20C-CD359074B9D7}" type="presOf" srcId="{A534EB3D-2129-42E3-8314-9E978BEBD610}" destId="{4F72C680-B240-44BA-8B39-636761DE1146}" srcOrd="0" destOrd="0" presId="urn:microsoft.com/office/officeart/2005/8/layout/chevron1"/>
-    <dgm:cxn modelId="{795EFE5D-9543-452F-8031-E62AC578FA7A}" type="presOf" srcId="{BE973D81-101D-464C-A587-CAEE6370FAFC}" destId="{AEE062A1-1F6A-49D0-AF3B-9CA86DD5B7A2}" srcOrd="0" destOrd="0" presId="urn:microsoft.com/office/officeart/2005/8/layout/chevron1"/>
-    <dgm:cxn modelId="{48C4B0B4-E3C3-415F-B5A8-2FEC8D0D8F3D}" type="presOf" srcId="{5246842F-3E00-4E21-9571-E87756375A5C}" destId="{654D7CDD-D9FD-4374-B274-929656793888}" srcOrd="0" destOrd="0" presId="urn:microsoft.com/office/officeart/2005/8/layout/chevron1"/>
+    <dgm:cxn modelId="{A6BE473F-9EEE-487B-B84A-95C3358BFFF2}" srcId="{A534EB3D-2129-42E3-8314-9E978BEBD610}" destId="{2838BFAF-75F4-4AEC-9DFE-4D98FE8D6623}" srcOrd="0" destOrd="0" parTransId="{676E0993-904E-4A63-A630-20B055AD641E}" sibTransId="{F748B180-38F6-4391-9D33-A5D6045642D4}"/>
+    <dgm:cxn modelId="{3115A379-A3BA-437F-8602-42DF48842681}" type="presOf" srcId="{5246842F-3E00-4E21-9571-E87756375A5C}" destId="{4331F4DB-EFDD-41F0-BA61-CCCB4F607233}" srcOrd="0" destOrd="0" presId="urn:microsoft.com/office/officeart/2005/8/layout/hProcess11"/>
+    <dgm:cxn modelId="{EF04E71F-D60E-4F5A-A9CE-9415036C8E81}" srcId="{A534EB3D-2129-42E3-8314-9E978BEBD610}" destId="{2FF714C8-E81D-4348-95F5-F674DB1D8776}" srcOrd="4" destOrd="0" parTransId="{CDFF096F-497B-4A94-8CDE-E7EE3DAD7C9D}" sibTransId="{0FE08777-DD97-45C3-A3C7-480AD17AFE66}"/>
     <dgm:cxn modelId="{94872905-CE28-47D3-945E-31C2D1A24166}" srcId="{A534EB3D-2129-42E3-8314-9E978BEBD610}" destId="{BE973D81-101D-464C-A587-CAEE6370FAFC}" srcOrd="5" destOrd="0" parTransId="{0AB13CF0-F2AA-47DA-8B94-160C75D20983}" sibTransId="{66815BA7-9373-4B3A-99C1-A095CF1C6066}"/>
-    <dgm:cxn modelId="{A6BE473F-9EEE-487B-B84A-95C3358BFFF2}" srcId="{A534EB3D-2129-42E3-8314-9E978BEBD610}" destId="{2838BFAF-75F4-4AEC-9DFE-4D98FE8D6623}" srcOrd="0" destOrd="0" parTransId="{676E0993-904E-4A63-A630-20B055AD641E}" sibTransId="{F748B180-38F6-4391-9D33-A5D6045642D4}"/>
+    <dgm:cxn modelId="{4EF33B1C-96DF-4CDA-B8F7-D4AD60DEF7E7}" srcId="{A534EB3D-2129-42E3-8314-9E978BEBD610}" destId="{AD663DE4-A230-4099-8096-E51904E0EE7C}" srcOrd="2" destOrd="0" parTransId="{5330670D-366F-410C-A3CD-A78D21FE9C8E}" sibTransId="{FDD1B1AF-03B4-426A-B7F6-80164B66567B}"/>
+    <dgm:cxn modelId="{9C54D233-513C-40C9-8531-4A4800E57B5F}" type="presOf" srcId="{2838BFAF-75F4-4AEC-9DFE-4D98FE8D6623}" destId="{2EB0D192-DBD9-4898-AE05-90F9583F6102}" srcOrd="0" destOrd="0" presId="urn:microsoft.com/office/officeart/2005/8/layout/hProcess11"/>
+    <dgm:cxn modelId="{B644D726-028A-46F2-A361-F0A93B4598A9}" srcId="{A534EB3D-2129-42E3-8314-9E978BEBD610}" destId="{5246842F-3E00-4E21-9571-E87756375A5C}" srcOrd="3" destOrd="0" parTransId="{267C1D28-EC05-473C-839E-5EACDA20CF69}" sibTransId="{A72DA734-1422-4C2F-B5EB-10734F98AD9D}"/>
+    <dgm:cxn modelId="{E8153E39-F920-4CE2-B980-273B90F0E1FA}" type="presOf" srcId="{BE973D81-101D-464C-A587-CAEE6370FAFC}" destId="{9CBBCB3B-C286-4AEF-8B61-32E7E94B66BA}" srcOrd="0" destOrd="0" presId="urn:microsoft.com/office/officeart/2005/8/layout/hProcess11"/>
+    <dgm:cxn modelId="{BE90A68E-2887-4CE4-BB51-7134CCF9BFD9}" type="presOf" srcId="{AD663DE4-A230-4099-8096-E51904E0EE7C}" destId="{F1F40154-6763-46D5-9069-A7FE2A9D6775}" srcOrd="0" destOrd="0" presId="urn:microsoft.com/office/officeart/2005/8/layout/hProcess11"/>
+    <dgm:cxn modelId="{A5C8978E-6EDE-4BA9-84FD-A1BEE693D4BA}" type="presOf" srcId="{6E8FBBC6-F53C-4A3A-B36E-6DE3434A9D64}" destId="{3BD835FA-2A05-4374-8821-8CF674B28D48}" srcOrd="0" destOrd="0" presId="urn:microsoft.com/office/officeart/2005/8/layout/hProcess11"/>
+    <dgm:cxn modelId="{9203E10F-44C6-4822-BFEB-EDEE72E3A7D7}" type="presOf" srcId="{2FF714C8-E81D-4348-95F5-F674DB1D8776}" destId="{2644E4AF-CCD3-4356-8C4B-D65B7DE606AF}" srcOrd="0" destOrd="0" presId="urn:microsoft.com/office/officeart/2005/8/layout/hProcess11"/>
     <dgm:cxn modelId="{9262260D-8172-45F9-B821-926D0C58776B}" srcId="{A534EB3D-2129-42E3-8314-9E978BEBD610}" destId="{6E8FBBC6-F53C-4A3A-B36E-6DE3434A9D64}" srcOrd="1" destOrd="0" parTransId="{C7CF43CB-FB5F-466B-9D38-DACA1F98C512}" sibTransId="{EF78343D-8D72-461C-ACD7-97715B859967}"/>
-    <dgm:cxn modelId="{4EF33B1C-96DF-4CDA-B8F7-D4AD60DEF7E7}" srcId="{A534EB3D-2129-42E3-8314-9E978BEBD610}" destId="{AD663DE4-A230-4099-8096-E51904E0EE7C}" srcOrd="2" destOrd="0" parTransId="{5330670D-366F-410C-A3CD-A78D21FE9C8E}" sibTransId="{FDD1B1AF-03B4-426A-B7F6-80164B66567B}"/>
-    <dgm:cxn modelId="{EF04E71F-D60E-4F5A-A9CE-9415036C8E81}" srcId="{A534EB3D-2129-42E3-8314-9E978BEBD610}" destId="{2FF714C8-E81D-4348-95F5-F674DB1D8776}" srcOrd="4" destOrd="0" parTransId="{CDFF096F-497B-4A94-8CDE-E7EE3DAD7C9D}" sibTransId="{0FE08777-DD97-45C3-A3C7-480AD17AFE66}"/>
-    <dgm:cxn modelId="{BDFF53D4-3B4F-46D4-ADBE-E3595F7BC775}" type="presOf" srcId="{2838BFAF-75F4-4AEC-9DFE-4D98FE8D6623}" destId="{ED1F802A-EC6B-4AD1-9BC2-604DD1228609}" srcOrd="0" destOrd="0" presId="urn:microsoft.com/office/officeart/2005/8/layout/chevron1"/>
-    <dgm:cxn modelId="{F296CB21-74F3-4204-895E-1249D0659260}" type="presOf" srcId="{2FF714C8-E81D-4348-95F5-F674DB1D8776}" destId="{169ADD05-B2B8-4FC0-91EC-DD3F504552C3}" srcOrd="0" destOrd="0" presId="urn:microsoft.com/office/officeart/2005/8/layout/chevron1"/>
-    <dgm:cxn modelId="{31C37766-EF06-4B7F-B6A6-35C05B04F9AA}" type="presOf" srcId="{6E8FBBC6-F53C-4A3A-B36E-6DE3434A9D64}" destId="{89D7D2A4-3543-4390-96AD-7B1196999CE9}" srcOrd="0" destOrd="0" presId="urn:microsoft.com/office/officeart/2005/8/layout/chevron1"/>
-    <dgm:cxn modelId="{1A3C9592-1491-4A50-9095-7AAB29D25C0B}" type="presOf" srcId="{AD663DE4-A230-4099-8096-E51904E0EE7C}" destId="{72FB49D0-1D16-4101-9E66-ECC4EF9979BB}" srcOrd="0" destOrd="0" presId="urn:microsoft.com/office/officeart/2005/8/layout/chevron1"/>
-    <dgm:cxn modelId="{B644D726-028A-46F2-A361-F0A93B4598A9}" srcId="{A534EB3D-2129-42E3-8314-9E978BEBD610}" destId="{5246842F-3E00-4E21-9571-E87756375A5C}" srcOrd="3" destOrd="0" parTransId="{267C1D28-EC05-473C-839E-5EACDA20CF69}" sibTransId="{A72DA734-1422-4C2F-B5EB-10734F98AD9D}"/>
-    <dgm:cxn modelId="{836B7EB8-07F6-4F32-811B-515E016C53BD}" type="presParOf" srcId="{4F72C680-B240-44BA-8B39-636761DE1146}" destId="{ED1F802A-EC6B-4AD1-9BC2-604DD1228609}" srcOrd="0" destOrd="0" presId="urn:microsoft.com/office/officeart/2005/8/layout/chevron1"/>
-    <dgm:cxn modelId="{F2C51A07-4742-41DF-A78E-1A838306EC10}" type="presParOf" srcId="{4F72C680-B240-44BA-8B39-636761DE1146}" destId="{34C00F64-2B3C-46EB-BE2D-840A47603BD9}" srcOrd="1" destOrd="0" presId="urn:microsoft.com/office/officeart/2005/8/layout/chevron1"/>
-    <dgm:cxn modelId="{D10C45F9-8F72-4C8F-9C50-50E5DB5F85EB}" type="presParOf" srcId="{4F72C680-B240-44BA-8B39-636761DE1146}" destId="{89D7D2A4-3543-4390-96AD-7B1196999CE9}" srcOrd="2" destOrd="0" presId="urn:microsoft.com/office/officeart/2005/8/layout/chevron1"/>
-    <dgm:cxn modelId="{DA23056C-1D50-4D5E-9C59-C8C40F0110C9}" type="presParOf" srcId="{4F72C680-B240-44BA-8B39-636761DE1146}" destId="{C253AD40-AE05-40D1-AE41-089AD6A4E040}" srcOrd="3" destOrd="0" presId="urn:microsoft.com/office/officeart/2005/8/layout/chevron1"/>
-    <dgm:cxn modelId="{9527CCAE-5485-4E6E-9F29-FA29643C873F}" type="presParOf" srcId="{4F72C680-B240-44BA-8B39-636761DE1146}" destId="{72FB49D0-1D16-4101-9E66-ECC4EF9979BB}" srcOrd="4" destOrd="0" presId="urn:microsoft.com/office/officeart/2005/8/layout/chevron1"/>
-    <dgm:cxn modelId="{6589D452-A992-409D-B777-926E814A3247}" type="presParOf" srcId="{4F72C680-B240-44BA-8B39-636761DE1146}" destId="{572163E4-079B-4A35-98C2-33E06655B8BB}" srcOrd="5" destOrd="0" presId="urn:microsoft.com/office/officeart/2005/8/layout/chevron1"/>
-    <dgm:cxn modelId="{74775293-29D9-4397-808F-CA67436F9FED}" type="presParOf" srcId="{4F72C680-B240-44BA-8B39-636761DE1146}" destId="{654D7CDD-D9FD-4374-B274-929656793888}" srcOrd="6" destOrd="0" presId="urn:microsoft.com/office/officeart/2005/8/layout/chevron1"/>
-    <dgm:cxn modelId="{76DCCC08-3F96-4D9A-AEC2-19788CF375B2}" type="presParOf" srcId="{4F72C680-B240-44BA-8B39-636761DE1146}" destId="{1FFA1851-AF1D-417D-A237-8B0C3E8071C8}" srcOrd="7" destOrd="0" presId="urn:microsoft.com/office/officeart/2005/8/layout/chevron1"/>
-    <dgm:cxn modelId="{F06AC0E9-E74C-41C2-8762-E7429DB38BCE}" type="presParOf" srcId="{4F72C680-B240-44BA-8B39-636761DE1146}" destId="{169ADD05-B2B8-4FC0-91EC-DD3F504552C3}" srcOrd="8" destOrd="0" presId="urn:microsoft.com/office/officeart/2005/8/layout/chevron1"/>
-    <dgm:cxn modelId="{07896AAD-6D5D-426A-B684-6CDC2C4CA179}" type="presParOf" srcId="{4F72C680-B240-44BA-8B39-636761DE1146}" destId="{1B890ACE-30E0-4440-8E8C-AF8E7E7BA999}" srcOrd="9" destOrd="0" presId="urn:microsoft.com/office/officeart/2005/8/layout/chevron1"/>
-    <dgm:cxn modelId="{A870CFF7-BAE0-4871-BFA3-B8DC73A08ADC}" type="presParOf" srcId="{4F72C680-B240-44BA-8B39-636761DE1146}" destId="{AEE062A1-1F6A-49D0-AF3B-9CA86DD5B7A2}" srcOrd="10" destOrd="0" presId="urn:microsoft.com/office/officeart/2005/8/layout/chevron1"/>
+    <dgm:cxn modelId="{5F6B1CC9-3775-494E-8C85-852BA4F403CF}" type="presOf" srcId="{A534EB3D-2129-42E3-8314-9E978BEBD610}" destId="{67B2BCEB-1DC8-48C6-AEA6-A9AC671DB9A3}" srcOrd="0" destOrd="0" presId="urn:microsoft.com/office/officeart/2005/8/layout/hProcess11"/>
+    <dgm:cxn modelId="{31355BDC-F49E-4AB2-8688-73C2B0D410E1}" type="presParOf" srcId="{67B2BCEB-1DC8-48C6-AEA6-A9AC671DB9A3}" destId="{919F12E4-B3D8-4D76-9844-F39C076B4389}" srcOrd="0" destOrd="0" presId="urn:microsoft.com/office/officeart/2005/8/layout/hProcess11"/>
+    <dgm:cxn modelId="{069B60B0-8DAB-4423-8F32-E13B61999352}" type="presParOf" srcId="{67B2BCEB-1DC8-48C6-AEA6-A9AC671DB9A3}" destId="{C3250EB5-9BC6-449F-8023-E9877E9ED594}" srcOrd="1" destOrd="0" presId="urn:microsoft.com/office/officeart/2005/8/layout/hProcess11"/>
+    <dgm:cxn modelId="{F0F3C385-3B86-49E0-973C-8A730CC5D356}" type="presParOf" srcId="{C3250EB5-9BC6-449F-8023-E9877E9ED594}" destId="{05C53E79-0FB8-48DC-81F0-B69656619F93}" srcOrd="0" destOrd="0" presId="urn:microsoft.com/office/officeart/2005/8/layout/hProcess11"/>
+    <dgm:cxn modelId="{45198BC5-9342-437C-900C-20826BFE903D}" type="presParOf" srcId="{05C53E79-0FB8-48DC-81F0-B69656619F93}" destId="{2EB0D192-DBD9-4898-AE05-90F9583F6102}" srcOrd="0" destOrd="0" presId="urn:microsoft.com/office/officeart/2005/8/layout/hProcess11"/>
+    <dgm:cxn modelId="{41DCBC75-FCC1-40E4-B7D8-E3E3EDF08B9B}" type="presParOf" srcId="{05C53E79-0FB8-48DC-81F0-B69656619F93}" destId="{E36372B1-BE5B-4860-8975-15C51578710D}" srcOrd="1" destOrd="0" presId="urn:microsoft.com/office/officeart/2005/8/layout/hProcess11"/>
+    <dgm:cxn modelId="{358EF5C9-F937-4DDB-970C-C81982C74320}" type="presParOf" srcId="{05C53E79-0FB8-48DC-81F0-B69656619F93}" destId="{A32D9D2A-2D2D-4739-98B9-D9228C0DB962}" srcOrd="2" destOrd="0" presId="urn:microsoft.com/office/officeart/2005/8/layout/hProcess11"/>
+    <dgm:cxn modelId="{1D7B30B8-F1AA-4CE5-8A10-65E1AA830D72}" type="presParOf" srcId="{C3250EB5-9BC6-449F-8023-E9877E9ED594}" destId="{F43FB3D1-C761-4C10-9830-76D26B498B5E}" srcOrd="1" destOrd="0" presId="urn:microsoft.com/office/officeart/2005/8/layout/hProcess11"/>
+    <dgm:cxn modelId="{152D6E51-8215-4EA3-A7A4-AA786B66CF35}" type="presParOf" srcId="{C3250EB5-9BC6-449F-8023-E9877E9ED594}" destId="{E1E74044-D8E8-4252-9122-0CB13F5BDB0A}" srcOrd="2" destOrd="0" presId="urn:microsoft.com/office/officeart/2005/8/layout/hProcess11"/>
+    <dgm:cxn modelId="{4DA37A79-461B-4D39-A578-F1EE55765306}" type="presParOf" srcId="{E1E74044-D8E8-4252-9122-0CB13F5BDB0A}" destId="{3BD835FA-2A05-4374-8821-8CF674B28D48}" srcOrd="0" destOrd="0" presId="urn:microsoft.com/office/officeart/2005/8/layout/hProcess11"/>
+    <dgm:cxn modelId="{CABB8F23-B3B1-4417-A7DF-4963F23600B5}" type="presParOf" srcId="{E1E74044-D8E8-4252-9122-0CB13F5BDB0A}" destId="{2D9CB9D8-2230-4D92-94FB-65FBAE615D35}" srcOrd="1" destOrd="0" presId="urn:microsoft.com/office/officeart/2005/8/layout/hProcess11"/>
+    <dgm:cxn modelId="{09B111D6-4FD0-4B19-98A1-A91708D00FBA}" type="presParOf" srcId="{E1E74044-D8E8-4252-9122-0CB13F5BDB0A}" destId="{0B0140E2-9314-4D54-8FA8-0ED49AD9F243}" srcOrd="2" destOrd="0" presId="urn:microsoft.com/office/officeart/2005/8/layout/hProcess11"/>
+    <dgm:cxn modelId="{341C226C-9903-4F57-9B89-04CCC01A9F06}" type="presParOf" srcId="{C3250EB5-9BC6-449F-8023-E9877E9ED594}" destId="{0FD8D836-B7F5-443B-A62C-C1642B6AC79B}" srcOrd="3" destOrd="0" presId="urn:microsoft.com/office/officeart/2005/8/layout/hProcess11"/>
+    <dgm:cxn modelId="{0D455D97-EC24-474A-A4A9-E199A5014917}" type="presParOf" srcId="{C3250EB5-9BC6-449F-8023-E9877E9ED594}" destId="{AD21F801-77E2-4489-A796-4B5AC1D8A60A}" srcOrd="4" destOrd="0" presId="urn:microsoft.com/office/officeart/2005/8/layout/hProcess11"/>
+    <dgm:cxn modelId="{8E5F724B-687C-4F5D-8535-49F83177B266}" type="presParOf" srcId="{AD21F801-77E2-4489-A796-4B5AC1D8A60A}" destId="{F1F40154-6763-46D5-9069-A7FE2A9D6775}" srcOrd="0" destOrd="0" presId="urn:microsoft.com/office/officeart/2005/8/layout/hProcess11"/>
+    <dgm:cxn modelId="{9A409E25-279A-437A-ACF2-27D0624C6CAB}" type="presParOf" srcId="{AD21F801-77E2-4489-A796-4B5AC1D8A60A}" destId="{1DA19041-52FF-4B12-BBDD-3EAB8A916E19}" srcOrd="1" destOrd="0" presId="urn:microsoft.com/office/officeart/2005/8/layout/hProcess11"/>
+    <dgm:cxn modelId="{EA9A6CBA-D46D-4B4A-A5AE-53EE887C4E4E}" type="presParOf" srcId="{AD21F801-77E2-4489-A796-4B5AC1D8A60A}" destId="{8BA818A7-0F21-4737-B754-E42378A42179}" srcOrd="2" destOrd="0" presId="urn:microsoft.com/office/officeart/2005/8/layout/hProcess11"/>
+    <dgm:cxn modelId="{9E4E2A35-E716-4DD3-9ED2-BFEC8398FFD3}" type="presParOf" srcId="{C3250EB5-9BC6-449F-8023-E9877E9ED594}" destId="{2F55D03B-822C-4DFF-A29D-E245FFA6F972}" srcOrd="5" destOrd="0" presId="urn:microsoft.com/office/officeart/2005/8/layout/hProcess11"/>
+    <dgm:cxn modelId="{BFBCAEF5-7D5F-46BC-B827-7C8D7647836B}" type="presParOf" srcId="{C3250EB5-9BC6-449F-8023-E9877E9ED594}" destId="{0EFA07A8-E4EA-4A6E-9A54-A1FF6FF962CB}" srcOrd="6" destOrd="0" presId="urn:microsoft.com/office/officeart/2005/8/layout/hProcess11"/>
+    <dgm:cxn modelId="{41812660-4DDB-4688-A1CC-02726DE84333}" type="presParOf" srcId="{0EFA07A8-E4EA-4A6E-9A54-A1FF6FF962CB}" destId="{4331F4DB-EFDD-41F0-BA61-CCCB4F607233}" srcOrd="0" destOrd="0" presId="urn:microsoft.com/office/officeart/2005/8/layout/hProcess11"/>
+    <dgm:cxn modelId="{E16250B4-6A90-47B2-9092-00FE48E949CB}" type="presParOf" srcId="{0EFA07A8-E4EA-4A6E-9A54-A1FF6FF962CB}" destId="{00072152-31CB-4DB7-B9A8-0AB0F8BCD661}" srcOrd="1" destOrd="0" presId="urn:microsoft.com/office/officeart/2005/8/layout/hProcess11"/>
+    <dgm:cxn modelId="{4CDE5136-7C64-4A8E-B687-DBD7D8A931FA}" type="presParOf" srcId="{0EFA07A8-E4EA-4A6E-9A54-A1FF6FF962CB}" destId="{601B44E2-1EFE-49CE-9E54-D902F9D58689}" srcOrd="2" destOrd="0" presId="urn:microsoft.com/office/officeart/2005/8/layout/hProcess11"/>
+    <dgm:cxn modelId="{F17F3B99-8261-4AF5-A58E-76D42188BF5B}" type="presParOf" srcId="{C3250EB5-9BC6-449F-8023-E9877E9ED594}" destId="{FA23871F-127F-42E0-8681-5E2822051ED8}" srcOrd="7" destOrd="0" presId="urn:microsoft.com/office/officeart/2005/8/layout/hProcess11"/>
+    <dgm:cxn modelId="{15DAFFA1-5B4A-48EA-8FA4-78EBF6412581}" type="presParOf" srcId="{C3250EB5-9BC6-449F-8023-E9877E9ED594}" destId="{75159108-22E1-49E9-88B6-761ED2D91567}" srcOrd="8" destOrd="0" presId="urn:microsoft.com/office/officeart/2005/8/layout/hProcess11"/>
+    <dgm:cxn modelId="{61964E53-FE4B-4FA0-BCF3-1E8F5428E6D4}" type="presParOf" srcId="{75159108-22E1-49E9-88B6-761ED2D91567}" destId="{2644E4AF-CCD3-4356-8C4B-D65B7DE606AF}" srcOrd="0" destOrd="0" presId="urn:microsoft.com/office/officeart/2005/8/layout/hProcess11"/>
+    <dgm:cxn modelId="{207D6181-5769-4D79-AF87-9F070764040E}" type="presParOf" srcId="{75159108-22E1-49E9-88B6-761ED2D91567}" destId="{3DD7FA47-7F07-47B8-BC00-EE5E3CDC9446}" srcOrd="1" destOrd="0" presId="urn:microsoft.com/office/officeart/2005/8/layout/hProcess11"/>
+    <dgm:cxn modelId="{3E24F64A-41F3-48D2-9019-F6C37A3A1739}" type="presParOf" srcId="{75159108-22E1-49E9-88B6-761ED2D91567}" destId="{49D46546-B99D-409F-9233-D6213EF5A100}" srcOrd="2" destOrd="0" presId="urn:microsoft.com/office/officeart/2005/8/layout/hProcess11"/>
+    <dgm:cxn modelId="{C942601F-C116-463D-B295-C39D3766DD3D}" type="presParOf" srcId="{C3250EB5-9BC6-449F-8023-E9877E9ED594}" destId="{138F5F25-0F74-4358-80B5-8BB6E14F5624}" srcOrd="9" destOrd="0" presId="urn:microsoft.com/office/officeart/2005/8/layout/hProcess11"/>
+    <dgm:cxn modelId="{3791B52F-C382-43FD-9A82-CCF104E20A9C}" type="presParOf" srcId="{C3250EB5-9BC6-449F-8023-E9877E9ED594}" destId="{0EA6A204-4499-4E9B-936F-97C01FD16AE6}" srcOrd="10" destOrd="0" presId="urn:microsoft.com/office/officeart/2005/8/layout/hProcess11"/>
+    <dgm:cxn modelId="{A236779F-2FAA-47CB-98DA-3FC64475BDD7}" type="presParOf" srcId="{0EA6A204-4499-4E9B-936F-97C01FD16AE6}" destId="{9CBBCB3B-C286-4AEF-8B61-32E7E94B66BA}" srcOrd="0" destOrd="0" presId="urn:microsoft.com/office/officeart/2005/8/layout/hProcess11"/>
+    <dgm:cxn modelId="{EB50EB90-5C2F-4835-A847-397AB889FEF4}" type="presParOf" srcId="{0EA6A204-4499-4E9B-936F-97C01FD16AE6}" destId="{CA34FBA4-8FB7-45BD-9CF5-DB47E36F0979}" srcOrd="1" destOrd="0" presId="urn:microsoft.com/office/officeart/2005/8/layout/hProcess11"/>
+    <dgm:cxn modelId="{C008BAEE-0EE9-4CAE-AF95-D393B122C009}" type="presParOf" srcId="{0EA6A204-4499-4E9B-936F-97C01FD16AE6}" destId="{8297DFFD-0E90-4340-B22A-7A602F6940EF}" srcOrd="2" destOrd="0" presId="urn:microsoft.com/office/officeart/2005/8/layout/hProcess11"/>
   </dgm:cxnLst>
   <dgm:bg/>
   <dgm:whole/>
@@ -1334,68 +1366,90 @@
       <dsp:cNvGrpSpPr/>
     </dsp:nvGrpSpPr>
     <dsp:grpSpPr/>
-    <dsp:sp modelId="{ED1F802A-EC6B-4AD1-9BC2-604DD1228609}">
+    <dsp:sp modelId="{919F12E4-B3D8-4D76-9844-F39C076B4389}">
       <dsp:nvSpPr>
         <dsp:cNvPr id="0" name=""/>
         <dsp:cNvSpPr/>
       </dsp:nvSpPr>
       <dsp:spPr>
         <a:xfrm>
-          <a:off x="4018" y="1964015"/>
-          <a:ext cx="1494829" cy="597931"/>
+          <a:off x="0" y="1357788"/>
+          <a:ext cx="8229600" cy="1810385"/>
         </a:xfrm>
-        <a:prstGeom prst="chevron">
+        <a:prstGeom prst="notchedRightArrow">
           <a:avLst/>
         </a:prstGeom>
         <a:solidFill>
-          <a:schemeClr val="lt1">
+          <a:schemeClr val="accent2">
+            <a:tint val="40000"/>
             <a:hueOff val="0"/>
             <a:satOff val="0"/>
             <a:lumOff val="0"/>
             <a:alphaOff val="0"/>
           </a:schemeClr>
         </a:solidFill>
-        <a:ln w="38100" cap="flat" cmpd="sng" algn="ctr">
-          <a:solidFill>
-            <a:schemeClr val="accent2">
-              <a:shade val="80000"/>
-              <a:hueOff val="0"/>
-              <a:satOff val="0"/>
-              <a:lumOff val="0"/>
-              <a:alphaOff val="0"/>
-            </a:schemeClr>
-          </a:solidFill>
-          <a:prstDash val="solid"/>
+        <a:ln>
+          <a:noFill/>
         </a:ln>
         <a:effectLst>
-          <a:outerShdw blurRad="40000" dist="20000" dir="5400000" rotWithShape="0">
+          <a:outerShdw blurRad="40000" dist="23000" dir="5400000" rotWithShape="0">
             <a:srgbClr val="000000">
-              <a:alpha val="38000"/>
+              <a:alpha val="35000"/>
             </a:srgbClr>
           </a:outerShdw>
         </a:effectLst>
       </dsp:spPr>
       <dsp:style>
-        <a:lnRef idx="3">
+        <a:lnRef idx="0">
           <a:scrgbClr r="0" g="0" b="0"/>
         </a:lnRef>
         <a:fillRef idx="1">
           <a:scrgbClr r="0" g="0" b="0"/>
         </a:fillRef>
-        <a:effectRef idx="1">
+        <a:effectRef idx="2">
           <a:scrgbClr r="0" g="0" b="0"/>
         </a:effectRef>
-        <a:fontRef idx="minor">
-          <a:schemeClr val="lt1"/>
-        </a:fontRef>
+        <a:fontRef idx="minor"/>
+      </dsp:style>
+    </dsp:sp>
+    <dsp:sp modelId="{2EB0D192-DBD9-4898-AE05-90F9583F6102}">
+      <dsp:nvSpPr>
+        <dsp:cNvPr id="0" name=""/>
+        <dsp:cNvSpPr/>
+      </dsp:nvSpPr>
+      <dsp:spPr>
+        <a:xfrm>
+          <a:off x="2034" y="0"/>
+          <a:ext cx="1184411" cy="1810385"/>
+        </a:xfrm>
+        <a:prstGeom prst="rect">
+          <a:avLst/>
+        </a:prstGeom>
+        <a:noFill/>
+        <a:ln>
+          <a:noFill/>
+        </a:ln>
+        <a:effectLst/>
+      </dsp:spPr>
+      <dsp:style>
+        <a:lnRef idx="0">
+          <a:scrgbClr r="0" g="0" b="0"/>
+        </a:lnRef>
+        <a:fillRef idx="0">
+          <a:scrgbClr r="0" g="0" b="0"/>
+        </a:fillRef>
+        <a:effectRef idx="0">
+          <a:scrgbClr r="0" g="0" b="0"/>
+        </a:effectRef>
+        <a:fontRef idx="minor"/>
       </dsp:style>
       <dsp:txBody>
-        <a:bodyPr spcFirstLastPara="0" vert="horz" wrap="square" lIns="36005" tIns="12002" rIns="12002" bIns="12002" numCol="1" spcCol="1270" anchor="ctr" anchorCtr="0">
+        <a:bodyPr spcFirstLastPara="0" vert="horz" wrap="square" lIns="113792" tIns="113792" rIns="113792" bIns="113792" numCol="1" spcCol="1270" anchor="b" anchorCtr="0">
           <a:noAutofit/>
         </a:bodyPr>
         <a:lstStyle/>
         <a:p>
-          <a:pPr lvl="0" algn="ctr" defTabSz="400050">
+          <a:pPr lvl="0" algn="ctr" defTabSz="711200">
             <a:lnSpc>
               <a:spcPct val="90000"/>
             </a:lnSpc>
@@ -1407,78 +1461,139 @@
             </a:spcAft>
           </a:pPr>
           <a:r>
-            <a:rPr lang="en-US" sz="900" kern="1200"/>
+            <a:rPr lang="en-US" sz="1600" kern="1200" dirty="0"/>
             <a:t>May 28 2013: added Basic GUI</a:t>
           </a:r>
         </a:p>
       </dsp:txBody>
       <dsp:txXfrm>
-        <a:off x="4018" y="1964015"/>
-        <a:ext cx="1494829" cy="597931"/>
+        <a:off x="2034" y="0"/>
+        <a:ext cx="1184411" cy="1810385"/>
       </dsp:txXfrm>
     </dsp:sp>
-    <dsp:sp modelId="{89D7D2A4-3543-4390-96AD-7B1196999CE9}">
+    <dsp:sp modelId="{E36372B1-BE5B-4860-8975-15C51578710D}">
       <dsp:nvSpPr>
         <dsp:cNvPr id="0" name=""/>
         <dsp:cNvSpPr/>
       </dsp:nvSpPr>
       <dsp:spPr>
         <a:xfrm>
-          <a:off x="1349365" y="1964015"/>
-          <a:ext cx="1494829" cy="597931"/>
+          <a:off x="367941" y="2036683"/>
+          <a:ext cx="452596" cy="452596"/>
         </a:xfrm>
-        <a:prstGeom prst="chevron">
+        <a:prstGeom prst="ellipse">
           <a:avLst/>
         </a:prstGeom>
-        <a:solidFill>
-          <a:schemeClr val="lt1">
-            <a:hueOff val="0"/>
-            <a:satOff val="0"/>
-            <a:lumOff val="0"/>
-            <a:alphaOff val="0"/>
-          </a:schemeClr>
-        </a:solidFill>
-        <a:ln w="38100" cap="flat" cmpd="sng" algn="ctr">
-          <a:solidFill>
-            <a:schemeClr val="accent2">
-              <a:shade val="80000"/>
-              <a:hueOff val="0"/>
-              <a:satOff val="0"/>
-              <a:lumOff val="0"/>
-              <a:alphaOff val="0"/>
-            </a:schemeClr>
-          </a:solidFill>
-          <a:prstDash val="solid"/>
+        <a:gradFill rotWithShape="0">
+          <a:gsLst>
+            <a:gs pos="0">
+              <a:schemeClr val="accent2">
+                <a:hueOff val="0"/>
+                <a:satOff val="0"/>
+                <a:lumOff val="0"/>
+                <a:alphaOff val="0"/>
+                <a:shade val="51000"/>
+                <a:satMod val="130000"/>
+              </a:schemeClr>
+            </a:gs>
+            <a:gs pos="80000">
+              <a:schemeClr val="accent2">
+                <a:hueOff val="0"/>
+                <a:satOff val="0"/>
+                <a:lumOff val="0"/>
+                <a:alphaOff val="0"/>
+                <a:shade val="93000"/>
+                <a:satMod val="130000"/>
+              </a:schemeClr>
+            </a:gs>
+            <a:gs pos="100000">
+              <a:schemeClr val="accent2">
+                <a:hueOff val="0"/>
+                <a:satOff val="0"/>
+                <a:lumOff val="0"/>
+                <a:alphaOff val="0"/>
+                <a:shade val="94000"/>
+                <a:satMod val="135000"/>
+              </a:schemeClr>
+            </a:gs>
+          </a:gsLst>
+          <a:lin ang="16200000" scaled="0"/>
+        </a:gradFill>
+        <a:ln>
+          <a:noFill/>
         </a:ln>
         <a:effectLst>
-          <a:outerShdw blurRad="40000" dist="20000" dir="5400000" rotWithShape="0">
+          <a:outerShdw blurRad="40000" dist="23000" dir="5400000" rotWithShape="0">
             <a:srgbClr val="000000">
-              <a:alpha val="38000"/>
+              <a:alpha val="35000"/>
             </a:srgbClr>
           </a:outerShdw>
         </a:effectLst>
+        <a:scene3d>
+          <a:camera prst="orthographicFront">
+            <a:rot lat="0" lon="0" rev="0"/>
+          </a:camera>
+          <a:lightRig rig="threePt" dir="t">
+            <a:rot lat="0" lon="0" rev="1200000"/>
+          </a:lightRig>
+        </a:scene3d>
+        <a:sp3d>
+          <a:bevelT w="63500" h="25400"/>
+        </a:sp3d>
       </dsp:spPr>
       <dsp:style>
-        <a:lnRef idx="3">
+        <a:lnRef idx="0">
           <a:scrgbClr r="0" g="0" b="0"/>
         </a:lnRef>
-        <a:fillRef idx="1">
+        <a:fillRef idx="3">
           <a:scrgbClr r="0" g="0" b="0"/>
         </a:fillRef>
-        <a:effectRef idx="1">
+        <a:effectRef idx="3">
           <a:scrgbClr r="0" g="0" b="0"/>
         </a:effectRef>
         <a:fontRef idx="minor">
           <a:schemeClr val="lt1"/>
         </a:fontRef>
       </dsp:style>
+    </dsp:sp>
+    <dsp:sp modelId="{3BD835FA-2A05-4374-8821-8CF674B28D48}">
+      <dsp:nvSpPr>
+        <dsp:cNvPr id="0" name=""/>
+        <dsp:cNvSpPr/>
+      </dsp:nvSpPr>
+      <dsp:spPr>
+        <a:xfrm>
+          <a:off x="1245666" y="2715577"/>
+          <a:ext cx="1184411" cy="1810385"/>
+        </a:xfrm>
+        <a:prstGeom prst="rect">
+          <a:avLst/>
+        </a:prstGeom>
+        <a:noFill/>
+        <a:ln>
+          <a:noFill/>
+        </a:ln>
+        <a:effectLst/>
+      </dsp:spPr>
+      <dsp:style>
+        <a:lnRef idx="0">
+          <a:scrgbClr r="0" g="0" b="0"/>
+        </a:lnRef>
+        <a:fillRef idx="0">
+          <a:scrgbClr r="0" g="0" b="0"/>
+        </a:fillRef>
+        <a:effectRef idx="0">
+          <a:scrgbClr r="0" g="0" b="0"/>
+        </a:effectRef>
+        <a:fontRef idx="minor"/>
+      </dsp:style>
       <dsp:txBody>
-        <a:bodyPr spcFirstLastPara="0" vert="horz" wrap="square" lIns="36005" tIns="12002" rIns="12002" bIns="12002" numCol="1" spcCol="1270" anchor="ctr" anchorCtr="0">
+        <a:bodyPr spcFirstLastPara="0" vert="horz" wrap="square" lIns="113792" tIns="113792" rIns="113792" bIns="113792" numCol="1" spcCol="1270" anchor="t" anchorCtr="0">
           <a:noAutofit/>
         </a:bodyPr>
         <a:lstStyle/>
         <a:p>
-          <a:pPr lvl="0" algn="ctr" defTabSz="400050">
+          <a:pPr lvl="0" algn="ctr" defTabSz="711200">
             <a:lnSpc>
               <a:spcPct val="90000"/>
             </a:lnSpc>
@@ -1490,78 +1605,139 @@
             </a:spcAft>
           </a:pPr>
           <a:r>
-            <a:rPr lang="en-US" sz="900" kern="1200"/>
+            <a:rPr lang="en-US" sz="1600" kern="1200" dirty="0"/>
             <a:t>June 11: added phone calendar in app</a:t>
           </a:r>
         </a:p>
       </dsp:txBody>
       <dsp:txXfrm>
-        <a:off x="1349365" y="1964015"/>
-        <a:ext cx="1494829" cy="597931"/>
+        <a:off x="1245666" y="2715577"/>
+        <a:ext cx="1184411" cy="1810385"/>
       </dsp:txXfrm>
     </dsp:sp>
-    <dsp:sp modelId="{72FB49D0-1D16-4101-9E66-ECC4EF9979BB}">
+    <dsp:sp modelId="{2D9CB9D8-2230-4D92-94FB-65FBAE615D35}">
       <dsp:nvSpPr>
         <dsp:cNvPr id="0" name=""/>
         <dsp:cNvSpPr/>
       </dsp:nvSpPr>
       <dsp:spPr>
         <a:xfrm>
-          <a:off x="2698133" y="1990354"/>
-          <a:ext cx="1494829" cy="597931"/>
+          <a:off x="1611573" y="2036683"/>
+          <a:ext cx="452596" cy="452596"/>
         </a:xfrm>
-        <a:prstGeom prst="chevron">
+        <a:prstGeom prst="ellipse">
           <a:avLst/>
         </a:prstGeom>
-        <a:solidFill>
-          <a:schemeClr val="lt1">
-            <a:hueOff val="0"/>
-            <a:satOff val="0"/>
-            <a:lumOff val="0"/>
-            <a:alphaOff val="0"/>
-          </a:schemeClr>
-        </a:solidFill>
-        <a:ln w="38100" cap="flat" cmpd="sng" algn="ctr">
-          <a:solidFill>
-            <a:schemeClr val="accent2">
-              <a:shade val="80000"/>
-              <a:hueOff val="0"/>
-              <a:satOff val="0"/>
-              <a:lumOff val="0"/>
-              <a:alphaOff val="0"/>
-            </a:schemeClr>
-          </a:solidFill>
-          <a:prstDash val="solid"/>
+        <a:gradFill rotWithShape="0">
+          <a:gsLst>
+            <a:gs pos="0">
+              <a:schemeClr val="accent2">
+                <a:hueOff val="0"/>
+                <a:satOff val="0"/>
+                <a:lumOff val="0"/>
+                <a:alphaOff val="0"/>
+                <a:shade val="51000"/>
+                <a:satMod val="130000"/>
+              </a:schemeClr>
+            </a:gs>
+            <a:gs pos="80000">
+              <a:schemeClr val="accent2">
+                <a:hueOff val="0"/>
+                <a:satOff val="0"/>
+                <a:lumOff val="0"/>
+                <a:alphaOff val="0"/>
+                <a:shade val="93000"/>
+                <a:satMod val="130000"/>
+              </a:schemeClr>
+            </a:gs>
+            <a:gs pos="100000">
+              <a:schemeClr val="accent2">
+                <a:hueOff val="0"/>
+                <a:satOff val="0"/>
+                <a:lumOff val="0"/>
+                <a:alphaOff val="0"/>
+                <a:shade val="94000"/>
+                <a:satMod val="135000"/>
+              </a:schemeClr>
+            </a:gs>
+          </a:gsLst>
+          <a:lin ang="16200000" scaled="0"/>
+        </a:gradFill>
+        <a:ln>
+          <a:noFill/>
         </a:ln>
         <a:effectLst>
-          <a:outerShdw blurRad="40000" dist="20000" dir="5400000" rotWithShape="0">
+          <a:outerShdw blurRad="40000" dist="23000" dir="5400000" rotWithShape="0">
             <a:srgbClr val="000000">
-              <a:alpha val="38000"/>
+              <a:alpha val="35000"/>
             </a:srgbClr>
           </a:outerShdw>
         </a:effectLst>
+        <a:scene3d>
+          <a:camera prst="orthographicFront">
+            <a:rot lat="0" lon="0" rev="0"/>
+          </a:camera>
+          <a:lightRig rig="threePt" dir="t">
+            <a:rot lat="0" lon="0" rev="1200000"/>
+          </a:lightRig>
+        </a:scene3d>
+        <a:sp3d>
+          <a:bevelT w="63500" h="25400"/>
+        </a:sp3d>
       </dsp:spPr>
       <dsp:style>
-        <a:lnRef idx="3">
+        <a:lnRef idx="0">
           <a:scrgbClr r="0" g="0" b="0"/>
         </a:lnRef>
-        <a:fillRef idx="1">
+        <a:fillRef idx="3">
           <a:scrgbClr r="0" g="0" b="0"/>
         </a:fillRef>
-        <a:effectRef idx="1">
+        <a:effectRef idx="3">
           <a:scrgbClr r="0" g="0" b="0"/>
         </a:effectRef>
         <a:fontRef idx="minor">
           <a:schemeClr val="lt1"/>
         </a:fontRef>
       </dsp:style>
+    </dsp:sp>
+    <dsp:sp modelId="{F1F40154-6763-46D5-9069-A7FE2A9D6775}">
+      <dsp:nvSpPr>
+        <dsp:cNvPr id="0" name=""/>
+        <dsp:cNvSpPr/>
+      </dsp:nvSpPr>
+      <dsp:spPr>
+        <a:xfrm>
+          <a:off x="2489298" y="0"/>
+          <a:ext cx="1184411" cy="1810385"/>
+        </a:xfrm>
+        <a:prstGeom prst="rect">
+          <a:avLst/>
+        </a:prstGeom>
+        <a:noFill/>
+        <a:ln>
+          <a:noFill/>
+        </a:ln>
+        <a:effectLst/>
+      </dsp:spPr>
+      <dsp:style>
+        <a:lnRef idx="0">
+          <a:scrgbClr r="0" g="0" b="0"/>
+        </a:lnRef>
+        <a:fillRef idx="0">
+          <a:scrgbClr r="0" g="0" b="0"/>
+        </a:fillRef>
+        <a:effectRef idx="0">
+          <a:scrgbClr r="0" g="0" b="0"/>
+        </a:effectRef>
+        <a:fontRef idx="minor"/>
+      </dsp:style>
       <dsp:txBody>
-        <a:bodyPr spcFirstLastPara="0" vert="horz" wrap="square" lIns="36005" tIns="12002" rIns="12002" bIns="12002" numCol="1" spcCol="1270" anchor="ctr" anchorCtr="0">
+        <a:bodyPr spcFirstLastPara="0" vert="horz" wrap="square" lIns="113792" tIns="113792" rIns="113792" bIns="113792" numCol="1" spcCol="1270" anchor="b" anchorCtr="0">
           <a:noAutofit/>
         </a:bodyPr>
         <a:lstStyle/>
         <a:p>
-          <a:pPr lvl="0" algn="ctr" defTabSz="400050">
+          <a:pPr lvl="0" algn="ctr" defTabSz="711200">
             <a:lnSpc>
               <a:spcPct val="90000"/>
             </a:lnSpc>
@@ -1573,78 +1749,139 @@
             </a:spcAft>
           </a:pPr>
           <a:r>
-            <a:rPr lang="en-US" sz="900" kern="1200"/>
+            <a:rPr lang="en-US" sz="1600" kern="1200" dirty="0"/>
             <a:t>June 25: Able to Add Event without user prompting</a:t>
           </a:r>
         </a:p>
       </dsp:txBody>
       <dsp:txXfrm>
-        <a:off x="2698133" y="1990354"/>
-        <a:ext cx="1494829" cy="597931"/>
+        <a:off x="2489298" y="0"/>
+        <a:ext cx="1184411" cy="1810385"/>
       </dsp:txXfrm>
     </dsp:sp>
-    <dsp:sp modelId="{654D7CDD-D9FD-4374-B274-929656793888}">
+    <dsp:sp modelId="{1DA19041-52FF-4B12-BBDD-3EAB8A916E19}">
       <dsp:nvSpPr>
         <dsp:cNvPr id="0" name=""/>
         <dsp:cNvSpPr/>
       </dsp:nvSpPr>
       <dsp:spPr>
         <a:xfrm>
-          <a:off x="4040058" y="1964015"/>
-          <a:ext cx="1494829" cy="597931"/>
+          <a:off x="2855205" y="2036683"/>
+          <a:ext cx="452596" cy="452596"/>
         </a:xfrm>
-        <a:prstGeom prst="chevron">
+        <a:prstGeom prst="ellipse">
           <a:avLst/>
         </a:prstGeom>
-        <a:solidFill>
-          <a:schemeClr val="lt1">
-            <a:hueOff val="0"/>
-            <a:satOff val="0"/>
-            <a:lumOff val="0"/>
-            <a:alphaOff val="0"/>
-          </a:schemeClr>
-        </a:solidFill>
-        <a:ln w="38100" cap="flat" cmpd="sng" algn="ctr">
-          <a:solidFill>
-            <a:schemeClr val="accent2">
-              <a:shade val="80000"/>
-              <a:hueOff val="0"/>
-              <a:satOff val="0"/>
-              <a:lumOff val="0"/>
-              <a:alphaOff val="0"/>
-            </a:schemeClr>
-          </a:solidFill>
-          <a:prstDash val="solid"/>
+        <a:gradFill rotWithShape="0">
+          <a:gsLst>
+            <a:gs pos="0">
+              <a:schemeClr val="accent2">
+                <a:hueOff val="0"/>
+                <a:satOff val="0"/>
+                <a:lumOff val="0"/>
+                <a:alphaOff val="0"/>
+                <a:shade val="51000"/>
+                <a:satMod val="130000"/>
+              </a:schemeClr>
+            </a:gs>
+            <a:gs pos="80000">
+              <a:schemeClr val="accent2">
+                <a:hueOff val="0"/>
+                <a:satOff val="0"/>
+                <a:lumOff val="0"/>
+                <a:alphaOff val="0"/>
+                <a:shade val="93000"/>
+                <a:satMod val="130000"/>
+              </a:schemeClr>
+            </a:gs>
+            <a:gs pos="100000">
+              <a:schemeClr val="accent2">
+                <a:hueOff val="0"/>
+                <a:satOff val="0"/>
+                <a:lumOff val="0"/>
+                <a:alphaOff val="0"/>
+                <a:shade val="94000"/>
+                <a:satMod val="135000"/>
+              </a:schemeClr>
+            </a:gs>
+          </a:gsLst>
+          <a:lin ang="16200000" scaled="0"/>
+        </a:gradFill>
+        <a:ln>
+          <a:noFill/>
         </a:ln>
         <a:effectLst>
-          <a:outerShdw blurRad="40000" dist="20000" dir="5400000" rotWithShape="0">
+          <a:outerShdw blurRad="40000" dist="23000" dir="5400000" rotWithShape="0">
             <a:srgbClr val="000000">
-              <a:alpha val="38000"/>
+              <a:alpha val="35000"/>
             </a:srgbClr>
           </a:outerShdw>
         </a:effectLst>
+        <a:scene3d>
+          <a:camera prst="orthographicFront">
+            <a:rot lat="0" lon="0" rev="0"/>
+          </a:camera>
+          <a:lightRig rig="threePt" dir="t">
+            <a:rot lat="0" lon="0" rev="1200000"/>
+          </a:lightRig>
+        </a:scene3d>
+        <a:sp3d>
+          <a:bevelT w="63500" h="25400"/>
+        </a:sp3d>
       </dsp:spPr>
       <dsp:style>
-        <a:lnRef idx="3">
+        <a:lnRef idx="0">
           <a:scrgbClr r="0" g="0" b="0"/>
         </a:lnRef>
-        <a:fillRef idx="1">
+        <a:fillRef idx="3">
           <a:scrgbClr r="0" g="0" b="0"/>
         </a:fillRef>
-        <a:effectRef idx="1">
+        <a:effectRef idx="3">
           <a:scrgbClr r="0" g="0" b="0"/>
         </a:effectRef>
         <a:fontRef idx="minor">
           <a:schemeClr val="lt1"/>
         </a:fontRef>
       </dsp:style>
+    </dsp:sp>
+    <dsp:sp modelId="{4331F4DB-EFDD-41F0-BA61-CCCB4F607233}">
+      <dsp:nvSpPr>
+        <dsp:cNvPr id="0" name=""/>
+        <dsp:cNvSpPr/>
+      </dsp:nvSpPr>
+      <dsp:spPr>
+        <a:xfrm>
+          <a:off x="3732930" y="2715577"/>
+          <a:ext cx="1184411" cy="1810385"/>
+        </a:xfrm>
+        <a:prstGeom prst="rect">
+          <a:avLst/>
+        </a:prstGeom>
+        <a:noFill/>
+        <a:ln>
+          <a:noFill/>
+        </a:ln>
+        <a:effectLst/>
+      </dsp:spPr>
+      <dsp:style>
+        <a:lnRef idx="0">
+          <a:scrgbClr r="0" g="0" b="0"/>
+        </a:lnRef>
+        <a:fillRef idx="0">
+          <a:scrgbClr r="0" g="0" b="0"/>
+        </a:fillRef>
+        <a:effectRef idx="0">
+          <a:scrgbClr r="0" g="0" b="0"/>
+        </a:effectRef>
+        <a:fontRef idx="minor"/>
+      </dsp:style>
       <dsp:txBody>
-        <a:bodyPr spcFirstLastPara="0" vert="horz" wrap="square" lIns="36005" tIns="12002" rIns="12002" bIns="12002" numCol="1" spcCol="1270" anchor="ctr" anchorCtr="0">
+        <a:bodyPr spcFirstLastPara="0" vert="horz" wrap="square" lIns="113792" tIns="113792" rIns="113792" bIns="113792" numCol="1" spcCol="1270" anchor="t" anchorCtr="0">
           <a:noAutofit/>
         </a:bodyPr>
         <a:lstStyle/>
         <a:p>
-          <a:pPr lvl="0" algn="ctr" defTabSz="400050">
+          <a:pPr lvl="0" algn="ctr" defTabSz="711200">
             <a:lnSpc>
               <a:spcPct val="90000"/>
             </a:lnSpc>
@@ -1656,78 +1893,139 @@
             </a:spcAft>
           </a:pPr>
           <a:r>
-            <a:rPr lang="en-US" sz="900" kern="1200"/>
+            <a:rPr lang="en-US" sz="1600" kern="1200" dirty="0"/>
             <a:t>Early July: User is able to login using UC credentials</a:t>
           </a:r>
         </a:p>
       </dsp:txBody>
       <dsp:txXfrm>
-        <a:off x="4040058" y="1964015"/>
-        <a:ext cx="1494829" cy="597931"/>
+        <a:off x="3732930" y="2715577"/>
+        <a:ext cx="1184411" cy="1810385"/>
       </dsp:txXfrm>
     </dsp:sp>
-    <dsp:sp modelId="{169ADD05-B2B8-4FC0-91EC-DD3F504552C3}">
+    <dsp:sp modelId="{00072152-31CB-4DB7-B9A8-0AB0F8BCD661}">
       <dsp:nvSpPr>
         <dsp:cNvPr id="0" name=""/>
         <dsp:cNvSpPr/>
       </dsp:nvSpPr>
       <dsp:spPr>
         <a:xfrm>
-          <a:off x="5385405" y="1964015"/>
-          <a:ext cx="1494829" cy="597931"/>
+          <a:off x="4098837" y="2036683"/>
+          <a:ext cx="452596" cy="452596"/>
         </a:xfrm>
-        <a:prstGeom prst="chevron">
+        <a:prstGeom prst="ellipse">
           <a:avLst/>
         </a:prstGeom>
-        <a:solidFill>
-          <a:schemeClr val="lt1">
-            <a:hueOff val="0"/>
-            <a:satOff val="0"/>
-            <a:lumOff val="0"/>
-            <a:alphaOff val="0"/>
-          </a:schemeClr>
-        </a:solidFill>
-        <a:ln w="38100" cap="flat" cmpd="sng" algn="ctr">
-          <a:solidFill>
-            <a:schemeClr val="accent2">
-              <a:shade val="80000"/>
-              <a:hueOff val="0"/>
-              <a:satOff val="0"/>
-              <a:lumOff val="0"/>
-              <a:alphaOff val="0"/>
-            </a:schemeClr>
-          </a:solidFill>
-          <a:prstDash val="solid"/>
+        <a:gradFill rotWithShape="0">
+          <a:gsLst>
+            <a:gs pos="0">
+              <a:schemeClr val="accent2">
+                <a:hueOff val="0"/>
+                <a:satOff val="0"/>
+                <a:lumOff val="0"/>
+                <a:alphaOff val="0"/>
+                <a:shade val="51000"/>
+                <a:satMod val="130000"/>
+              </a:schemeClr>
+            </a:gs>
+            <a:gs pos="80000">
+              <a:schemeClr val="accent2">
+                <a:hueOff val="0"/>
+                <a:satOff val="0"/>
+                <a:lumOff val="0"/>
+                <a:alphaOff val="0"/>
+                <a:shade val="93000"/>
+                <a:satMod val="130000"/>
+              </a:schemeClr>
+            </a:gs>
+            <a:gs pos="100000">
+              <a:schemeClr val="accent2">
+                <a:hueOff val="0"/>
+                <a:satOff val="0"/>
+                <a:lumOff val="0"/>
+                <a:alphaOff val="0"/>
+                <a:shade val="94000"/>
+                <a:satMod val="135000"/>
+              </a:schemeClr>
+            </a:gs>
+          </a:gsLst>
+          <a:lin ang="16200000" scaled="0"/>
+        </a:gradFill>
+        <a:ln>
+          <a:noFill/>
         </a:ln>
         <a:effectLst>
-          <a:outerShdw blurRad="40000" dist="20000" dir="5400000" rotWithShape="0">
+          <a:outerShdw blurRad="40000" dist="23000" dir="5400000" rotWithShape="0">
             <a:srgbClr val="000000">
-              <a:alpha val="38000"/>
+              <a:alpha val="35000"/>
             </a:srgbClr>
           </a:outerShdw>
         </a:effectLst>
+        <a:scene3d>
+          <a:camera prst="orthographicFront">
+            <a:rot lat="0" lon="0" rev="0"/>
+          </a:camera>
+          <a:lightRig rig="threePt" dir="t">
+            <a:rot lat="0" lon="0" rev="1200000"/>
+          </a:lightRig>
+        </a:scene3d>
+        <a:sp3d>
+          <a:bevelT w="63500" h="25400"/>
+        </a:sp3d>
       </dsp:spPr>
       <dsp:style>
-        <a:lnRef idx="3">
+        <a:lnRef idx="0">
           <a:scrgbClr r="0" g="0" b="0"/>
         </a:lnRef>
-        <a:fillRef idx="1">
+        <a:fillRef idx="3">
           <a:scrgbClr r="0" g="0" b="0"/>
         </a:fillRef>
-        <a:effectRef idx="1">
+        <a:effectRef idx="3">
           <a:scrgbClr r="0" g="0" b="0"/>
         </a:effectRef>
         <a:fontRef idx="minor">
           <a:schemeClr val="lt1"/>
         </a:fontRef>
       </dsp:style>
+    </dsp:sp>
+    <dsp:sp modelId="{2644E4AF-CCD3-4356-8C4B-D65B7DE606AF}">
+      <dsp:nvSpPr>
+        <dsp:cNvPr id="0" name=""/>
+        <dsp:cNvSpPr/>
+      </dsp:nvSpPr>
+      <dsp:spPr>
+        <a:xfrm>
+          <a:off x="4976562" y="0"/>
+          <a:ext cx="1184411" cy="1810385"/>
+        </a:xfrm>
+        <a:prstGeom prst="rect">
+          <a:avLst/>
+        </a:prstGeom>
+        <a:noFill/>
+        <a:ln>
+          <a:noFill/>
+        </a:ln>
+        <a:effectLst/>
+      </dsp:spPr>
+      <dsp:style>
+        <a:lnRef idx="0">
+          <a:scrgbClr r="0" g="0" b="0"/>
+        </a:lnRef>
+        <a:fillRef idx="0">
+          <a:scrgbClr r="0" g="0" b="0"/>
+        </a:fillRef>
+        <a:effectRef idx="0">
+          <a:scrgbClr r="0" g="0" b="0"/>
+        </a:effectRef>
+        <a:fontRef idx="minor"/>
+      </dsp:style>
       <dsp:txBody>
-        <a:bodyPr spcFirstLastPara="0" vert="horz" wrap="square" lIns="36005" tIns="12002" rIns="12002" bIns="12002" numCol="1" spcCol="1270" anchor="ctr" anchorCtr="0">
+        <a:bodyPr spcFirstLastPara="0" vert="horz" wrap="square" lIns="113792" tIns="113792" rIns="113792" bIns="113792" numCol="1" spcCol="1270" anchor="b" anchorCtr="0">
           <a:noAutofit/>
         </a:bodyPr>
         <a:lstStyle/>
         <a:p>
-          <a:pPr lvl="0" algn="ctr" defTabSz="400050">
+          <a:pPr lvl="0" algn="ctr" defTabSz="711200">
             <a:lnSpc>
               <a:spcPct val="90000"/>
             </a:lnSpc>
@@ -1739,78 +2037,139 @@
             </a:spcAft>
           </a:pPr>
           <a:r>
-            <a:rPr lang="en-US" sz="900" kern="1200"/>
+            <a:rPr lang="en-US" sz="1600" kern="1200" dirty="0"/>
             <a:t>Mid July: User is able to download their schedule into their phone</a:t>
           </a:r>
         </a:p>
       </dsp:txBody>
       <dsp:txXfrm>
-        <a:off x="5385405" y="1964015"/>
-        <a:ext cx="1494829" cy="597931"/>
+        <a:off x="4976562" y="0"/>
+        <a:ext cx="1184411" cy="1810385"/>
       </dsp:txXfrm>
     </dsp:sp>
-    <dsp:sp modelId="{AEE062A1-1F6A-49D0-AF3B-9CA86DD5B7A2}">
+    <dsp:sp modelId="{3DD7FA47-7F07-47B8-BC00-EE5E3CDC9446}">
       <dsp:nvSpPr>
         <dsp:cNvPr id="0" name=""/>
         <dsp:cNvSpPr/>
       </dsp:nvSpPr>
       <dsp:spPr>
         <a:xfrm>
-          <a:off x="6730751" y="1964015"/>
-          <a:ext cx="1494829" cy="597931"/>
+          <a:off x="5342469" y="2036683"/>
+          <a:ext cx="452596" cy="452596"/>
         </a:xfrm>
-        <a:prstGeom prst="chevron">
+        <a:prstGeom prst="ellipse">
           <a:avLst/>
         </a:prstGeom>
-        <a:solidFill>
-          <a:schemeClr val="lt1">
-            <a:hueOff val="0"/>
-            <a:satOff val="0"/>
-            <a:lumOff val="0"/>
-            <a:alphaOff val="0"/>
-          </a:schemeClr>
-        </a:solidFill>
-        <a:ln w="38100" cap="flat" cmpd="sng" algn="ctr">
-          <a:solidFill>
-            <a:schemeClr val="accent2">
-              <a:shade val="80000"/>
-              <a:hueOff val="0"/>
-              <a:satOff val="0"/>
-              <a:lumOff val="0"/>
-              <a:alphaOff val="0"/>
-            </a:schemeClr>
-          </a:solidFill>
-          <a:prstDash val="solid"/>
+        <a:gradFill rotWithShape="0">
+          <a:gsLst>
+            <a:gs pos="0">
+              <a:schemeClr val="accent2">
+                <a:hueOff val="0"/>
+                <a:satOff val="0"/>
+                <a:lumOff val="0"/>
+                <a:alphaOff val="0"/>
+                <a:shade val="51000"/>
+                <a:satMod val="130000"/>
+              </a:schemeClr>
+            </a:gs>
+            <a:gs pos="80000">
+              <a:schemeClr val="accent2">
+                <a:hueOff val="0"/>
+                <a:satOff val="0"/>
+                <a:lumOff val="0"/>
+                <a:alphaOff val="0"/>
+                <a:shade val="93000"/>
+                <a:satMod val="130000"/>
+              </a:schemeClr>
+            </a:gs>
+            <a:gs pos="100000">
+              <a:schemeClr val="accent2">
+                <a:hueOff val="0"/>
+                <a:satOff val="0"/>
+                <a:lumOff val="0"/>
+                <a:alphaOff val="0"/>
+                <a:shade val="94000"/>
+                <a:satMod val="135000"/>
+              </a:schemeClr>
+            </a:gs>
+          </a:gsLst>
+          <a:lin ang="16200000" scaled="0"/>
+        </a:gradFill>
+        <a:ln>
+          <a:noFill/>
         </a:ln>
         <a:effectLst>
-          <a:outerShdw blurRad="40000" dist="20000" dir="5400000" rotWithShape="0">
+          <a:outerShdw blurRad="40000" dist="23000" dir="5400000" rotWithShape="0">
             <a:srgbClr val="000000">
-              <a:alpha val="38000"/>
+              <a:alpha val="35000"/>
             </a:srgbClr>
           </a:outerShdw>
         </a:effectLst>
+        <a:scene3d>
+          <a:camera prst="orthographicFront">
+            <a:rot lat="0" lon="0" rev="0"/>
+          </a:camera>
+          <a:lightRig rig="threePt" dir="t">
+            <a:rot lat="0" lon="0" rev="1200000"/>
+          </a:lightRig>
+        </a:scene3d>
+        <a:sp3d>
+          <a:bevelT w="63500" h="25400"/>
+        </a:sp3d>
       </dsp:spPr>
       <dsp:style>
-        <a:lnRef idx="3">
+        <a:lnRef idx="0">
           <a:scrgbClr r="0" g="0" b="0"/>
         </a:lnRef>
-        <a:fillRef idx="1">
+        <a:fillRef idx="3">
           <a:scrgbClr r="0" g="0" b="0"/>
         </a:fillRef>
-        <a:effectRef idx="1">
+        <a:effectRef idx="3">
           <a:scrgbClr r="0" g="0" b="0"/>
         </a:effectRef>
         <a:fontRef idx="minor">
           <a:schemeClr val="lt1"/>
         </a:fontRef>
       </dsp:style>
+    </dsp:sp>
+    <dsp:sp modelId="{9CBBCB3B-C286-4AEF-8B61-32E7E94B66BA}">
+      <dsp:nvSpPr>
+        <dsp:cNvPr id="0" name=""/>
+        <dsp:cNvSpPr/>
+      </dsp:nvSpPr>
+      <dsp:spPr>
+        <a:xfrm>
+          <a:off x="6220194" y="2715577"/>
+          <a:ext cx="1184411" cy="1810385"/>
+        </a:xfrm>
+        <a:prstGeom prst="rect">
+          <a:avLst/>
+        </a:prstGeom>
+        <a:noFill/>
+        <a:ln>
+          <a:noFill/>
+        </a:ln>
+        <a:effectLst/>
+      </dsp:spPr>
+      <dsp:style>
+        <a:lnRef idx="0">
+          <a:scrgbClr r="0" g="0" b="0"/>
+        </a:lnRef>
+        <a:fillRef idx="0">
+          <a:scrgbClr r="0" g="0" b="0"/>
+        </a:fillRef>
+        <a:effectRef idx="0">
+          <a:scrgbClr r="0" g="0" b="0"/>
+        </a:effectRef>
+        <a:fontRef idx="minor"/>
+      </dsp:style>
       <dsp:txBody>
-        <a:bodyPr spcFirstLastPara="0" vert="horz" wrap="square" lIns="36005" tIns="12002" rIns="12002" bIns="12002" numCol="1" spcCol="1270" anchor="ctr" anchorCtr="0">
+        <a:bodyPr spcFirstLastPara="0" vert="horz" wrap="square" lIns="113792" tIns="113792" rIns="113792" bIns="113792" numCol="1" spcCol="1270" anchor="t" anchorCtr="0">
           <a:noAutofit/>
         </a:bodyPr>
         <a:lstStyle/>
         <a:p>
-          <a:pPr lvl="0" algn="ctr" defTabSz="400050">
+          <a:pPr lvl="0" algn="ctr" defTabSz="711200">
             <a:lnSpc>
               <a:spcPct val="90000"/>
             </a:lnSpc>
@@ -1822,26 +2181,117 @@
             </a:spcAft>
           </a:pPr>
           <a:r>
-            <a:rPr lang="en-US" sz="900" kern="1200"/>
-            <a:t>Late Mid July: User is able to edit events using custom fields</a:t>
+            <a:rPr lang="en-US" sz="1600" kern="1200" dirty="0"/>
+            <a:t>Late Mid July</a:t>
           </a:r>
+          <a:r>
+            <a:rPr lang="en-US" sz="1600" kern="1200" dirty="0" smtClean="0"/>
+            <a:t>: User is able to edit events using custom fields</a:t>
+          </a:r>
+          <a:endParaRPr lang="en-US" sz="1600" kern="1200" dirty="0"/>
         </a:p>
       </dsp:txBody>
       <dsp:txXfrm>
-        <a:off x="6730751" y="1964015"/>
-        <a:ext cx="1494829" cy="597931"/>
+        <a:off x="6220194" y="2715577"/>
+        <a:ext cx="1184411" cy="1810385"/>
       </dsp:txXfrm>
+    </dsp:sp>
+    <dsp:sp modelId="{CA34FBA4-8FB7-45BD-9CF5-DB47E36F0979}">
+      <dsp:nvSpPr>
+        <dsp:cNvPr id="0" name=""/>
+        <dsp:cNvSpPr/>
+      </dsp:nvSpPr>
+      <dsp:spPr>
+        <a:xfrm>
+          <a:off x="6586101" y="2036683"/>
+          <a:ext cx="452596" cy="452596"/>
+        </a:xfrm>
+        <a:prstGeom prst="ellipse">
+          <a:avLst/>
+        </a:prstGeom>
+        <a:gradFill rotWithShape="0">
+          <a:gsLst>
+            <a:gs pos="0">
+              <a:schemeClr val="accent2">
+                <a:hueOff val="0"/>
+                <a:satOff val="0"/>
+                <a:lumOff val="0"/>
+                <a:alphaOff val="0"/>
+                <a:shade val="51000"/>
+                <a:satMod val="130000"/>
+              </a:schemeClr>
+            </a:gs>
+            <a:gs pos="80000">
+              <a:schemeClr val="accent2">
+                <a:hueOff val="0"/>
+                <a:satOff val="0"/>
+                <a:lumOff val="0"/>
+                <a:alphaOff val="0"/>
+                <a:shade val="93000"/>
+                <a:satMod val="130000"/>
+              </a:schemeClr>
+            </a:gs>
+            <a:gs pos="100000">
+              <a:schemeClr val="accent2">
+                <a:hueOff val="0"/>
+                <a:satOff val="0"/>
+                <a:lumOff val="0"/>
+                <a:alphaOff val="0"/>
+                <a:shade val="94000"/>
+                <a:satMod val="135000"/>
+              </a:schemeClr>
+            </a:gs>
+          </a:gsLst>
+          <a:lin ang="16200000" scaled="0"/>
+        </a:gradFill>
+        <a:ln>
+          <a:noFill/>
+        </a:ln>
+        <a:effectLst>
+          <a:outerShdw blurRad="40000" dist="23000" dir="5400000" rotWithShape="0">
+            <a:srgbClr val="000000">
+              <a:alpha val="35000"/>
+            </a:srgbClr>
+          </a:outerShdw>
+        </a:effectLst>
+        <a:scene3d>
+          <a:camera prst="orthographicFront">
+            <a:rot lat="0" lon="0" rev="0"/>
+          </a:camera>
+          <a:lightRig rig="threePt" dir="t">
+            <a:rot lat="0" lon="0" rev="1200000"/>
+          </a:lightRig>
+        </a:scene3d>
+        <a:sp3d>
+          <a:bevelT w="63500" h="25400"/>
+        </a:sp3d>
+      </dsp:spPr>
+      <dsp:style>
+        <a:lnRef idx="0">
+          <a:scrgbClr r="0" g="0" b="0"/>
+        </a:lnRef>
+        <a:fillRef idx="3">
+          <a:scrgbClr r="0" g="0" b="0"/>
+        </a:fillRef>
+        <a:effectRef idx="3">
+          <a:scrgbClr r="0" g="0" b="0"/>
+        </a:effectRef>
+        <a:fontRef idx="minor">
+          <a:schemeClr val="lt1"/>
+        </a:fontRef>
+      </dsp:style>
     </dsp:sp>
   </dsp:spTree>
 </dsp:drawing>
 </file>
 
 <file path=ppt/diagrams/layout1.xml><?xml version="1.0" encoding="utf-8"?>
-<dgm:layoutDef xmlns:dgm="http://schemas.openxmlformats.org/drawingml/2006/diagram" xmlns:a="http://schemas.openxmlformats.org/drawingml/2006/main" uniqueId="urn:microsoft.com/office/officeart/2005/8/layout/chevron1">
+<dgm:layoutDef xmlns:dgm="http://schemas.openxmlformats.org/drawingml/2006/diagram" xmlns:a="http://schemas.openxmlformats.org/drawingml/2006/main" uniqueId="urn:microsoft.com/office/officeart/2005/8/layout/hProcess11">
   <dgm:title val=""/>
   <dgm:desc val=""/>
   <dgm:catLst>
-    <dgm:cat type="process" pri="9000"/>
+    <dgm:cat type="process" pri="8000"/>
+    <dgm:cat type="convert" pri="14000"/>
   </dgm:catLst>
   <dgm:sampData useDef="1">
     <dgm:dataModel>
@@ -1858,8 +2308,8 @@
         <dgm:pt modelId="2"/>
       </dgm:ptLst>
       <dgm:cxnLst>
-        <dgm:cxn modelId="3" srcId="0" destId="1" srcOrd="0" destOrd="0"/>
-        <dgm:cxn modelId="4" srcId="0" destId="2" srcOrd="1" destOrd="0"/>
+        <dgm:cxn modelId="4" srcId="0" destId="1" srcOrd="0" destOrd="0"/>
+        <dgm:cxn modelId="5" srcId="0" destId="2" srcOrd="1" destOrd="0"/>
       </dgm:cxnLst>
       <dgm:bg/>
       <dgm:whole/>
@@ -1887,244 +2337,232 @@
   <dgm:layoutNode name="Name0">
     <dgm:varLst>
       <dgm:dir/>
-      <dgm:animLvl val="lvl"/>
       <dgm:resizeHandles val="exact"/>
     </dgm:varLst>
-    <dgm:choose name="Name1">
-      <dgm:if name="Name2" func="var" arg="dir" op="equ" val="norm">
-        <dgm:alg type="lin"/>
-      </dgm:if>
-      <dgm:else name="Name3">
-        <dgm:alg type="lin">
-          <dgm:param type="linDir" val="fromR"/>
-        </dgm:alg>
-      </dgm:else>
-    </dgm:choose>
+    <dgm:alg type="composite"/>
     <dgm:shape xmlns:r="http://schemas.openxmlformats.org/officeDocument/2006/relationships" r:blip="">
       <dgm:adjLst/>
     </dgm:shape>
     <dgm:presOf/>
-    <dgm:choose name="Name4">
-      <dgm:if name="Name5" axis="des" func="maxDepth" op="gte" val="2">
+    <dgm:choose name="Name1">
+      <dgm:if name="Name2" func="var" arg="dir" op="equ" val="norm">
         <dgm:constrLst>
-          <dgm:constr type="h" for="ch" forName="composite" refType="h"/>
-          <dgm:constr type="w" for="ch" forName="composite" refType="w"/>
-          <dgm:constr type="w" for="des" forName="parTx"/>
-          <dgm:constr type="h" for="des" forName="parTx" op="equ"/>
-          <dgm:constr type="w" for="des" forName="desTx"/>
-          <dgm:constr type="h" for="des" forName="desTx" op="equ"/>
-          <dgm:constr type="primFontSz" for="des" forName="parTx" val="65"/>
-          <dgm:constr type="secFontSz" for="des" forName="desTx" refType="primFontSz" refFor="des" refForName="parTx" op="equ"/>
-          <dgm:constr type="h" for="des" forName="parTx" refType="primFontSz" refFor="des" refForName="parTx" fact="1.5"/>
-          <dgm:constr type="h" for="des" forName="desTx" refType="primFontSz" refFor="des" refForName="parTx" fact="0.5"/>
-          <dgm:constr type="w" for="ch" forName="space" op="equ" val="-6"/>
+          <dgm:constr type="w" for="ch" forName="arrow" refType="w"/>
+          <dgm:constr type="h" for="ch" forName="arrow" refType="h" fact="0.4"/>
+          <dgm:constr type="ctrY" for="ch" forName="arrow" refType="h" fact="0.5"/>
+          <dgm:constr type="l" for="ch" forName="arrow"/>
+          <dgm:constr type="w" for="ch" forName="points" refType="w" fact="0.9"/>
+          <dgm:constr type="h" for="ch" forName="points" refType="h"/>
+          <dgm:constr type="t" for="ch" forName="points"/>
+          <dgm:constr type="l" for="ch" forName="points"/>
         </dgm:constrLst>
-        <dgm:ruleLst>
-          <dgm:rule type="w" for="ch" forName="composite" val="0" fact="NaN" max="NaN"/>
-          <dgm:rule type="primFontSz" for="des" forName="parTx" val="5" fact="NaN" max="NaN"/>
-        </dgm:ruleLst>
-        <dgm:forEach name="Name6" axis="ch" ptType="node">
-          <dgm:layoutNode name="composite">
-            <dgm:alg type="composite"/>
+      </dgm:if>
+      <dgm:else name="Name3">
+        <dgm:constrLst>
+          <dgm:constr type="w" for="ch" forName="arrow" refType="w"/>
+          <dgm:constr type="h" for="ch" forName="arrow" refType="h" fact="0.4"/>
+          <dgm:constr type="ctrY" for="ch" forName="arrow" refType="h" fact="0.5"/>
+          <dgm:constr type="r" for="ch" forName="arrow" refType="w"/>
+          <dgm:constr type="w" for="ch" forName="points" refType="w" fact="0.9"/>
+          <dgm:constr type="h" for="ch" forName="points" refType="h"/>
+          <dgm:constr type="t" for="ch" forName="points"/>
+          <dgm:constr type="r" for="ch" forName="points" refType="w"/>
+        </dgm:constrLst>
+      </dgm:else>
+    </dgm:choose>
+    <dgm:ruleLst/>
+    <dgm:layoutNode name="arrow" styleLbl="bgShp">
+      <dgm:alg type="sp"/>
+      <dgm:choose name="Name4">
+        <dgm:if name="Name5" func="var" arg="dir" op="equ" val="norm">
+          <dgm:shape xmlns:r="http://schemas.openxmlformats.org/officeDocument/2006/relationships" type="notchedRightArrow" r:blip="">
+            <dgm:adjLst/>
+          </dgm:shape>
+        </dgm:if>
+        <dgm:else name="Name6">
+          <dgm:shape xmlns:r="http://schemas.openxmlformats.org/officeDocument/2006/relationships" rot="180" type="notchedRightArrow" r:blip="">
+            <dgm:adjLst/>
+          </dgm:shape>
+        </dgm:else>
+      </dgm:choose>
+      <dgm:presOf/>
+      <dgm:constrLst/>
+      <dgm:ruleLst/>
+    </dgm:layoutNode>
+    <dgm:layoutNode name="points">
+      <dgm:choose name="Name7">
+        <dgm:if name="Name8" func="var" arg="dir" op="equ" val="norm">
+          <dgm:alg type="lin">
+            <dgm:param type="linDir" val="fromL"/>
+          </dgm:alg>
+        </dgm:if>
+        <dgm:else name="Name9">
+          <dgm:alg type="lin">
+            <dgm:param type="linDir" val="fromR"/>
+          </dgm:alg>
+        </dgm:else>
+      </dgm:choose>
+      <dgm:shape xmlns:r="http://schemas.openxmlformats.org/officeDocument/2006/relationships" r:blip="">
+        <dgm:adjLst/>
+      </dgm:shape>
+      <dgm:presOf/>
+      <dgm:constrLst>
+        <dgm:constr type="w" for="ch" forName="compositeA" refType="w"/>
+        <dgm:constr type="h" for="ch" forName="compositeA" refType="h"/>
+        <dgm:constr type="w" for="ch" forName="compositeB" refType="w" refFor="ch" refForName="compositeA" op="equ"/>
+        <dgm:constr type="h" for="ch" forName="compositeB" refType="h" refFor="ch" refForName="compositeA" op="equ"/>
+        <dgm:constr type="primFontSz" for="des" ptType="node" op="equ" val="65"/>
+        <dgm:constr type="w" for="ch" forName="space" refType="w" refFor="ch" refForName="compositeA" op="equ" fact="0.05"/>
+      </dgm:constrLst>
+      <dgm:ruleLst/>
+      <dgm:forEach name="Name10" axis="ch" ptType="node">
+        <dgm:choose name="Name11">
+          <dgm:if name="Name12" axis="self" ptType="node" func="posOdd" op="equ" val="1">
+            <dgm:layoutNode name="compositeA">
+              <dgm:alg type="composite"/>
+              <dgm:shape xmlns:r="http://schemas.openxmlformats.org/officeDocument/2006/relationships" r:blip="">
+                <dgm:adjLst/>
+              </dgm:shape>
+              <dgm:presOf/>
+              <dgm:constrLst>
+                <dgm:constr type="w" for="ch" forName="textA" refType="w"/>
+                <dgm:constr type="h" for="ch" forName="textA" refType="h" fact="0.4"/>
+                <dgm:constr type="t" for="ch" forName="textA"/>
+                <dgm:constr type="l" for="ch" forName="textA"/>
+                <dgm:constr type="h" for="ch" forName="circleA" refType="h" fact="0.1"/>
+                <dgm:constr type="h" for="ch" forName="circleA" refType="w" op="lte"/>
+                <dgm:constr type="w" for="ch" forName="circleA" refType="h" refFor="ch" refForName="circleA" op="equ"/>
+                <dgm:constr type="ctrY" for="ch" forName="circleA" refType="h" fact="0.5"/>
+                <dgm:constr type="ctrX" for="ch" forName="circleA" refType="w" refFor="ch" refForName="textA" fact="0.5"/>
+                <dgm:constr type="w" for="ch" forName="spaceA" refType="w"/>
+                <dgm:constr type="h" for="ch" forName="spaceA" refType="h" fact="0.4"/>
+                <dgm:constr type="b" for="ch" forName="spaceA" refType="h"/>
+                <dgm:constr type="l" for="ch" forName="spaceA"/>
+              </dgm:constrLst>
+              <dgm:ruleLst/>
+              <dgm:layoutNode name="textA" styleLbl="revTx">
+                <dgm:varLst>
+                  <dgm:bulletEnabled val="1"/>
+                </dgm:varLst>
+                <dgm:alg type="tx">
+                  <dgm:param type="txAnchorVert" val="b"/>
+                  <dgm:param type="txAnchorVertCh" val="b"/>
+                  <dgm:param type="txAnchorHorzCh" val="ctr"/>
+                </dgm:alg>
+                <dgm:shape xmlns:r="http://schemas.openxmlformats.org/officeDocument/2006/relationships" type="rect" r:blip="">
+                  <dgm:adjLst/>
+                </dgm:shape>
+                <dgm:presOf axis="desOrSelf" ptType="node"/>
+                <dgm:constrLst/>
+                <dgm:ruleLst>
+                  <dgm:rule type="primFontSz" val="5" fact="NaN" max="NaN"/>
+                </dgm:ruleLst>
+              </dgm:layoutNode>
+              <dgm:layoutNode name="circleA">
+                <dgm:alg type="sp"/>
+                <dgm:shape xmlns:r="http://schemas.openxmlformats.org/officeDocument/2006/relationships" type="ellipse" r:blip="">
+                  <dgm:adjLst/>
+                </dgm:shape>
+                <dgm:presOf/>
+                <dgm:constrLst/>
+                <dgm:ruleLst/>
+              </dgm:layoutNode>
+              <dgm:layoutNode name="spaceA">
+                <dgm:alg type="sp"/>
+                <dgm:shape xmlns:r="http://schemas.openxmlformats.org/officeDocument/2006/relationships" r:blip="">
+                  <dgm:adjLst/>
+                </dgm:shape>
+                <dgm:presOf/>
+                <dgm:constrLst/>
+                <dgm:ruleLst/>
+              </dgm:layoutNode>
+            </dgm:layoutNode>
+          </dgm:if>
+          <dgm:else name="Name13">
+            <dgm:layoutNode name="compositeB">
+              <dgm:alg type="composite"/>
+              <dgm:shape xmlns:r="http://schemas.openxmlformats.org/officeDocument/2006/relationships" r:blip="">
+                <dgm:adjLst/>
+              </dgm:shape>
+              <dgm:presOf/>
+              <dgm:constrLst>
+                <dgm:constr type="w" for="ch" forName="textB" refType="w"/>
+                <dgm:constr type="h" for="ch" forName="textB" refType="h" fact="0.4"/>
+                <dgm:constr type="b" for="ch" forName="textB" refType="h"/>
+                <dgm:constr type="l" for="ch" forName="textB"/>
+                <dgm:constr type="h" for="ch" forName="circleB" refType="h" fact="0.1"/>
+                <dgm:constr type="w" for="ch" forName="circleB" refType="h" refFor="ch" refForName="circleB" op="equ"/>
+                <dgm:constr type="h" for="ch" forName="circleB" refType="w" op="lte"/>
+                <dgm:constr type="ctrY" for="ch" forName="circleB" refType="h" fact="0.5"/>
+                <dgm:constr type="ctrX" for="ch" forName="circleB" refType="w" refFor="ch" refForName="textB" fact="0.5"/>
+                <dgm:constr type="w" for="ch" forName="spaceB" refType="w"/>
+                <dgm:constr type="h" for="ch" forName="spaceB" refType="h" fact="0.4"/>
+                <dgm:constr type="t" for="ch" forName="spaceB"/>
+                <dgm:constr type="l" for="ch" forName="spaceB"/>
+              </dgm:constrLst>
+              <dgm:ruleLst/>
+              <dgm:layoutNode name="textB" styleLbl="revTx">
+                <dgm:varLst>
+                  <dgm:bulletEnabled val="1"/>
+                </dgm:varLst>
+                <dgm:alg type="tx">
+                  <dgm:param type="txAnchorVert" val="t"/>
+                  <dgm:param type="txAnchorVertCh" val="t"/>
+                  <dgm:param type="txAnchorHorzCh" val="ctr"/>
+                </dgm:alg>
+                <dgm:shape xmlns:r="http://schemas.openxmlformats.org/officeDocument/2006/relationships" type="rect" r:blip="">
+                  <dgm:adjLst/>
+                </dgm:shape>
+                <dgm:presOf axis="desOrSelf" ptType="node"/>
+                <dgm:constrLst/>
+                <dgm:ruleLst>
+                  <dgm:rule type="primFontSz" val="5" fact="NaN" max="NaN"/>
+                </dgm:ruleLst>
+              </dgm:layoutNode>
+              <dgm:layoutNode name="circleB">
+                <dgm:alg type="sp"/>
+                <dgm:shape xmlns:r="http://schemas.openxmlformats.org/officeDocument/2006/relationships" type="ellipse" r:blip="">
+                  <dgm:adjLst/>
+                </dgm:shape>
+                <dgm:presOf/>
+                <dgm:constrLst/>
+                <dgm:ruleLst/>
+              </dgm:layoutNode>
+              <dgm:layoutNode name="spaceB">
+                <dgm:alg type="sp"/>
+                <dgm:shape xmlns:r="http://schemas.openxmlformats.org/officeDocument/2006/relationships" r:blip="">
+                  <dgm:adjLst/>
+                </dgm:shape>
+                <dgm:presOf/>
+                <dgm:constrLst/>
+                <dgm:ruleLst/>
+              </dgm:layoutNode>
+            </dgm:layoutNode>
+          </dgm:else>
+        </dgm:choose>
+        <dgm:forEach name="Name14" axis="followSib" ptType="sibTrans" cnt="1">
+          <dgm:layoutNode name="space">
+            <dgm:alg type="sp"/>
             <dgm:shape xmlns:r="http://schemas.openxmlformats.org/officeDocument/2006/relationships" r:blip="">
               <dgm:adjLst/>
             </dgm:shape>
             <dgm:presOf/>
-            <dgm:choose name="Name7">
-              <dgm:if name="Name8" func="var" arg="dir" op="equ" val="norm">
-                <dgm:constrLst>
-                  <dgm:constr type="l" for="ch" forName="parTx"/>
-                  <dgm:constr type="w" for="ch" forName="parTx" refType="w"/>
-                  <dgm:constr type="t" for="ch" forName="parTx"/>
-                  <dgm:constr type="l" for="ch" forName="desTx"/>
-                  <dgm:constr type="w" for="ch" forName="desTx" refType="w" refFor="ch" refForName="parTx" fact="0.8"/>
-                  <dgm:constr type="t" for="ch" forName="desTx" refType="h" refFor="ch" refForName="parTx" fact="1.125"/>
-                </dgm:constrLst>
-              </dgm:if>
-              <dgm:else name="Name9">
-                <dgm:constrLst>
-                  <dgm:constr type="l" for="ch" forName="parTx"/>
-                  <dgm:constr type="w" for="ch" forName="parTx" refType="w"/>
-                  <dgm:constr type="t" for="ch" forName="parTx"/>
-                  <dgm:constr type="l" for="ch" forName="desTx" refType="w" fact="0.2"/>
-                  <dgm:constr type="w" for="ch" forName="desTx" refType="w" refFor="ch" refForName="parTx" fact="0.8"/>
-                  <dgm:constr type="t" for="ch" forName="desTx" refType="h" refFor="ch" refForName="parTx" fact="1.125"/>
-                </dgm:constrLst>
-              </dgm:else>
-            </dgm:choose>
-            <dgm:ruleLst>
-              <dgm:rule type="h" val="INF" fact="NaN" max="NaN"/>
-            </dgm:ruleLst>
-            <dgm:layoutNode name="parTx">
-              <dgm:varLst>
-                <dgm:chMax val="0"/>
-                <dgm:chPref val="0"/>
-                <dgm:bulletEnabled val="1"/>
-              </dgm:varLst>
-              <dgm:alg type="tx"/>
-              <dgm:choose name="Name10">
-                <dgm:if name="Name11" func="var" arg="dir" op="equ" val="norm">
-                  <dgm:shape xmlns:r="http://schemas.openxmlformats.org/officeDocument/2006/relationships" type="chevron" r:blip="">
-                    <dgm:adjLst/>
-                  </dgm:shape>
-                </dgm:if>
-                <dgm:else name="Name12">
-                  <dgm:shape xmlns:r="http://schemas.openxmlformats.org/officeDocument/2006/relationships" rot="180" type="chevron" r:blip="">
-                    <dgm:adjLst/>
-                  </dgm:shape>
-                </dgm:else>
-              </dgm:choose>
-              <dgm:presOf axis="self" ptType="node"/>
-              <dgm:choose name="Name13">
-                <dgm:if name="Name14" func="var" arg="dir" op="equ" val="norm">
-                  <dgm:constrLst>
-                    <dgm:constr type="h" refType="w" op="lte" fact="0.4"/>
-                    <dgm:constr type="h"/>
-                    <dgm:constr type="tMarg" refType="primFontSz" fact="0.105"/>
-                    <dgm:constr type="bMarg" refType="primFontSz" fact="0.105"/>
-                    <dgm:constr type="lMarg" refType="primFontSz" fact="0.315"/>
-                    <dgm:constr type="rMarg" refType="primFontSz" fact="0.105"/>
-                  </dgm:constrLst>
-                </dgm:if>
-                <dgm:else name="Name15">
-                  <dgm:constrLst>
-                    <dgm:constr type="h" refType="w" op="lte" fact="0.4"/>
-                    <dgm:constr type="h"/>
-                    <dgm:constr type="tMarg" refType="primFontSz" fact="0.105"/>
-                    <dgm:constr type="bMarg" refType="primFontSz" fact="0.105"/>
-                    <dgm:constr type="lMarg" refType="primFontSz" fact="0.105"/>
-                    <dgm:constr type="rMarg" refType="primFontSz" fact="0.315"/>
-                  </dgm:constrLst>
-                </dgm:else>
-              </dgm:choose>
-              <dgm:ruleLst>
-                <dgm:rule type="h" val="INF" fact="NaN" max="NaN"/>
-              </dgm:ruleLst>
-            </dgm:layoutNode>
-            <dgm:layoutNode name="desTx" styleLbl="revTx">
-              <dgm:varLst>
-                <dgm:bulletEnabled val="1"/>
-              </dgm:varLst>
-              <dgm:alg type="tx">
-                <dgm:param type="stBulletLvl" val="1"/>
-              </dgm:alg>
-              <dgm:choose name="Name16">
-                <dgm:if name="Name17" axis="ch" ptType="node" func="cnt" op="gte" val="1">
-                  <dgm:shape xmlns:r="http://schemas.openxmlformats.org/officeDocument/2006/relationships" type="rect" r:blip="">
-                    <dgm:adjLst/>
-                  </dgm:shape>
-                </dgm:if>
-                <dgm:else name="Name18">
-                  <dgm:shape xmlns:r="http://schemas.openxmlformats.org/officeDocument/2006/relationships" type="rect" r:blip="" hideGeom="1">
-                    <dgm:adjLst/>
-                  </dgm:shape>
-                </dgm:else>
-              </dgm:choose>
-              <dgm:presOf axis="des" ptType="node"/>
-              <dgm:constrLst>
-                <dgm:constr type="secFontSz" val="65"/>
-                <dgm:constr type="primFontSz" refType="secFontSz"/>
-                <dgm:constr type="h"/>
-                <dgm:constr type="tMarg"/>
-                <dgm:constr type="bMarg"/>
-                <dgm:constr type="rMarg"/>
-                <dgm:constr type="lMarg"/>
-              </dgm:constrLst>
-              <dgm:ruleLst>
-                <dgm:rule type="h" val="INF" fact="NaN" max="NaN"/>
-              </dgm:ruleLst>
-            </dgm:layoutNode>
+            <dgm:constrLst/>
+            <dgm:ruleLst/>
           </dgm:layoutNode>
-          <dgm:forEach name="Name19" axis="followSib" ptType="sibTrans" cnt="1">
-            <dgm:layoutNode name="space">
-              <dgm:alg type="sp"/>
-              <dgm:shape xmlns:r="http://schemas.openxmlformats.org/officeDocument/2006/relationships" r:blip="">
-                <dgm:adjLst/>
-              </dgm:shape>
-              <dgm:presOf/>
-              <dgm:constrLst/>
-              <dgm:ruleLst/>
-            </dgm:layoutNode>
-          </dgm:forEach>
         </dgm:forEach>
-      </dgm:if>
-      <dgm:else name="Name20">
-        <dgm:constrLst>
-          <dgm:constr type="w" for="ch" forName="parTxOnly" refType="w"/>
-          <dgm:constr type="h" for="des" forName="parTxOnly" op="equ"/>
-          <dgm:constr type="primFontSz" for="des" forName="parTxOnly" op="equ" val="65"/>
-          <dgm:constr type="w" for="ch" forName="parTxOnlySpace" refType="w" refFor="ch" refForName="parTxOnly" fact="-0.1"/>
-        </dgm:constrLst>
-        <dgm:ruleLst/>
-        <dgm:forEach name="Name21" axis="ch" ptType="node">
-          <dgm:layoutNode name="parTxOnly">
-            <dgm:varLst>
-              <dgm:chMax val="0"/>
-              <dgm:chPref val="0"/>
-              <dgm:bulletEnabled val="1"/>
-            </dgm:varLst>
-            <dgm:alg type="tx"/>
-            <dgm:choose name="Name22">
-              <dgm:if name="Name23" func="var" arg="dir" op="equ" val="norm">
-                <dgm:shape xmlns:r="http://schemas.openxmlformats.org/officeDocument/2006/relationships" type="chevron" r:blip="">
-                  <dgm:adjLst/>
-                </dgm:shape>
-              </dgm:if>
-              <dgm:else name="Name24">
-                <dgm:shape xmlns:r="http://schemas.openxmlformats.org/officeDocument/2006/relationships" rot="180" type="chevron" r:blip="">
-                  <dgm:adjLst/>
-                </dgm:shape>
-              </dgm:else>
-            </dgm:choose>
-            <dgm:presOf axis="self" ptType="node"/>
-            <dgm:choose name="Name25">
-              <dgm:if name="Name26" func="var" arg="dir" op="equ" val="norm">
-                <dgm:constrLst>
-                  <dgm:constr type="h" refType="w" op="equ" fact="0.4"/>
-                  <dgm:constr type="tMarg" refType="primFontSz" fact="0.105"/>
-                  <dgm:constr type="bMarg" refType="primFontSz" fact="0.105"/>
-                  <dgm:constr type="lMarg" refType="primFontSz" fact="0.315"/>
-                  <dgm:constr type="rMarg" refType="primFontSz" fact="0.105"/>
-                </dgm:constrLst>
-              </dgm:if>
-              <dgm:else name="Name27">
-                <dgm:constrLst>
-                  <dgm:constr type="h" refType="w" op="equ" fact="0.4"/>
-                  <dgm:constr type="tMarg" refType="primFontSz" fact="0.105"/>
-                  <dgm:constr type="bMarg" refType="primFontSz" fact="0.105"/>
-                  <dgm:constr type="lMarg" refType="primFontSz" fact="0.105"/>
-                  <dgm:constr type="rMarg" refType="primFontSz" fact="0.315"/>
-                </dgm:constrLst>
-              </dgm:else>
-            </dgm:choose>
-            <dgm:ruleLst>
-              <dgm:rule type="primFontSz" val="5" fact="NaN" max="NaN"/>
-            </dgm:ruleLst>
-          </dgm:layoutNode>
-          <dgm:forEach name="Name28" axis="followSib" ptType="sibTrans" cnt="1">
-            <dgm:layoutNode name="parTxOnlySpace">
-              <dgm:alg type="sp"/>
-              <dgm:shape xmlns:r="http://schemas.openxmlformats.org/officeDocument/2006/relationships" r:blip="">
-                <dgm:adjLst/>
-              </dgm:shape>
-              <dgm:presOf/>
-              <dgm:constrLst/>
-              <dgm:ruleLst/>
-            </dgm:layoutNode>
-          </dgm:forEach>
-        </dgm:forEach>
-      </dgm:else>
-    </dgm:choose>
+      </dgm:forEach>
+    </dgm:layoutNode>
   </dgm:layoutNode>
 </dgm:layoutDef>
 </file>
 
 <file path=ppt/diagrams/quickStyle1.xml><?xml version="1.0" encoding="utf-8"?>
-<dgm:styleDef xmlns:dgm="http://schemas.openxmlformats.org/drawingml/2006/diagram" xmlns:a="http://schemas.openxmlformats.org/drawingml/2006/main" uniqueId="urn:microsoft.com/office/officeart/2005/8/quickstyle/simple2">
+<dgm:styleDef xmlns:dgm="http://schemas.openxmlformats.org/drawingml/2006/diagram" xmlns:a="http://schemas.openxmlformats.org/drawingml/2006/main" uniqueId="urn:microsoft.com/office/officeart/2005/8/quickstyle/simple5">
   <dgm:title val=""/>
   <dgm:desc val=""/>
   <dgm:catLst>
-    <dgm:cat type="simple" pri="10200"/>
+    <dgm:cat type="simple" pri="10500"/>
   </dgm:catLst>
   <dgm:scene3d>
     <a:camera prst="orthographicFront"/>
@@ -2138,13 +2576,13 @@
     <dgm:sp3d/>
     <dgm:txPr/>
     <dgm:style>
-      <a:lnRef idx="3">
+      <a:lnRef idx="0">
         <a:scrgbClr r="0" g="0" b="0"/>
       </a:lnRef>
-      <a:fillRef idx="1">
+      <a:fillRef idx="3">
         <a:scrgbClr r="0" g="0" b="0"/>
       </a:fillRef>
-      <a:effectRef idx="1">
+      <a:effectRef idx="3">
         <a:scrgbClr r="0" g="0" b="0"/>
       </a:effectRef>
       <a:fontRef idx="minor">
@@ -2160,13 +2598,13 @@
     <dgm:sp3d/>
     <dgm:txPr/>
     <dgm:style>
-      <a:lnRef idx="3">
+      <a:lnRef idx="0">
         <a:scrgbClr r="0" g="0" b="0"/>
       </a:lnRef>
-      <a:fillRef idx="1">
+      <a:fillRef idx="3">
         <a:scrgbClr r="0" g="0" b="0"/>
       </a:fillRef>
-      <a:effectRef idx="1">
+      <a:effectRef idx="3">
         <a:scrgbClr r="0" g="0" b="0"/>
       </a:effectRef>
       <a:fontRef idx="minor">
@@ -2182,13 +2620,13 @@
     <dgm:sp3d/>
     <dgm:txPr/>
     <dgm:style>
-      <a:lnRef idx="3">
+      <a:lnRef idx="0">
         <a:scrgbClr r="0" g="0" b="0"/>
       </a:lnRef>
-      <a:fillRef idx="1">
+      <a:fillRef idx="3">
         <a:scrgbClr r="0" g="0" b="0"/>
       </a:fillRef>
-      <a:effectRef idx="0">
+      <a:effectRef idx="3">
         <a:scrgbClr r="0" g="0" b="0"/>
       </a:effectRef>
       <a:fontRef idx="minor">
@@ -2204,13 +2642,13 @@
     <dgm:sp3d/>
     <dgm:txPr/>
     <dgm:style>
-      <a:lnRef idx="2">
+      <a:lnRef idx="1">
         <a:scrgbClr r="0" g="0" b="0"/>
       </a:lnRef>
-      <a:fillRef idx="1">
+      <a:fillRef idx="3">
         <a:scrgbClr r="0" g="0" b="0"/>
       </a:fillRef>
-      <a:effectRef idx="1">
+      <a:effectRef idx="3">
         <a:scrgbClr r="0" g="0" b="0"/>
       </a:effectRef>
       <a:fontRef idx="minor">
@@ -2226,13 +2664,13 @@
     <dgm:sp3d/>
     <dgm:txPr/>
     <dgm:style>
-      <a:lnRef idx="3">
+      <a:lnRef idx="0">
         <a:scrgbClr r="0" g="0" b="0"/>
       </a:lnRef>
-      <a:fillRef idx="1">
+      <a:fillRef idx="3">
         <a:scrgbClr r="0" g="0" b="0"/>
       </a:fillRef>
-      <a:effectRef idx="1">
+      <a:effectRef idx="3">
         <a:scrgbClr r="0" g="0" b="0"/>
       </a:effectRef>
       <a:fontRef idx="minor">
@@ -2248,13 +2686,13 @@
     <dgm:sp3d/>
     <dgm:txPr/>
     <dgm:style>
-      <a:lnRef idx="3">
+      <a:lnRef idx="0">
         <a:scrgbClr r="0" g="0" b="0"/>
       </a:lnRef>
-      <a:fillRef idx="1">
+      <a:fillRef idx="3">
         <a:scrgbClr r="0" g="0" b="0"/>
       </a:fillRef>
-      <a:effectRef idx="1">
+      <a:effectRef idx="3">
         <a:scrgbClr r="0" g="0" b="0"/>
       </a:effectRef>
       <a:fontRef idx="minor">
@@ -2270,13 +2708,13 @@
     <dgm:sp3d/>
     <dgm:txPr/>
     <dgm:style>
-      <a:lnRef idx="3">
+      <a:lnRef idx="0">
         <a:scrgbClr r="0" g="0" b="0"/>
       </a:lnRef>
-      <a:fillRef idx="1">
+      <a:fillRef idx="3">
         <a:scrgbClr r="0" g="0" b="0"/>
       </a:fillRef>
-      <a:effectRef idx="1">
+      <a:effectRef idx="3">
         <a:scrgbClr r="0" g="0" b="0"/>
       </a:effectRef>
       <a:fontRef idx="minor">
@@ -2292,13 +2730,13 @@
     <dgm:sp3d/>
     <dgm:txPr/>
     <dgm:style>
-      <a:lnRef idx="3">
+      <a:lnRef idx="0">
         <a:scrgbClr r="0" g="0" b="0"/>
       </a:lnRef>
-      <a:fillRef idx="1">
+      <a:fillRef idx="3">
         <a:scrgbClr r="0" g="0" b="0"/>
       </a:fillRef>
-      <a:effectRef idx="1">
+      <a:effectRef idx="3">
         <a:scrgbClr r="0" g="0" b="0"/>
       </a:effectRef>
       <a:fontRef idx="minor">
@@ -2314,13 +2752,13 @@
     <dgm:sp3d/>
     <dgm:txPr/>
     <dgm:style>
-      <a:lnRef idx="3">
+      <a:lnRef idx="0">
         <a:scrgbClr r="0" g="0" b="0"/>
       </a:lnRef>
       <a:fillRef idx="1">
         <a:scrgbClr r="0" g="0" b="0"/>
       </a:fillRef>
-      <a:effectRef idx="1">
+      <a:effectRef idx="3">
         <a:scrgbClr r="0" g="0" b="0"/>
       </a:effectRef>
       <a:fontRef idx="minor"/>
@@ -2334,13 +2772,13 @@
     <dgm:sp3d/>
     <dgm:txPr/>
     <dgm:style>
-      <a:lnRef idx="3">
+      <a:lnRef idx="0">
         <a:scrgbClr r="0" g="0" b="0"/>
       </a:lnRef>
       <a:fillRef idx="1">
         <a:scrgbClr r="0" g="0" b="0"/>
       </a:fillRef>
-      <a:effectRef idx="1">
+      <a:effectRef idx="3">
         <a:scrgbClr r="0" g="0" b="0"/>
       </a:effectRef>
       <a:fontRef idx="minor"/>
@@ -2354,13 +2792,13 @@
     <dgm:sp3d/>
     <dgm:txPr/>
     <dgm:style>
-      <a:lnRef idx="3">
+      <a:lnRef idx="0">
         <a:scrgbClr r="0" g="0" b="0"/>
       </a:lnRef>
       <a:fillRef idx="1">
         <a:scrgbClr r="0" g="0" b="0"/>
       </a:fillRef>
-      <a:effectRef idx="1">
+      <a:effectRef idx="3">
         <a:scrgbClr r="0" g="0" b="0"/>
       </a:effectRef>
       <a:fontRef idx="minor"/>
@@ -2377,10 +2815,10 @@
       <a:lnRef idx="0">
         <a:scrgbClr r="0" g="0" b="0"/>
       </a:lnRef>
-      <a:fillRef idx="1">
+      <a:fillRef idx="3">
         <a:scrgbClr r="0" g="0" b="0"/>
       </a:fillRef>
-      <a:effectRef idx="1">
+      <a:effectRef idx="3">
         <a:scrgbClr r="0" g="0" b="0"/>
       </a:effectRef>
       <a:fontRef idx="minor">
@@ -2399,10 +2837,10 @@
       <a:lnRef idx="0">
         <a:scrgbClr r="0" g="0" b="0"/>
       </a:lnRef>
-      <a:fillRef idx="1">
+      <a:fillRef idx="3">
         <a:scrgbClr r="0" g="0" b="0"/>
       </a:fillRef>
-      <a:effectRef idx="1">
+      <a:effectRef idx="3">
         <a:scrgbClr r="0" g="0" b="0"/>
       </a:effectRef>
       <a:fontRef idx="minor">
@@ -2421,10 +2859,10 @@
       <a:lnRef idx="0">
         <a:scrgbClr r="0" g="0" b="0"/>
       </a:lnRef>
-      <a:fillRef idx="1">
+      <a:fillRef idx="3">
         <a:scrgbClr r="0" g="0" b="0"/>
       </a:fillRef>
-      <a:effectRef idx="1">
+      <a:effectRef idx="3">
         <a:scrgbClr r="0" g="0" b="0"/>
       </a:effectRef>
       <a:fontRef idx="minor">
@@ -2460,10 +2898,10 @@
     <dgm:sp3d/>
     <dgm:txPr/>
     <dgm:style>
-      <a:lnRef idx="2">
+      <a:lnRef idx="1">
         <a:scrgbClr r="0" g="0" b="0"/>
       </a:lnRef>
-      <a:fillRef idx="1">
+      <a:fillRef idx="0">
         <a:scrgbClr r="0" g="0" b="0"/>
       </a:fillRef>
       <a:effectRef idx="1">
@@ -2480,13 +2918,13 @@
     <dgm:sp3d/>
     <dgm:txPr/>
     <dgm:style>
-      <a:lnRef idx="3">
+      <a:lnRef idx="0">
         <a:scrgbClr r="0" g="0" b="0"/>
       </a:lnRef>
-      <a:fillRef idx="1">
+      <a:fillRef idx="3">
         <a:scrgbClr r="0" g="0" b="0"/>
       </a:fillRef>
-      <a:effectRef idx="1">
+      <a:effectRef idx="3">
         <a:scrgbClr r="0" g="0" b="0"/>
       </a:effectRef>
       <a:fontRef idx="minor">
@@ -2502,13 +2940,13 @@
     <dgm:sp3d/>
     <dgm:txPr/>
     <dgm:style>
-      <a:lnRef idx="3">
+      <a:lnRef idx="0">
         <a:scrgbClr r="0" g="0" b="0"/>
       </a:lnRef>
-      <a:fillRef idx="1">
+      <a:fillRef idx="3">
         <a:scrgbClr r="0" g="0" b="0"/>
       </a:fillRef>
-      <a:effectRef idx="1">
+      <a:effectRef idx="3">
         <a:scrgbClr r="0" g="0" b="0"/>
       </a:effectRef>
       <a:fontRef idx="minor">
@@ -2524,13 +2962,13 @@
     <dgm:sp3d/>
     <dgm:txPr/>
     <dgm:style>
-      <a:lnRef idx="3">
+      <a:lnRef idx="0">
         <a:scrgbClr r="0" g="0" b="0"/>
       </a:lnRef>
-      <a:fillRef idx="1">
+      <a:fillRef idx="3">
         <a:scrgbClr r="0" g="0" b="0"/>
       </a:fillRef>
-      <a:effectRef idx="1">
+      <a:effectRef idx="3">
         <a:scrgbClr r="0" g="0" b="0"/>
       </a:effectRef>
       <a:fontRef idx="minor">
@@ -2546,13 +2984,13 @@
     <dgm:sp3d/>
     <dgm:txPr/>
     <dgm:style>
-      <a:lnRef idx="3">
+      <a:lnRef idx="0">
         <a:scrgbClr r="0" g="0" b="0"/>
       </a:lnRef>
-      <a:fillRef idx="1">
+      <a:fillRef idx="3">
         <a:scrgbClr r="0" g="0" b="0"/>
       </a:fillRef>
-      <a:effectRef idx="1">
+      <a:effectRef idx="3">
         <a:scrgbClr r="0" g="0" b="0"/>
       </a:effectRef>
       <a:fontRef idx="minor">
@@ -2568,13 +3006,13 @@
     <dgm:sp3d/>
     <dgm:txPr/>
     <dgm:style>
-      <a:lnRef idx="3">
+      <a:lnRef idx="0">
         <a:scrgbClr r="0" g="0" b="0"/>
       </a:lnRef>
-      <a:fillRef idx="1">
+      <a:fillRef idx="3">
         <a:scrgbClr r="0" g="0" b="0"/>
       </a:fillRef>
-      <a:effectRef idx="1">
+      <a:effectRef idx="3">
         <a:scrgbClr r="0" g="0" b="0"/>
       </a:effectRef>
       <a:fontRef idx="minor">
@@ -2590,13 +3028,13 @@
     <dgm:sp3d/>
     <dgm:txPr/>
     <dgm:style>
-      <a:lnRef idx="3">
+      <a:lnRef idx="0">
         <a:scrgbClr r="0" g="0" b="0"/>
       </a:lnRef>
-      <a:fillRef idx="1">
+      <a:fillRef idx="3">
         <a:scrgbClr r="0" g="0" b="0"/>
       </a:fillRef>
-      <a:effectRef idx="1">
+      <a:effectRef idx="3">
         <a:scrgbClr r="0" g="0" b="0"/>
       </a:effectRef>
       <a:fontRef idx="minor">
@@ -2612,13 +3050,13 @@
     <dgm:sp3d/>
     <dgm:txPr/>
     <dgm:style>
-      <a:lnRef idx="3">
+      <a:lnRef idx="0">
         <a:scrgbClr r="0" g="0" b="0"/>
       </a:lnRef>
-      <a:fillRef idx="1">
+      <a:fillRef idx="3">
         <a:scrgbClr r="0" g="0" b="0"/>
       </a:fillRef>
-      <a:effectRef idx="1">
+      <a:effectRef idx="3">
         <a:scrgbClr r="0" g="0" b="0"/>
       </a:effectRef>
       <a:fontRef idx="minor">
@@ -2634,13 +3072,13 @@
     <dgm:sp3d/>
     <dgm:txPr/>
     <dgm:style>
-      <a:lnRef idx="3">
+      <a:lnRef idx="0">
         <a:scrgbClr r="0" g="0" b="0"/>
       </a:lnRef>
-      <a:fillRef idx="1">
+      <a:fillRef idx="3">
         <a:scrgbClr r="0" g="0" b="0"/>
       </a:fillRef>
-      <a:effectRef idx="1">
+      <a:effectRef idx="3">
         <a:scrgbClr r="0" g="0" b="0"/>
       </a:effectRef>
       <a:fontRef idx="minor">
@@ -2656,13 +3094,13 @@
     <dgm:sp3d/>
     <dgm:txPr/>
     <dgm:style>
-      <a:lnRef idx="3">
+      <a:lnRef idx="0">
         <a:scrgbClr r="0" g="0" b="0"/>
       </a:lnRef>
-      <a:fillRef idx="1">
+      <a:fillRef idx="3">
         <a:scrgbClr r="0" g="0" b="0"/>
       </a:fillRef>
-      <a:effectRef idx="1">
+      <a:effectRef idx="3">
         <a:scrgbClr r="0" g="0" b="0"/>
       </a:effectRef>
       <a:fontRef idx="minor">
@@ -2758,13 +3196,13 @@
     <dgm:sp3d/>
     <dgm:txPr/>
     <dgm:style>
-      <a:lnRef idx="2">
+      <a:lnRef idx="1">
         <a:scrgbClr r="0" g="0" b="0"/>
       </a:lnRef>
       <a:fillRef idx="1">
         <a:scrgbClr r="0" g="0" b="0"/>
       </a:fillRef>
-      <a:effectRef idx="0">
+      <a:effectRef idx="2">
         <a:scrgbClr r="0" g="0" b="0"/>
       </a:effectRef>
       <a:fontRef idx="minor"/>
@@ -2778,13 +3216,13 @@
     <dgm:sp3d/>
     <dgm:txPr/>
     <dgm:style>
-      <a:lnRef idx="2">
+      <a:lnRef idx="1">
         <a:scrgbClr r="0" g="0" b="0"/>
       </a:lnRef>
       <a:fillRef idx="1">
         <a:scrgbClr r="0" g="0" b="0"/>
       </a:fillRef>
-      <a:effectRef idx="0">
+      <a:effectRef idx="2">
         <a:scrgbClr r="0" g="0" b="0"/>
       </a:effectRef>
       <a:fontRef idx="minor"/>
@@ -2798,13 +3236,13 @@
     <dgm:sp3d/>
     <dgm:txPr/>
     <dgm:style>
-      <a:lnRef idx="2">
+      <a:lnRef idx="1">
         <a:scrgbClr r="0" g="0" b="0"/>
       </a:lnRef>
       <a:fillRef idx="1">
         <a:scrgbClr r="0" g="0" b="0"/>
       </a:fillRef>
-      <a:effectRef idx="0">
+      <a:effectRef idx="2">
         <a:scrgbClr r="0" g="0" b="0"/>
       </a:effectRef>
       <a:fontRef idx="minor"/>
@@ -2838,13 +3276,13 @@
     <dgm:sp3d/>
     <dgm:txPr/>
     <dgm:style>
-      <a:lnRef idx="2">
+      <a:lnRef idx="1">
         <a:scrgbClr r="0" g="0" b="0"/>
       </a:lnRef>
       <a:fillRef idx="1">
         <a:scrgbClr r="0" g="0" b="0"/>
       </a:fillRef>
-      <a:effectRef idx="0">
+      <a:effectRef idx="2">
         <a:scrgbClr r="0" g="0" b="0"/>
       </a:effectRef>
       <a:fontRef idx="minor"/>
@@ -2858,13 +3296,13 @@
     <dgm:sp3d/>
     <dgm:txPr/>
     <dgm:style>
-      <a:lnRef idx="2">
+      <a:lnRef idx="1">
         <a:scrgbClr r="0" g="0" b="0"/>
       </a:lnRef>
       <a:fillRef idx="1">
         <a:scrgbClr r="0" g="0" b="0"/>
       </a:fillRef>
-      <a:effectRef idx="0">
+      <a:effectRef idx="2">
         <a:scrgbClr r="0" g="0" b="0"/>
       </a:effectRef>
       <a:fontRef idx="minor"/>
@@ -2878,13 +3316,13 @@
     <dgm:sp3d/>
     <dgm:txPr/>
     <dgm:style>
-      <a:lnRef idx="2">
+      <a:lnRef idx="1">
         <a:scrgbClr r="0" g="0" b="0"/>
       </a:lnRef>
       <a:fillRef idx="1">
         <a:scrgbClr r="0" g="0" b="0"/>
       </a:fillRef>
-      <a:effectRef idx="0">
+      <a:effectRef idx="3">
         <a:scrgbClr r="0" g="0" b="0"/>
       </a:effectRef>
       <a:fontRef idx="minor"/>
@@ -2898,13 +3336,13 @@
     <dgm:sp3d/>
     <dgm:txPr/>
     <dgm:style>
-      <a:lnRef idx="2">
+      <a:lnRef idx="1">
         <a:scrgbClr r="0" g="0" b="0"/>
       </a:lnRef>
       <a:fillRef idx="1">
         <a:scrgbClr r="0" g="0" b="0"/>
       </a:fillRef>
-      <a:effectRef idx="0">
+      <a:effectRef idx="3">
         <a:scrgbClr r="0" g="0" b="0"/>
       </a:effectRef>
       <a:fontRef idx="minor"/>
@@ -2918,13 +3356,13 @@
     <dgm:sp3d/>
     <dgm:txPr/>
     <dgm:style>
-      <a:lnRef idx="2">
+      <a:lnRef idx="1">
         <a:scrgbClr r="0" g="0" b="0"/>
       </a:lnRef>
       <a:fillRef idx="1">
         <a:scrgbClr r="0" g="0" b="0"/>
       </a:fillRef>
-      <a:effectRef idx="0">
+      <a:effectRef idx="2">
         <a:scrgbClr r="0" g="0" b="0"/>
       </a:effectRef>
       <a:fontRef idx="minor"/>
@@ -2938,13 +3376,13 @@
     <dgm:sp3d/>
     <dgm:txPr/>
     <dgm:style>
-      <a:lnRef idx="2">
+      <a:lnRef idx="1">
         <a:scrgbClr r="0" g="0" b="0"/>
       </a:lnRef>
       <a:fillRef idx="1">
         <a:scrgbClr r="0" g="0" b="0"/>
       </a:fillRef>
-      <a:effectRef idx="0">
+      <a:effectRef idx="2">
         <a:scrgbClr r="0" g="0" b="0"/>
       </a:effectRef>
       <a:fontRef idx="minor"/>
@@ -2958,13 +3396,13 @@
     <dgm:sp3d/>
     <dgm:txPr/>
     <dgm:style>
-      <a:lnRef idx="2">
+      <a:lnRef idx="1">
         <a:scrgbClr r="0" g="0" b="0"/>
       </a:lnRef>
       <a:fillRef idx="1">
         <a:scrgbClr r="0" g="0" b="0"/>
       </a:fillRef>
-      <a:effectRef idx="0">
+      <a:effectRef idx="2">
         <a:scrgbClr r="0" g="0" b="0"/>
       </a:effectRef>
       <a:fontRef idx="minor"/>
@@ -2978,13 +3416,13 @@
     <dgm:sp3d/>
     <dgm:txPr/>
     <dgm:style>
-      <a:lnRef idx="2">
+      <a:lnRef idx="1">
         <a:scrgbClr r="0" g="0" b="0"/>
       </a:lnRef>
       <a:fillRef idx="1">
         <a:scrgbClr r="0" g="0" b="0"/>
       </a:fillRef>
-      <a:effectRef idx="0">
+      <a:effectRef idx="2">
         <a:scrgbClr r="0" g="0" b="0"/>
       </a:effectRef>
       <a:fontRef idx="minor"/>
@@ -2998,13 +3436,13 @@
     <dgm:sp3d/>
     <dgm:txPr/>
     <dgm:style>
-      <a:lnRef idx="2">
+      <a:lnRef idx="1">
         <a:scrgbClr r="0" g="0" b="0"/>
       </a:lnRef>
       <a:fillRef idx="1">
         <a:scrgbClr r="0" g="0" b="0"/>
       </a:fillRef>
-      <a:effectRef idx="0">
+      <a:effectRef idx="2">
         <a:scrgbClr r="0" g="0" b="0"/>
       </a:effectRef>
       <a:fontRef idx="minor"/>
@@ -3018,13 +3456,13 @@
     <dgm:sp3d/>
     <dgm:txPr/>
     <dgm:style>
-      <a:lnRef idx="2">
+      <a:lnRef idx="1">
         <a:scrgbClr r="0" g="0" b="0"/>
       </a:lnRef>
       <a:fillRef idx="1">
         <a:scrgbClr r="0" g="0" b="0"/>
       </a:fillRef>
-      <a:effectRef idx="0">
+      <a:effectRef idx="2">
         <a:scrgbClr r="0" g="0" b="0"/>
       </a:effectRef>
       <a:fontRef idx="minor"/>
@@ -3038,13 +3476,13 @@
     <dgm:sp3d/>
     <dgm:txPr/>
     <dgm:style>
-      <a:lnRef idx="2">
+      <a:lnRef idx="1">
         <a:scrgbClr r="0" g="0" b="0"/>
       </a:lnRef>
       <a:fillRef idx="1">
         <a:scrgbClr r="0" g="0" b="0"/>
       </a:fillRef>
-      <a:effectRef idx="0">
+      <a:effectRef idx="2">
         <a:scrgbClr r="0" g="0" b="0"/>
       </a:effectRef>
       <a:fontRef idx="minor"/>
@@ -3064,7 +3502,7 @@
       <a:fillRef idx="1">
         <a:scrgbClr r="0" g="0" b="0"/>
       </a:fillRef>
-      <a:effectRef idx="0">
+      <a:effectRef idx="2">
         <a:scrgbClr r="0" g="0" b="0"/>
       </a:effectRef>
       <a:fontRef idx="minor"/>
@@ -3084,7 +3522,7 @@
       <a:fillRef idx="1">
         <a:scrgbClr r="0" g="0" b="0"/>
       </a:fillRef>
-      <a:effectRef idx="0">
+      <a:effectRef idx="3">
         <a:scrgbClr r="0" g="0" b="0"/>
       </a:effectRef>
       <a:fontRef idx="minor"/>
@@ -3118,13 +3556,13 @@
     <dgm:sp3d/>
     <dgm:txPr/>
     <dgm:style>
-      <a:lnRef idx="3">
+      <a:lnRef idx="0">
         <a:scrgbClr r="0" g="0" b="0"/>
       </a:lnRef>
-      <a:fillRef idx="1">
+      <a:fillRef idx="3">
         <a:scrgbClr r="0" g="0" b="0"/>
       </a:fillRef>
-      <a:effectRef idx="1">
+      <a:effectRef idx="3">
         <a:scrgbClr r="0" g="0" b="0"/>
       </a:effectRef>
       <a:fontRef idx="minor"/>
@@ -3335,7 +3773,7 @@
             <a:fld id="{FD2FD237-61D0-4D32-B24F-B08EC9205759}" type="datetimeFigureOut">
               <a:rPr lang="en-US" smtClean="0"/>
               <a:pPr/>
-              <a:t>6/27/2013</a:t>
+              <a:t>6/29/2013</a:t>
             </a:fld>
             <a:endParaRPr lang="en-US"/>
           </a:p>
@@ -3502,7 +3940,7 @@
             <a:fld id="{FD2FD237-61D0-4D32-B24F-B08EC9205759}" type="datetimeFigureOut">
               <a:rPr lang="en-US" smtClean="0"/>
               <a:pPr/>
-              <a:t>6/27/2013</a:t>
+              <a:t>6/29/2013</a:t>
             </a:fld>
             <a:endParaRPr lang="en-US"/>
           </a:p>
@@ -3679,7 +4117,7 @@
             <a:fld id="{FD2FD237-61D0-4D32-B24F-B08EC9205759}" type="datetimeFigureOut">
               <a:rPr lang="en-US" smtClean="0"/>
               <a:pPr/>
-              <a:t>6/27/2013</a:t>
+              <a:t>6/29/2013</a:t>
             </a:fld>
             <a:endParaRPr lang="en-US"/>
           </a:p>
@@ -3846,7 +4284,7 @@
             <a:fld id="{FD2FD237-61D0-4D32-B24F-B08EC9205759}" type="datetimeFigureOut">
               <a:rPr lang="en-US" smtClean="0"/>
               <a:pPr/>
-              <a:t>6/27/2013</a:t>
+              <a:t>6/29/2013</a:t>
             </a:fld>
             <a:endParaRPr lang="en-US"/>
           </a:p>
@@ -4089,7 +4527,7 @@
             <a:fld id="{FD2FD237-61D0-4D32-B24F-B08EC9205759}" type="datetimeFigureOut">
               <a:rPr lang="en-US" smtClean="0"/>
               <a:pPr/>
-              <a:t>6/27/2013</a:t>
+              <a:t>6/29/2013</a:t>
             </a:fld>
             <a:endParaRPr lang="en-US"/>
           </a:p>
@@ -4374,7 +4812,7 @@
             <a:fld id="{FD2FD237-61D0-4D32-B24F-B08EC9205759}" type="datetimeFigureOut">
               <a:rPr lang="en-US" smtClean="0"/>
               <a:pPr/>
-              <a:t>6/27/2013</a:t>
+              <a:t>6/29/2013</a:t>
             </a:fld>
             <a:endParaRPr lang="en-US"/>
           </a:p>
@@ -4793,7 +5231,7 @@
             <a:fld id="{FD2FD237-61D0-4D32-B24F-B08EC9205759}" type="datetimeFigureOut">
               <a:rPr lang="en-US" smtClean="0"/>
               <a:pPr/>
-              <a:t>6/27/2013</a:t>
+              <a:t>6/29/2013</a:t>
             </a:fld>
             <a:endParaRPr lang="en-US"/>
           </a:p>
@@ -4908,7 +5346,7 @@
             <a:fld id="{FD2FD237-61D0-4D32-B24F-B08EC9205759}" type="datetimeFigureOut">
               <a:rPr lang="en-US" smtClean="0"/>
               <a:pPr/>
-              <a:t>6/27/2013</a:t>
+              <a:t>6/29/2013</a:t>
             </a:fld>
             <a:endParaRPr lang="en-US"/>
           </a:p>
@@ -5000,7 +5438,7 @@
             <a:fld id="{FD2FD237-61D0-4D32-B24F-B08EC9205759}" type="datetimeFigureOut">
               <a:rPr lang="en-US" smtClean="0"/>
               <a:pPr/>
-              <a:t>6/27/2013</a:t>
+              <a:t>6/29/2013</a:t>
             </a:fld>
             <a:endParaRPr lang="en-US"/>
           </a:p>
@@ -5274,7 +5712,7 @@
             <a:fld id="{FD2FD237-61D0-4D32-B24F-B08EC9205759}" type="datetimeFigureOut">
               <a:rPr lang="en-US" smtClean="0"/>
               <a:pPr/>
-              <a:t>6/27/2013</a:t>
+              <a:t>6/29/2013</a:t>
             </a:fld>
             <a:endParaRPr lang="en-US"/>
           </a:p>
@@ -5524,7 +5962,7 @@
             <a:fld id="{FD2FD237-61D0-4D32-B24F-B08EC9205759}" type="datetimeFigureOut">
               <a:rPr lang="en-US" smtClean="0"/>
               <a:pPr/>
-              <a:t>6/27/2013</a:t>
+              <a:t>6/29/2013</a:t>
             </a:fld>
             <a:endParaRPr lang="en-US"/>
           </a:p>
@@ -5734,7 +6172,7 @@
             <a:fld id="{FD2FD237-61D0-4D32-B24F-B08EC9205759}" type="datetimeFigureOut">
               <a:rPr lang="en-US" smtClean="0"/>
               <a:pPr/>
-              <a:t>6/27/2013</a:t>
+              <a:t>6/29/2013</a:t>
             </a:fld>
             <a:endParaRPr lang="en-US"/>
           </a:p>
@@ -6273,11 +6711,7 @@
           <a:p>
             <a:r>
               <a:rPr lang="en-US" dirty="0" smtClean="0"/>
-              <a:t>Test </a:t>
-            </a:r>
-            <a:r>
-              <a:rPr lang="en-US" dirty="0" smtClean="0"/>
-              <a:t>Plan</a:t>
+              <a:t>Test Plan</a:t>
             </a:r>
             <a:endParaRPr lang="en-US" dirty="0"/>
           </a:p>
@@ -6394,8 +6828,8 @@
           <p:nvPr/>
         </p:nvGraphicFramePr>
         <p:xfrm>
-          <a:off x="1600200" y="1828800"/>
-          <a:ext cx="6096000" cy="3397885"/>
+          <a:off x="1371600" y="1828800"/>
+          <a:ext cx="6705600" cy="3123565"/>
         </p:xfrm>
         <a:graphic>
           <a:graphicData uri="http://schemas.openxmlformats.org/drawingml/2006/table">
@@ -6404,10 +6838,10 @@
                 <a:tableStyleId>{72833802-FEF1-4C79-8D5D-14CF1EAF98D9}</a:tableStyleId>
               </a:tblPr>
               <a:tblGrid>
-                <a:gridCol w="1524000"/>
-                <a:gridCol w="1524000"/>
-                <a:gridCol w="1524000"/>
-                <a:gridCol w="1524000"/>
+                <a:gridCol w="1676400"/>
+                <a:gridCol w="1676400"/>
+                <a:gridCol w="1676400"/>
+                <a:gridCol w="1676400"/>
               </a:tblGrid>
               <a:tr h="370840">
                 <a:tc gridSpan="4">
@@ -6911,16 +7345,11 @@
               <a:rPr lang="en-US" dirty="0" smtClean="0"/>
               <a:t>This will pull up a window with all of the users’ event data inside the default add event intent.</a:t>
             </a:r>
-            <a:endParaRPr lang="en-US" dirty="0" smtClean="0"/>
-          </a:p>
-          <a:p>
-            <a:r>
-              <a:rPr lang="en-US" dirty="0" smtClean="0"/>
-              <a:t>Pros</a:t>
-            </a:r>
-            <a:r>
-              <a:rPr lang="en-US" dirty="0" smtClean="0"/>
-              <a:t>:</a:t>
+          </a:p>
+          <a:p>
+            <a:r>
+              <a:rPr lang="en-US" dirty="0" smtClean="0"/>
+              <a:t>Pros:</a:t>
             </a:r>
           </a:p>
           <a:p>
@@ -6936,16 +7365,11 @@
               <a:rPr lang="en-US" dirty="0" smtClean="0"/>
               <a:t>Easy to get info from the user</a:t>
             </a:r>
-            <a:endParaRPr lang="en-US" dirty="0" smtClean="0"/>
-          </a:p>
-          <a:p>
-            <a:r>
-              <a:rPr lang="en-US" dirty="0" smtClean="0"/>
-              <a:t>Cons</a:t>
-            </a:r>
-            <a:r>
-              <a:rPr lang="en-US" dirty="0" smtClean="0"/>
-              <a:t>:</a:t>
+          </a:p>
+          <a:p>
+            <a:r>
+              <a:rPr lang="en-US" dirty="0" smtClean="0"/>
+              <a:t>Cons:</a:t>
             </a:r>
           </a:p>
           <a:p>
@@ -6976,14 +7400,6 @@
 <file path=ppt/slides/slide15.xml><?xml version="1.0" encoding="utf-8"?>
 <p:sld xmlns:a="http://schemas.openxmlformats.org/drawingml/2006/main" xmlns:r="http://schemas.openxmlformats.org/officeDocument/2006/relationships" xmlns:p="http://schemas.openxmlformats.org/presentationml/2006/main">
   <p:cSld>
-    <p:bg>
-      <p:bgPr>
-        <a:solidFill>
-          <a:srgbClr val="FF0000"/>
-        </a:solidFill>
-        <a:effectLst/>
-      </p:bgPr>
-    </p:bg>
     <p:spTree>
       <p:nvGrpSpPr>
         <p:cNvPr id="1" name=""/>
@@ -7055,14 +7471,6 @@
 <file path=ppt/slides/slide16.xml><?xml version="1.0" encoding="utf-8"?>
 <p:sld xmlns:a="http://schemas.openxmlformats.org/drawingml/2006/main" xmlns:r="http://schemas.openxmlformats.org/officeDocument/2006/relationships" xmlns:p="http://schemas.openxmlformats.org/presentationml/2006/main">
   <p:cSld>
-    <p:bg>
-      <p:bgPr>
-        <a:solidFill>
-          <a:srgbClr val="FF0000"/>
-        </a:solidFill>
-        <a:effectLst/>
-      </p:bgPr>
-    </p:bg>
     <p:spTree>
       <p:nvGrpSpPr>
         <p:cNvPr id="1" name=""/>
@@ -7146,14 +7554,6 @@
 <file path=ppt/slides/slide17.xml><?xml version="1.0" encoding="utf-8"?>
 <p:sld xmlns:a="http://schemas.openxmlformats.org/drawingml/2006/main" xmlns:r="http://schemas.openxmlformats.org/officeDocument/2006/relationships" xmlns:p="http://schemas.openxmlformats.org/presentationml/2006/main">
   <p:cSld>
-    <p:bg>
-      <p:bgPr>
-        <a:solidFill>
-          <a:srgbClr val="FF0000"/>
-        </a:solidFill>
-        <a:effectLst/>
-      </p:bgPr>
-    </p:bg>
     <p:spTree>
       <p:nvGrpSpPr>
         <p:cNvPr id="1" name=""/>
@@ -7229,14 +7629,6 @@
 <file path=ppt/slides/slide18.xml><?xml version="1.0" encoding="utf-8"?>
 <p:sld xmlns:a="http://schemas.openxmlformats.org/drawingml/2006/main" xmlns:r="http://schemas.openxmlformats.org/officeDocument/2006/relationships" xmlns:p="http://schemas.openxmlformats.org/presentationml/2006/main">
   <p:cSld>
-    <p:bg>
-      <p:bgPr>
-        <a:solidFill>
-          <a:srgbClr val="FFFF00"/>
-        </a:solidFill>
-        <a:effectLst/>
-      </p:bgPr>
-    </p:bg>
     <p:spTree>
       <p:nvGrpSpPr>
         <p:cNvPr id="1" name=""/>
@@ -7291,33 +7683,19 @@
           <a:p>
             <a:r>
               <a:rPr lang="en-US" dirty="0" smtClean="0"/>
-              <a:t>Also known as</a:t>
-            </a:r>
-            <a:r>
-              <a:rPr lang="en-US" dirty="0" smtClean="0"/>
-              <a:t>: Tree Design</a:t>
-            </a:r>
-            <a:endParaRPr lang="en-US" dirty="0" smtClean="0"/>
-          </a:p>
-          <a:p>
-            <a:r>
-              <a:rPr lang="en-US" dirty="0" smtClean="0"/>
-              <a:t>Motivation</a:t>
-            </a:r>
-            <a:r>
-              <a:rPr lang="en-US" dirty="0" smtClean="0"/>
-              <a:t>:  When dealing with a tree structure, it is at times difficult to determine what is a branch and what is a leaf(or node).</a:t>
-            </a:r>
-            <a:endParaRPr lang="en-US" dirty="0" smtClean="0"/>
-          </a:p>
-          <a:p>
-            <a:r>
-              <a:rPr lang="en-US" dirty="0" smtClean="0"/>
-              <a:t>Intent</a:t>
-            </a:r>
-            <a:r>
-              <a:rPr lang="en-US" dirty="0" smtClean="0"/>
-              <a:t>: Organize objects into tree structures. This allows objects and compositions of objects to be treated the same.</a:t>
+              <a:t>Also known as: Tree Design</a:t>
+            </a:r>
+          </a:p>
+          <a:p>
+            <a:r>
+              <a:rPr lang="en-US" dirty="0" smtClean="0"/>
+              <a:t>Motivation:  When dealing with a tree structure, it is at times difficult to determine what is a branch and what is a leaf(or node).</a:t>
+            </a:r>
+          </a:p>
+          <a:p>
+            <a:r>
+              <a:rPr lang="en-US" dirty="0" smtClean="0"/>
+              <a:t>Intent: Organize objects into tree structures. This allows objects and compositions of objects to be treated the same.</a:t>
             </a:r>
             <a:endParaRPr lang="en-US" dirty="0"/>
           </a:p>
@@ -7334,14 +7712,6 @@
 <file path=ppt/slides/slide19.xml><?xml version="1.0" encoding="utf-8"?>
 <p:sld xmlns:a="http://schemas.openxmlformats.org/drawingml/2006/main" xmlns:r="http://schemas.openxmlformats.org/officeDocument/2006/relationships" xmlns:p="http://schemas.openxmlformats.org/presentationml/2006/main">
   <p:cSld>
-    <p:bg>
-      <p:bgPr>
-        <a:solidFill>
-          <a:srgbClr val="FFFF00"/>
-        </a:solidFill>
-        <a:effectLst/>
-      </p:bgPr>
-    </p:bg>
     <p:spTree>
       <p:nvGrpSpPr>
         <p:cNvPr id="1" name=""/>
@@ -7396,22 +7766,13 @@
           <a:p>
             <a:r>
               <a:rPr lang="en-US" dirty="0" smtClean="0"/>
-              <a:t>Classification</a:t>
-            </a:r>
-            <a:r>
-              <a:rPr lang="en-US" dirty="0" smtClean="0"/>
-              <a:t>: Structural</a:t>
-            </a:r>
-            <a:endParaRPr lang="en-US" dirty="0" smtClean="0"/>
-          </a:p>
-          <a:p>
-            <a:r>
-              <a:rPr lang="en-US" dirty="0" smtClean="0"/>
-              <a:t>Implementation</a:t>
-            </a:r>
-            <a:r>
-              <a:rPr lang="en-US" dirty="0" smtClean="0"/>
-              <a:t>:</a:t>
+              <a:t>Classification: Structural</a:t>
+            </a:r>
+          </a:p>
+          <a:p>
+            <a:r>
+              <a:rPr lang="en-US" dirty="0" smtClean="0"/>
+              <a:t>Implementation:</a:t>
             </a:r>
           </a:p>
           <a:p>
@@ -7526,29 +7887,41 @@
           <a:p>
             <a:r>
               <a:rPr lang="en-US" dirty="0" smtClean="0"/>
-              <a:t>In a nutshell: takes your schedule from the UC database and adds it to your phone calendar.</a:t>
-            </a:r>
-          </a:p>
-          <a:p>
-            <a:r>
-              <a:rPr lang="en-US" dirty="0" smtClean="0"/>
-              <a:t>Events are able to be modified to fit in hw due dates, </a:t>
-            </a:r>
-            <a:r>
-              <a:rPr lang="en-US" dirty="0" err="1" smtClean="0"/>
-              <a:t>exam,etc</a:t>
+              <a:t>In a </a:t>
+            </a:r>
+            <a:r>
+              <a:rPr lang="en-US" dirty="0" smtClean="0"/>
+              <a:t>Nutshell</a:t>
+            </a:r>
+            <a:r>
+              <a:rPr lang="en-US" dirty="0" smtClean="0"/>
+              <a:t>: takes your schedule from the UC database and adds it to your phone calendar.</a:t>
+            </a:r>
+          </a:p>
+          <a:p>
+            <a:r>
+              <a:rPr lang="en-US" dirty="0" smtClean="0"/>
+              <a:t>Events are able to be modified to fit in hw due dates, exam</a:t>
+            </a:r>
+            <a:r>
+              <a:rPr lang="en-US" dirty="0" smtClean="0"/>
+              <a:t>, etc</a:t>
             </a:r>
             <a:r>
               <a:rPr lang="en-US" dirty="0" smtClean="0"/>
               <a:t>.</a:t>
             </a:r>
+          </a:p>
+          <a:p>
+            <a:r>
+              <a:rPr lang="en-US" dirty="0" smtClean="0"/>
+              <a:t>System Metaphor: </a:t>
+            </a:r>
+            <a:r>
+              <a:rPr lang="en-US" dirty="0" smtClean="0"/>
+              <a:t>Agenda</a:t>
+            </a:r>
             <a:endParaRPr lang="en-US" dirty="0" smtClean="0"/>
-          </a:p>
-          <a:p>
-            <a:r>
-              <a:rPr lang="en-US" dirty="0" smtClean="0"/>
-              <a:t>System Metaphor: Scheduler, calendar, event holder?</a:t>
-            </a:r>
           </a:p>
           <a:p>
             <a:endParaRPr lang="en-US" dirty="0"/>
@@ -7566,14 +7939,6 @@
 <file path=ppt/slides/slide20.xml><?xml version="1.0" encoding="utf-8"?>
 <p:sld xmlns:a="http://schemas.openxmlformats.org/drawingml/2006/main" xmlns:r="http://schemas.openxmlformats.org/officeDocument/2006/relationships" xmlns:p="http://schemas.openxmlformats.org/presentationml/2006/main">
   <p:cSld>
-    <p:bg>
-      <p:bgPr>
-        <a:solidFill>
-          <a:srgbClr val="FFFF00"/>
-        </a:solidFill>
-        <a:effectLst/>
-      </p:bgPr>
-    </p:bg>
     <p:spTree>
       <p:nvGrpSpPr>
         <p:cNvPr id="1" name=""/>
@@ -7628,13 +7993,8 @@
           <a:p>
             <a:r>
               <a:rPr lang="en-US" dirty="0" smtClean="0"/>
-              <a:t>Applicability</a:t>
-            </a:r>
-            <a:r>
-              <a:rPr lang="en-US" dirty="0" smtClean="0"/>
-              <a:t>: Calculator app that must abide by the order of operations or anything that contains a priority  </a:t>
-            </a:r>
-            <a:endParaRPr lang="en-US" dirty="0" smtClean="0"/>
+              <a:t>Applicability: Calculator app that must abide by the order of operations or anything that contains a priority  </a:t>
+            </a:r>
           </a:p>
         </p:txBody>
       </p:sp>
@@ -7698,14 +8058,6 @@
 <file path=ppt/slides/slide21.xml><?xml version="1.0" encoding="utf-8"?>
 <p:sld xmlns:a="http://schemas.openxmlformats.org/drawingml/2006/main" xmlns:r="http://schemas.openxmlformats.org/officeDocument/2006/relationships" xmlns:p="http://schemas.openxmlformats.org/presentationml/2006/main">
   <p:cSld>
-    <p:bg>
-      <p:bgPr>
-        <a:solidFill>
-          <a:srgbClr val="FFFF00"/>
-        </a:solidFill>
-        <a:effectLst/>
-      </p:bgPr>
-    </p:bg>
     <p:spTree>
       <p:nvGrpSpPr>
         <p:cNvPr id="1" name=""/>
@@ -7760,22 +8112,13 @@
           <a:p>
             <a:r>
               <a:rPr lang="en-US" dirty="0" smtClean="0"/>
-              <a:t>Participants</a:t>
-            </a:r>
-            <a:r>
-              <a:rPr lang="en-US" dirty="0" smtClean="0"/>
-              <a:t>: Leaf, Composite, Component</a:t>
-            </a:r>
-            <a:endParaRPr lang="en-US" dirty="0" smtClean="0"/>
-          </a:p>
-          <a:p>
-            <a:r>
-              <a:rPr lang="en-US" dirty="0" smtClean="0"/>
-              <a:t>Related Patterns: </a:t>
-            </a:r>
-            <a:r>
-              <a:rPr lang="en-US" dirty="0" smtClean="0"/>
-              <a:t> </a:t>
+              <a:t>Participants: Leaf, Composite, Component</a:t>
+            </a:r>
+          </a:p>
+          <a:p>
+            <a:r>
+              <a:rPr lang="en-US" dirty="0" smtClean="0"/>
+              <a:t>Related Patterns:  </a:t>
             </a:r>
           </a:p>
           <a:p>
@@ -7786,11 +8129,7 @@
             </a:r>
             <a:r>
               <a:rPr lang="en-US" dirty="0" err="1" smtClean="0"/>
-              <a:t>g</a:t>
-            </a:r>
-            <a:r>
-              <a:rPr lang="en-US" dirty="0" err="1" smtClean="0"/>
-              <a:t>etChild</a:t>
+              <a:t>getChild</a:t>
             </a:r>
             <a:r>
               <a:rPr lang="en-US" dirty="0" smtClean="0"/>
@@ -7802,11 +8141,7 @@
             </a:r>
             <a:r>
               <a:rPr lang="en-US" dirty="0" smtClean="0"/>
-              <a:t> </a:t>
-            </a:r>
-            <a:r>
-              <a:rPr lang="en-US" dirty="0" smtClean="0"/>
-              <a:t>and </a:t>
+              <a:t> and </a:t>
             </a:r>
             <a:r>
               <a:rPr lang="en-US" dirty="0" err="1" smtClean="0"/>
@@ -7885,15 +8220,7 @@
           <a:p>
             <a:r>
               <a:rPr lang="en-US" dirty="0" smtClean="0"/>
-              <a:t>Uses </a:t>
-            </a:r>
-            <a:r>
-              <a:rPr lang="en-US" dirty="0" smtClean="0"/>
-              <a:t>UC Scheduling </a:t>
-            </a:r>
-            <a:r>
-              <a:rPr lang="en-US" dirty="0" smtClean="0"/>
-              <a:t>API and Calendar API</a:t>
+              <a:t>Uses UC Scheduling API and Calendar API</a:t>
             </a:r>
           </a:p>
           <a:p>
@@ -7905,13 +8232,22 @@
           <a:p>
             <a:r>
               <a:rPr lang="en-US" dirty="0" smtClean="0"/>
-              <a:t>???</a:t>
-            </a:r>
-          </a:p>
-          <a:p>
-            <a:r>
-              <a:rPr lang="en-US" dirty="0" smtClean="0"/>
-              <a:t>Profit (the user will get their schedule on their phone calendar without any prompts).</a:t>
+              <a:t>The user can then view their schedule and download it to there phone.</a:t>
+            </a:r>
+            <a:endParaRPr lang="en-US" dirty="0" smtClean="0"/>
+          </a:p>
+          <a:p>
+            <a:r>
+              <a:rPr lang="en-US" dirty="0" smtClean="0"/>
+              <a:t>The </a:t>
+            </a:r>
+            <a:r>
+              <a:rPr lang="en-US" dirty="0" smtClean="0"/>
+              <a:t>user will get their schedule on their phone calendar without any </a:t>
+            </a:r>
+            <a:r>
+              <a:rPr lang="en-US" dirty="0" smtClean="0"/>
+              <a:t>prompts.</a:t>
             </a:r>
             <a:endParaRPr lang="en-US" dirty="0" smtClean="0"/>
           </a:p>
@@ -7962,7 +8298,7 @@
           <a:p>
             <a:r>
               <a:rPr lang="en-US" dirty="0" smtClean="0"/>
-              <a:t>Application Overview</a:t>
+              <a:t>Why make this app?</a:t>
             </a:r>
             <a:endParaRPr lang="en-US" dirty="0"/>
           </a:p>
@@ -8003,11 +8339,7 @@
           <a:p>
             <a:r>
               <a:rPr lang="en-US" dirty="0" smtClean="0"/>
-              <a:t>Contains room for notes and what not.</a:t>
-            </a:r>
-            <a:r>
-              <a:rPr lang="en-US" dirty="0" smtClean="0"/>
-              <a:t> </a:t>
+              <a:t>Contains room for notes and what not. </a:t>
             </a:r>
           </a:p>
           <a:p>
@@ -8100,7 +8432,6 @@
               <a:rPr lang="en-US" dirty="0" smtClean="0"/>
               <a:t>User needs to be able to update schedule </a:t>
             </a:r>
-            <a:endParaRPr lang="en-US" dirty="0" smtClean="0"/>
           </a:p>
           <a:p>
             <a:endParaRPr lang="en-US" dirty="0"/>
@@ -8281,7 +8612,15 @@
           <a:p>
             <a:r>
               <a:rPr lang="en-US" dirty="0" smtClean="0"/>
-              <a:t>Test cases for add Event have been implemented.</a:t>
+              <a:t>Test cases for </a:t>
+            </a:r>
+            <a:r>
+              <a:rPr lang="en-US" dirty="0" smtClean="0"/>
+              <a:t>Add </a:t>
+            </a:r>
+            <a:r>
+              <a:rPr lang="en-US" dirty="0" smtClean="0"/>
+              <a:t>Event have been implemented.</a:t>
             </a:r>
             <a:endParaRPr lang="en-US" dirty="0"/>
           </a:p>
@@ -8352,25 +8691,13 @@
           <a:p>
             <a:r>
               <a:rPr lang="en-US" dirty="0" smtClean="0"/>
-              <a:t>With the </a:t>
-            </a:r>
-            <a:r>
-              <a:rPr lang="en-US" dirty="0" smtClean="0"/>
-              <a:t>UC Scheduling </a:t>
-            </a:r>
-            <a:r>
-              <a:rPr lang="en-US" dirty="0" smtClean="0"/>
-              <a:t>API, we plan to test the login credentials using a test account</a:t>
-            </a:r>
-          </a:p>
-          <a:p>
-            <a:r>
-              <a:rPr lang="en-US" dirty="0" smtClean="0"/>
-              <a:t>Once that is done, we will tr</a:t>
-            </a:r>
-            <a:r>
-              <a:rPr lang="en-US" dirty="0" smtClean="0"/>
-              <a:t>y to sort the schedule into events that we can put on the calendar and… put them on the calendar</a:t>
+              <a:t>With the UC Scheduling API, we plan to test the login credentials using a test account</a:t>
+            </a:r>
+          </a:p>
+          <a:p>
+            <a:r>
+              <a:rPr lang="en-US" dirty="0" smtClean="0"/>
+              <a:t>Once that is done, we will try to sort the schedule into events that we can put on the calendar and… put them on the calendar</a:t>
             </a:r>
           </a:p>
           <a:p>

</xml_diff>